<commit_message>
Update presentation after comments
</commit_message>
<xml_diff>
--- a/presentation/Introduction to Gradle.pptx
+++ b/presentation/Introduction to Gradle.pptx
@@ -6,7 +6,7 @@
     <p:sldMasterId id="2147483661" r:id="rId2"/>
   </p:sldMasterIdLst>
   <p:notesMasterIdLst>
-    <p:notesMasterId r:id="rId34"/>
+    <p:notesMasterId r:id="rId37"/>
   </p:notesMasterIdLst>
   <p:sldIdLst>
     <p:sldId id="256" r:id="rId3"/>
@@ -22,24 +22,27 @@
     <p:sldId id="287" r:id="rId13"/>
     <p:sldId id="288" r:id="rId14"/>
     <p:sldId id="267" r:id="rId15"/>
-    <p:sldId id="291" r:id="rId16"/>
-    <p:sldId id="286" r:id="rId17"/>
+    <p:sldId id="286" r:id="rId16"/>
+    <p:sldId id="291" r:id="rId17"/>
     <p:sldId id="262" r:id="rId18"/>
     <p:sldId id="289" r:id="rId19"/>
-    <p:sldId id="263" r:id="rId20"/>
-    <p:sldId id="290" r:id="rId21"/>
-    <p:sldId id="264" r:id="rId22"/>
-    <p:sldId id="277" r:id="rId23"/>
-    <p:sldId id="265" r:id="rId24"/>
-    <p:sldId id="269" r:id="rId25"/>
-    <p:sldId id="268" r:id="rId26"/>
-    <p:sldId id="279" r:id="rId27"/>
-    <p:sldId id="278" r:id="rId28"/>
-    <p:sldId id="272" r:id="rId29"/>
-    <p:sldId id="266" r:id="rId30"/>
-    <p:sldId id="271" r:id="rId31"/>
-    <p:sldId id="273" r:id="rId32"/>
-    <p:sldId id="275" r:id="rId33"/>
+    <p:sldId id="292" r:id="rId20"/>
+    <p:sldId id="263" r:id="rId21"/>
+    <p:sldId id="290" r:id="rId22"/>
+    <p:sldId id="264" r:id="rId23"/>
+    <p:sldId id="277" r:id="rId24"/>
+    <p:sldId id="265" r:id="rId25"/>
+    <p:sldId id="269" r:id="rId26"/>
+    <p:sldId id="268" r:id="rId27"/>
+    <p:sldId id="279" r:id="rId28"/>
+    <p:sldId id="278" r:id="rId29"/>
+    <p:sldId id="272" r:id="rId30"/>
+    <p:sldId id="266" r:id="rId31"/>
+    <p:sldId id="271" r:id="rId32"/>
+    <p:sldId id="294" r:id="rId33"/>
+    <p:sldId id="293" r:id="rId34"/>
+    <p:sldId id="273" r:id="rId35"/>
+    <p:sldId id="275" r:id="rId36"/>
   </p:sldIdLst>
   <p:sldSz cx="9144000" cy="6858000" type="screen4x3"/>
   <p:notesSz cx="7559675" cy="10691813"/>
@@ -4067,15 +4070,7 @@
             </a:r>
             <a:r>
               <a:rPr lang="en-US" baseline="0" dirty="0" smtClean="0"/>
-              <a:t> dependent as </a:t>
-            </a:r>
-            <a:r>
-              <a:rPr lang="en-US" baseline="0" dirty="0" smtClean="0"/>
-              <a:t>artifacts. For </a:t>
-            </a:r>
-            <a:r>
-              <a:rPr lang="en-US" baseline="0" dirty="0" smtClean="0"/>
-              <a:t>example if A depends on B, and you want to build only A, B will be searches for in the repository and won’t 			       be build automatically (supported in Maven 3 using “–</a:t>
+              <a:t> dependent as artifacts. For example if A depends on B, and you want to build only A, B will be searches for in the repository and won’t 			       be build automatically (supported in Maven 3 using “–</a:t>
             </a:r>
             <a:r>
               <a:rPr lang="en-US" baseline="0" dirty="0" err="1" smtClean="0"/>
@@ -4115,7 +4110,7 @@
               <a:rPr lang="en-US" sz="1400" smtClean="0">
                 <a:latin typeface="Times New Roman"/>
               </a:rPr>
-              <a:t>31</a:t>
+              <a:t>34</a:t>
             </a:fld>
             <a:endParaRPr lang="en-US"/>
           </a:p>
@@ -7598,13 +7593,7 @@
               <a:rPr lang="en-US" sz="2200" dirty="0" smtClean="0">
                 <a:latin typeface="Calibri"/>
               </a:rPr>
-              <a:t>Most popular java build </a:t>
-            </a:r>
-            <a:r>
-              <a:rPr lang="en-US" sz="2200" dirty="0" smtClean="0">
-                <a:latin typeface="Calibri"/>
-              </a:rPr>
-              <a:t>tool</a:t>
+              <a:t>Most popular java build tool</a:t>
             </a:r>
           </a:p>
           <a:p>
@@ -7619,9 +7608,6 @@
               </a:rPr>
               <a:t>Declarative build tool</a:t>
             </a:r>
-            <a:endParaRPr lang="en-US" sz="2200" dirty="0" smtClean="0">
-              <a:latin typeface="Calibri"/>
-            </a:endParaRPr>
           </a:p>
           <a:p>
             <a:pPr marL="457200" indent="-457200">
@@ -7794,7 +7780,13 @@
               <a:rPr lang="en-US" sz="3600" dirty="0" smtClean="0">
                 <a:latin typeface="Calibri"/>
               </a:rPr>
-              <a:t>– dependency management</a:t>
+              <a:t>– </a:t>
+            </a:r>
+            <a:r>
+              <a:rPr lang="en-US" sz="3600" dirty="0" smtClean="0">
+                <a:latin typeface="Calibri"/>
+              </a:rPr>
+              <a:t>architecture</a:t>
             </a:r>
             <a:endParaRPr dirty="0"/>
           </a:p>
@@ -7910,7 +7902,13 @@
               <a:rPr lang="en-US" sz="3600" dirty="0" smtClean="0">
                 <a:latin typeface="Calibri"/>
               </a:rPr>
-              <a:t>Maven – dependency management (cont.)</a:t>
+              <a:t>Maven – dependency </a:t>
+            </a:r>
+            <a:r>
+              <a:rPr lang="en-US" sz="3600" dirty="0" smtClean="0">
+                <a:latin typeface="Calibri"/>
+              </a:rPr>
+              <a:t>management</a:t>
             </a:r>
             <a:endParaRPr dirty="0"/>
           </a:p>
@@ -8426,11 +8424,11 @@
   <p:clrMapOvr>
     <a:masterClrMapping/>
   </p:clrMapOvr>
-  <mc:AlternateContent xmlns:mc="http://schemas.openxmlformats.org/markup-compatibility/2006">
-    <mc:Choice xmlns:p14="http://schemas.microsoft.com/office/powerpoint/2010/main" Requires="p14">
+  <mc:AlternateContent xmlns:mc="http://schemas.openxmlformats.org/markup-compatibility/2006" xmlns:p14="http://schemas.microsoft.com/office/powerpoint/2010/main">
+    <mc:Choice Requires="p14">
       <p:transition spd="slow" p14:dur="2000"/>
     </mc:Choice>
-    <mc:Fallback>
+    <mc:Fallback xmlns="">
       <p:transition spd="slow"/>
     </mc:Fallback>
   </mc:AlternateContent>
@@ -8465,176 +8463,6 @@
 </file>
 
 <file path=ppt/slides/slide14.xml><?xml version="1.0" encoding="utf-8"?>
-<p:sld xmlns:a="http://schemas.openxmlformats.org/drawingml/2006/main" xmlns:r="http://schemas.openxmlformats.org/officeDocument/2006/relationships" xmlns:p="http://schemas.openxmlformats.org/presentationml/2006/main">
-  <p:cSld>
-    <p:spTree>
-      <p:nvGrpSpPr>
-        <p:cNvPr id="1" name=""/>
-        <p:cNvGrpSpPr/>
-        <p:nvPr/>
-      </p:nvGrpSpPr>
-      <p:grpSpPr>
-        <a:xfrm>
-          <a:off x="0" y="0"/>
-          <a:ext cx="0" cy="0"/>
-          <a:chOff x="0" y="0"/>
-          <a:chExt cx="0" cy="0"/>
-        </a:xfrm>
-      </p:grpSpPr>
-      <p:sp>
-        <p:nvSpPr>
-          <p:cNvPr id="3" name="מציין מיקום תוכן 2"/>
-          <p:cNvSpPr>
-            <a:spLocks noGrp="1"/>
-          </p:cNvSpPr>
-          <p:nvPr>
-            <p:ph idx="4294967295"/>
-          </p:nvPr>
-        </p:nvSpPr>
-        <p:spPr>
-          <a:xfrm>
-            <a:off x="457200" y="1600200"/>
-            <a:ext cx="8229600" cy="4525963"/>
-          </a:xfrm>
-          <a:prstGeom prst="rect">
-            <a:avLst/>
-          </a:prstGeom>
-        </p:spPr>
-        <p:txBody>
-          <a:bodyPr/>
-          <a:lstStyle/>
-          <a:p>
-            <a:pPr algn="l" rtl="0"/>
-            <a:r>
-              <a:rPr lang="en-US" sz="2800" i="1" dirty="0" smtClean="0"/>
-              <a:t>Lifecycle </a:t>
-            </a:r>
-            <a:r>
-              <a:rPr lang="en-US" sz="2800" dirty="0" smtClean="0"/>
-              <a:t>represents a well recognized steps (Phases) used in software assembly</a:t>
-            </a:r>
-          </a:p>
-          <a:p>
-            <a:pPr algn="l" rtl="0"/>
-            <a:r>
-              <a:rPr lang="en-US" sz="2800" dirty="0" smtClean="0"/>
-              <a:t>Each step in a lifecycle is called a </a:t>
-            </a:r>
-            <a:r>
-              <a:rPr lang="en-US" sz="2800" i="1" dirty="0" smtClean="0"/>
-              <a:t>phase.</a:t>
-            </a:r>
-            <a:r>
-              <a:rPr lang="en-US" sz="2800" dirty="0" smtClean="0"/>
-              <a:t> Zero or more </a:t>
-            </a:r>
-            <a:r>
-              <a:rPr lang="en-US" sz="2800" i="1" dirty="0" err="1" smtClean="0"/>
-              <a:t>plugin</a:t>
-            </a:r>
-            <a:r>
-              <a:rPr lang="en-US" sz="2800" i="1" dirty="0" smtClean="0"/>
-              <a:t> goals</a:t>
-            </a:r>
-            <a:r>
-              <a:rPr lang="en-US" sz="2800" dirty="0" smtClean="0"/>
-              <a:t> are bound to a phase.</a:t>
-            </a:r>
-          </a:p>
-          <a:p>
-            <a:pPr algn="l" rtl="0">
-              <a:buNone/>
-            </a:pPr>
-            <a:endParaRPr lang="en-US" sz="2800" dirty="0" smtClean="0"/>
-          </a:p>
-          <a:p>
-            <a:pPr algn="l" rtl="0">
-              <a:buNone/>
-            </a:pPr>
-            <a:endParaRPr lang="he-IL" dirty="0"/>
-          </a:p>
-        </p:txBody>
-      </p:sp>
-      <p:pic>
-        <p:nvPicPr>
-          <p:cNvPr id="4" name="תמונה 3" descr="lifecycle.png"/>
-          <p:cNvPicPr>
-            <a:picLocks noChangeAspect="1"/>
-          </p:cNvPicPr>
-          <p:nvPr/>
-        </p:nvPicPr>
-        <p:blipFill>
-          <a:blip r:embed="rId2"/>
-          <a:stretch>
-            <a:fillRect/>
-          </a:stretch>
-        </p:blipFill>
-        <p:spPr>
-          <a:xfrm>
-            <a:off x="3465020" y="3645003"/>
-            <a:ext cx="2035674" cy="2855831"/>
-          </a:xfrm>
-          <a:prstGeom prst="rect">
-            <a:avLst/>
-          </a:prstGeom>
-        </p:spPr>
-      </p:pic>
-      <p:sp>
-        <p:nvSpPr>
-          <p:cNvPr id="7" name="TextShape 1"/>
-          <p:cNvSpPr txBox="1"/>
-          <p:nvPr/>
-        </p:nvSpPr>
-        <p:spPr>
-          <a:xfrm>
-            <a:off x="457200" y="274680"/>
-            <a:ext cx="8229240" cy="1142640"/>
-          </a:xfrm>
-          <a:prstGeom prst="rect">
-            <a:avLst/>
-          </a:prstGeom>
-        </p:spPr>
-        <p:txBody>
-          <a:bodyPr anchor="ctr"/>
-          <a:lstStyle/>
-          <a:p>
-            <a:r>
-              <a:rPr lang="en-US" sz="3600" dirty="0">
-                <a:latin typeface="Calibri"/>
-              </a:rPr>
-              <a:t>Maven </a:t>
-            </a:r>
-            <a:r>
-              <a:rPr lang="en-US" sz="3600" dirty="0" smtClean="0">
-                <a:latin typeface="Calibri"/>
-              </a:rPr>
-              <a:t>– build lifecycles</a:t>
-            </a:r>
-            <a:endParaRPr dirty="0"/>
-          </a:p>
-        </p:txBody>
-      </p:sp>
-    </p:spTree>
-    <p:extLst>
-      <p:ext uri="{BB962C8B-B14F-4D97-AF65-F5344CB8AC3E}">
-        <p14:creationId xmlns:p14="http://schemas.microsoft.com/office/powerpoint/2010/main" val="3741408991"/>
-      </p:ext>
-    </p:extLst>
-  </p:cSld>
-  <p:clrMapOvr>
-    <a:masterClrMapping/>
-  </p:clrMapOvr>
-  <p:timing>
-    <p:tnLst>
-      <p:par>
-        <p:cTn id="1" dur="indefinite" restart="never" nodeType="tmRoot"/>
-      </p:par>
-    </p:tnLst>
-  </p:timing>
-</p:sld>
-</file>
-
-<file path=ppt/slides/slide15.xml><?xml version="1.0" encoding="utf-8"?>
 <p:sld xmlns:a="http://schemas.openxmlformats.org/drawingml/2006/main" xmlns:r="http://schemas.openxmlformats.org/officeDocument/2006/relationships" xmlns:p="http://schemas.openxmlformats.org/presentationml/2006/main">
   <p:cSld>
     <p:spTree>
@@ -8756,6 +8584,184 @@
 </p:sld>
 </file>
 
+<file path=ppt/slides/slide15.xml><?xml version="1.0" encoding="utf-8"?>
+<p:sld xmlns:a="http://schemas.openxmlformats.org/drawingml/2006/main" xmlns:r="http://schemas.openxmlformats.org/officeDocument/2006/relationships" xmlns:p="http://schemas.openxmlformats.org/presentationml/2006/main" show="0">
+  <p:cSld>
+    <p:spTree>
+      <p:nvGrpSpPr>
+        <p:cNvPr id="1" name=""/>
+        <p:cNvGrpSpPr/>
+        <p:nvPr/>
+      </p:nvGrpSpPr>
+      <p:grpSpPr>
+        <a:xfrm>
+          <a:off x="0" y="0"/>
+          <a:ext cx="0" cy="0"/>
+          <a:chOff x="0" y="0"/>
+          <a:chExt cx="0" cy="0"/>
+        </a:xfrm>
+      </p:grpSpPr>
+      <p:sp>
+        <p:nvSpPr>
+          <p:cNvPr id="3" name="מציין מיקום תוכן 2"/>
+          <p:cNvSpPr>
+            <a:spLocks noGrp="1"/>
+          </p:cNvSpPr>
+          <p:nvPr>
+            <p:ph idx="4294967295"/>
+          </p:nvPr>
+        </p:nvSpPr>
+        <p:spPr>
+          <a:xfrm>
+            <a:off x="457200" y="1600200"/>
+            <a:ext cx="8229600" cy="4525963"/>
+          </a:xfrm>
+          <a:prstGeom prst="rect">
+            <a:avLst/>
+          </a:prstGeom>
+        </p:spPr>
+        <p:txBody>
+          <a:bodyPr/>
+          <a:lstStyle/>
+          <a:p>
+            <a:pPr algn="l" rtl="0"/>
+            <a:r>
+              <a:rPr lang="en-US" sz="2800" i="1" dirty="0" smtClean="0"/>
+              <a:t>Lifecycle </a:t>
+            </a:r>
+            <a:r>
+              <a:rPr lang="en-US" sz="2800" dirty="0" smtClean="0"/>
+              <a:t>represents a well recognized steps (Phases) used in software assembly</a:t>
+            </a:r>
+          </a:p>
+          <a:p>
+            <a:pPr algn="l" rtl="0"/>
+            <a:r>
+              <a:rPr lang="en-US" sz="2800" dirty="0" smtClean="0"/>
+              <a:t>Each step in a lifecycle is called a </a:t>
+            </a:r>
+            <a:r>
+              <a:rPr lang="en-US" sz="2800" i="1" dirty="0" smtClean="0"/>
+              <a:t>phase.</a:t>
+            </a:r>
+            <a:r>
+              <a:rPr lang="en-US" sz="2800" dirty="0" smtClean="0"/>
+              <a:t> Zero or more </a:t>
+            </a:r>
+            <a:r>
+              <a:rPr lang="en-US" sz="2800" i="1" dirty="0" err="1" smtClean="0"/>
+              <a:t>plugin</a:t>
+            </a:r>
+            <a:r>
+              <a:rPr lang="en-US" sz="2800" i="1" dirty="0" smtClean="0"/>
+              <a:t> goals</a:t>
+            </a:r>
+            <a:r>
+              <a:rPr lang="en-US" sz="2800" dirty="0" smtClean="0"/>
+              <a:t> are bound to a phase.</a:t>
+            </a:r>
+          </a:p>
+          <a:p>
+            <a:pPr algn="l" rtl="0">
+              <a:buNone/>
+            </a:pPr>
+            <a:endParaRPr lang="en-US" sz="2800" dirty="0" smtClean="0"/>
+          </a:p>
+          <a:p>
+            <a:pPr algn="l" rtl="0">
+              <a:buNone/>
+            </a:pPr>
+            <a:endParaRPr lang="he-IL" dirty="0"/>
+          </a:p>
+        </p:txBody>
+      </p:sp>
+      <p:pic>
+        <p:nvPicPr>
+          <p:cNvPr id="4" name="תמונה 3" descr="lifecycle.png"/>
+          <p:cNvPicPr>
+            <a:picLocks noChangeAspect="1"/>
+          </p:cNvPicPr>
+          <p:nvPr/>
+        </p:nvPicPr>
+        <p:blipFill>
+          <a:blip r:embed="rId2"/>
+          <a:stretch>
+            <a:fillRect/>
+          </a:stretch>
+        </p:blipFill>
+        <p:spPr>
+          <a:xfrm>
+            <a:off x="3465020" y="3645003"/>
+            <a:ext cx="2035674" cy="2855831"/>
+          </a:xfrm>
+          <a:prstGeom prst="rect">
+            <a:avLst/>
+          </a:prstGeom>
+        </p:spPr>
+      </p:pic>
+      <p:sp>
+        <p:nvSpPr>
+          <p:cNvPr id="7" name="TextShape 1"/>
+          <p:cNvSpPr txBox="1"/>
+          <p:nvPr/>
+        </p:nvSpPr>
+        <p:spPr>
+          <a:xfrm>
+            <a:off x="457200" y="274680"/>
+            <a:ext cx="8229240" cy="1142640"/>
+          </a:xfrm>
+          <a:prstGeom prst="rect">
+            <a:avLst/>
+          </a:prstGeom>
+        </p:spPr>
+        <p:txBody>
+          <a:bodyPr anchor="ctr"/>
+          <a:lstStyle/>
+          <a:p>
+            <a:r>
+              <a:rPr lang="en-US" sz="3600" dirty="0">
+                <a:latin typeface="Calibri"/>
+              </a:rPr>
+              <a:t>Maven </a:t>
+            </a:r>
+            <a:r>
+              <a:rPr lang="en-US" sz="3600" dirty="0" smtClean="0">
+                <a:latin typeface="Calibri"/>
+              </a:rPr>
+              <a:t>– build lifecycles</a:t>
+            </a:r>
+            <a:endParaRPr dirty="0"/>
+          </a:p>
+        </p:txBody>
+      </p:sp>
+    </p:spTree>
+    <p:extLst>
+      <p:ext uri="{BB962C8B-B14F-4D97-AF65-F5344CB8AC3E}">
+        <p14:creationId xmlns:p14="http://schemas.microsoft.com/office/powerpoint/2010/main" val="3741408991"/>
+      </p:ext>
+    </p:extLst>
+  </p:cSld>
+  <p:clrMapOvr>
+    <a:masterClrMapping/>
+  </p:clrMapOvr>
+  <mc:AlternateContent xmlns:mc="http://schemas.openxmlformats.org/markup-compatibility/2006">
+    <mc:Choice xmlns:p14="http://schemas.microsoft.com/office/powerpoint/2010/main" Requires="p14">
+      <p:transition spd="slow" p14:dur="2000"/>
+    </mc:Choice>
+    <mc:Fallback>
+      <p:transition spd="slow"/>
+    </mc:Fallback>
+  </mc:AlternateContent>
+  <p:timing>
+    <p:tnLst>
+      <p:par>
+        <p:cTn id="1" dur="indefinite" restart="never" nodeType="tmRoot"/>
+      </p:par>
+    </p:tnLst>
+  </p:timing>
+</p:sld>
+</file>
+
 <file path=ppt/slides/slide16.xml><?xml version="1.0" encoding="utf-8"?>
 <p:sld xmlns:a="http://schemas.openxmlformats.org/drawingml/2006/main" xmlns:r="http://schemas.openxmlformats.org/officeDocument/2006/relationships" xmlns:p="http://schemas.openxmlformats.org/presentationml/2006/main" show="0">
   <p:cSld>
@@ -8832,11 +8838,11 @@
   <p:clrMapOvr>
     <a:masterClrMapping/>
   </p:clrMapOvr>
-  <mc:AlternateContent xmlns:mc="http://schemas.openxmlformats.org/markup-compatibility/2006">
-    <mc:Choice xmlns:p14="http://schemas.microsoft.com/office/powerpoint/2010/main" Requires="p14">
+  <mc:AlternateContent xmlns:mc="http://schemas.openxmlformats.org/markup-compatibility/2006" xmlns:p14="http://schemas.microsoft.com/office/powerpoint/2010/main">
+    <mc:Choice Requires="p14">
       <p:transition spd="slow" p14:dur="2000"/>
     </mc:Choice>
-    <mc:Fallback>
+    <mc:Fallback xmlns="">
       <p:transition spd="slow"/>
     </mc:Fallback>
   </mc:AlternateContent>
@@ -9285,7 +9291,6 @@
               <a:rPr lang="en-US" sz="2000" dirty="0" smtClean="0"/>
               <a:t>Module’s </a:t>
             </a:r>
-            <a:endParaRPr lang="en-US" sz="2000" dirty="0" smtClean="0"/>
           </a:p>
           <a:p>
             <a:r>
@@ -9360,7 +9365,6 @@
               <a:rPr lang="en-US" sz="2000" dirty="0" smtClean="0"/>
               <a:t>Module’s </a:t>
             </a:r>
-            <a:endParaRPr lang="en-US" sz="2000" dirty="0" smtClean="0"/>
           </a:p>
           <a:p>
             <a:r>
@@ -9459,11 +9463,11 @@
   <p:clrMapOvr>
     <a:masterClrMapping/>
   </p:clrMapOvr>
-  <mc:AlternateContent xmlns:mc="http://schemas.openxmlformats.org/markup-compatibility/2006">
-    <mc:Choice xmlns:p14="http://schemas.microsoft.com/office/powerpoint/2010/main" Requires="p14">
+  <mc:AlternateContent xmlns:mc="http://schemas.openxmlformats.org/markup-compatibility/2006" xmlns:p14="http://schemas.microsoft.com/office/powerpoint/2010/main">
+    <mc:Choice Requires="p14">
       <p:transition p14:dur="0"/>
     </mc:Choice>
-    <mc:Fallback>
+    <mc:Fallback xmlns="">
       <p:transition/>
     </mc:Fallback>
   </mc:AlternateContent>
@@ -10269,6 +10273,294 @@
 </file>
 
 <file path=ppt/slides/slide18.xml><?xml version="1.0" encoding="utf-8"?>
+<p:sld xmlns:a="http://schemas.openxmlformats.org/drawingml/2006/main" xmlns:r="http://schemas.openxmlformats.org/officeDocument/2006/relationships" xmlns:p="http://schemas.openxmlformats.org/presentationml/2006/main">
+  <p:cSld>
+    <p:spTree>
+      <p:nvGrpSpPr>
+        <p:cNvPr id="1" name=""/>
+        <p:cNvGrpSpPr/>
+        <p:nvPr/>
+      </p:nvGrpSpPr>
+      <p:grpSpPr>
+        <a:xfrm>
+          <a:off x="0" y="0"/>
+          <a:ext cx="0" cy="0"/>
+          <a:chOff x="0" y="0"/>
+          <a:chExt cx="0" cy="0"/>
+        </a:xfrm>
+      </p:grpSpPr>
+      <p:sp>
+        <p:nvSpPr>
+          <p:cNvPr id="7" name="TextShape 2"/>
+          <p:cNvSpPr txBox="1"/>
+          <p:nvPr/>
+        </p:nvSpPr>
+        <p:spPr>
+          <a:xfrm>
+            <a:off x="457200" y="1066800"/>
+            <a:ext cx="8229240" cy="4906560"/>
+          </a:xfrm>
+          <a:prstGeom prst="rect">
+            <a:avLst/>
+          </a:prstGeom>
+        </p:spPr>
+        <p:txBody>
+          <a:bodyPr/>
+          <a:lstStyle/>
+          <a:p>
+            <a:pPr marL="514350" indent="-514350">
+              <a:buAutoNum type="arabicPeriod"/>
+            </a:pPr>
+            <a:endParaRPr lang="en-US" sz="2800" dirty="0" smtClean="0"/>
+          </a:p>
+          <a:p>
+            <a:pPr marL="514350" indent="-514350">
+              <a:buAutoNum type="arabicPeriod"/>
+            </a:pPr>
+            <a:r>
+              <a:rPr lang="en-US" sz="2800" dirty="0" smtClean="0"/>
+              <a:t>Download 3</a:t>
+            </a:r>
+            <a:r>
+              <a:rPr lang="en-US" sz="2800" baseline="30000" dirty="0" smtClean="0"/>
+              <a:t>rd</a:t>
+            </a:r>
+            <a:r>
+              <a:rPr lang="en-US" sz="2800" dirty="0" smtClean="0"/>
+              <a:t> party dependencies</a:t>
+            </a:r>
+          </a:p>
+          <a:p>
+            <a:pPr marL="514350" indent="-514350">
+              <a:buAutoNum type="arabicPeriod"/>
+            </a:pPr>
+            <a:r>
+              <a:rPr lang="en-US" sz="2800" dirty="0" smtClean="0"/>
+              <a:t>Compile source code</a:t>
+            </a:r>
+          </a:p>
+          <a:p>
+            <a:pPr marL="514350" indent="-514350">
+              <a:buAutoNum type="arabicPeriod"/>
+            </a:pPr>
+            <a:r>
+              <a:rPr lang="en-US" sz="2800" dirty="0" smtClean="0"/>
+              <a:t>Run tests - optional</a:t>
+            </a:r>
+          </a:p>
+          <a:p>
+            <a:pPr marL="514350" indent="-514350">
+              <a:buAutoNum type="arabicPeriod"/>
+            </a:pPr>
+            <a:r>
+              <a:rPr lang="en-US" sz="2800" dirty="0" smtClean="0"/>
+              <a:t>Create distribution file (jar)</a:t>
+            </a:r>
+          </a:p>
+        </p:txBody>
+      </p:sp>
+      <p:sp>
+        <p:nvSpPr>
+          <p:cNvPr id="90" name="TextShape 1"/>
+          <p:cNvSpPr txBox="1"/>
+          <p:nvPr/>
+        </p:nvSpPr>
+        <p:spPr>
+          <a:xfrm>
+            <a:off x="457200" y="76200"/>
+            <a:ext cx="8229240" cy="1142640"/>
+          </a:xfrm>
+          <a:prstGeom prst="rect">
+            <a:avLst/>
+          </a:prstGeom>
+        </p:spPr>
+        <p:txBody>
+          <a:bodyPr anchor="ctr"/>
+          <a:lstStyle/>
+          <a:p>
+            <a:r>
+              <a:rPr lang="en-US" sz="3600" dirty="0"/>
+              <a:t>What does it takes to build a java app</a:t>
+            </a:r>
+            <a:r>
+              <a:rPr lang="en-US" sz="3600" dirty="0" smtClean="0"/>
+              <a:t>?</a:t>
+            </a:r>
+            <a:endParaRPr lang="en-US" sz="3600" dirty="0"/>
+          </a:p>
+        </p:txBody>
+      </p:sp>
+      <p:pic>
+        <p:nvPicPr>
+          <p:cNvPr id="3" name="תמונה 2"/>
+          <p:cNvPicPr>
+            <a:picLocks noChangeAspect="1"/>
+          </p:cNvPicPr>
+          <p:nvPr/>
+        </p:nvPicPr>
+        <p:blipFill>
+          <a:blip r:embed="rId2">
+            <a:extLst>
+              <a:ext uri="{28A0092B-C50C-407E-A947-70E740481C1C}">
+                <a14:useLocalDpi xmlns:a14="http://schemas.microsoft.com/office/drawing/2010/main" val="0"/>
+              </a:ext>
+            </a:extLst>
+          </a:blip>
+          <a:stretch>
+            <a:fillRect/>
+          </a:stretch>
+        </p:blipFill>
+        <p:spPr>
+          <a:xfrm>
+            <a:off x="5400675" y="1981200"/>
+            <a:ext cx="390525" cy="381000"/>
+          </a:xfrm>
+          <a:prstGeom prst="rect">
+            <a:avLst/>
+          </a:prstGeom>
+        </p:spPr>
+      </p:pic>
+      <p:pic>
+        <p:nvPicPr>
+          <p:cNvPr id="6" name="תמונה 5"/>
+          <p:cNvPicPr>
+            <a:picLocks noChangeAspect="1"/>
+          </p:cNvPicPr>
+          <p:nvPr/>
+        </p:nvPicPr>
+        <p:blipFill>
+          <a:blip r:embed="rId2">
+            <a:extLst>
+              <a:ext uri="{28A0092B-C50C-407E-A947-70E740481C1C}">
+                <a14:useLocalDpi xmlns:a14="http://schemas.microsoft.com/office/drawing/2010/main" val="0"/>
+              </a:ext>
+            </a:extLst>
+          </a:blip>
+          <a:stretch>
+            <a:fillRect/>
+          </a:stretch>
+        </p:blipFill>
+        <p:spPr>
+          <a:xfrm>
+            <a:off x="5400675" y="2438400"/>
+            <a:ext cx="390525" cy="381000"/>
+          </a:xfrm>
+          <a:prstGeom prst="rect">
+            <a:avLst/>
+          </a:prstGeom>
+        </p:spPr>
+      </p:pic>
+      <p:pic>
+        <p:nvPicPr>
+          <p:cNvPr id="8" name="תמונה 7"/>
+          <p:cNvPicPr>
+            <a:picLocks noChangeAspect="1"/>
+          </p:cNvPicPr>
+          <p:nvPr/>
+        </p:nvPicPr>
+        <p:blipFill>
+          <a:blip r:embed="rId2">
+            <a:extLst>
+              <a:ext uri="{28A0092B-C50C-407E-A947-70E740481C1C}">
+                <a14:useLocalDpi xmlns:a14="http://schemas.microsoft.com/office/drawing/2010/main" val="0"/>
+              </a:ext>
+            </a:extLst>
+          </a:blip>
+          <a:stretch>
+            <a:fillRect/>
+          </a:stretch>
+        </p:blipFill>
+        <p:spPr>
+          <a:xfrm>
+            <a:off x="5400675" y="2895600"/>
+            <a:ext cx="390525" cy="381000"/>
+          </a:xfrm>
+          <a:prstGeom prst="rect">
+            <a:avLst/>
+          </a:prstGeom>
+        </p:spPr>
+      </p:pic>
+      <p:pic>
+        <p:nvPicPr>
+          <p:cNvPr id="9" name="תמונה 8"/>
+          <p:cNvPicPr>
+            <a:picLocks noChangeAspect="1"/>
+          </p:cNvPicPr>
+          <p:nvPr/>
+        </p:nvPicPr>
+        <p:blipFill>
+          <a:blip r:embed="rId3">
+            <a:extLst>
+              <a:ext uri="{28A0092B-C50C-407E-A947-70E740481C1C}">
+                <a14:useLocalDpi xmlns:a14="http://schemas.microsoft.com/office/drawing/2010/main" val="0"/>
+              </a:ext>
+            </a:extLst>
+          </a:blip>
+          <a:stretch>
+            <a:fillRect/>
+          </a:stretch>
+        </p:blipFill>
+        <p:spPr>
+          <a:xfrm>
+            <a:off x="6019800" y="3620373"/>
+            <a:ext cx="2209800" cy="2856627"/>
+          </a:xfrm>
+          <a:prstGeom prst="rect">
+            <a:avLst/>
+          </a:prstGeom>
+        </p:spPr>
+      </p:pic>
+      <p:pic>
+        <p:nvPicPr>
+          <p:cNvPr id="10" name="תמונה 9"/>
+          <p:cNvPicPr>
+            <a:picLocks noChangeAspect="1"/>
+          </p:cNvPicPr>
+          <p:nvPr/>
+        </p:nvPicPr>
+        <p:blipFill>
+          <a:blip r:embed="rId2">
+            <a:extLst>
+              <a:ext uri="{28A0092B-C50C-407E-A947-70E740481C1C}">
+                <a14:useLocalDpi xmlns:a14="http://schemas.microsoft.com/office/drawing/2010/main" val="0"/>
+              </a:ext>
+            </a:extLst>
+          </a:blip>
+          <a:stretch>
+            <a:fillRect/>
+          </a:stretch>
+        </p:blipFill>
+        <p:spPr>
+          <a:xfrm>
+            <a:off x="6467475" y="1524000"/>
+            <a:ext cx="390525" cy="381000"/>
+          </a:xfrm>
+          <a:prstGeom prst="rect">
+            <a:avLst/>
+          </a:prstGeom>
+        </p:spPr>
+      </p:pic>
+    </p:spTree>
+    <p:extLst>
+      <p:ext uri="{BB962C8B-B14F-4D97-AF65-F5344CB8AC3E}">
+        <p14:creationId xmlns:p14="http://schemas.microsoft.com/office/powerpoint/2010/main" val="4222377892"/>
+      </p:ext>
+    </p:extLst>
+  </p:cSld>
+  <p:clrMapOvr>
+    <a:masterClrMapping/>
+  </p:clrMapOvr>
+  <p:timing>
+    <p:tnLst>
+      <p:par>
+        <p:cTn id="1" dur="indefinite" restart="never" nodeType="tmRoot"/>
+      </p:par>
+    </p:tnLst>
+  </p:timing>
+</p:sld>
+</file>
+
+<file path=ppt/slides/slide19.xml><?xml version="1.0" encoding="utf-8"?>
 <p:sld xmlns:a="http://schemas.openxmlformats.org/drawingml/2006/main" xmlns:r="http://schemas.openxmlformats.org/officeDocument/2006/relationships" xmlns:p="http://schemas.openxmlformats.org/presentationml/2006/main" show="0">
   <p:cSld>
     <p:spTree>
@@ -10901,11 +11193,11 @@
   <p:clrMapOvr>
     <a:masterClrMapping/>
   </p:clrMapOvr>
-  <mc:AlternateContent xmlns:mc="http://schemas.openxmlformats.org/markup-compatibility/2006">
-    <mc:Choice xmlns:p14="http://schemas.microsoft.com/office/powerpoint/2010/main" Requires="p14">
+  <mc:AlternateContent xmlns:mc="http://schemas.openxmlformats.org/markup-compatibility/2006" xmlns:p14="http://schemas.microsoft.com/office/powerpoint/2010/main">
+    <mc:Choice Requires="p14">
       <p:transition p14:dur="0"/>
     </mc:Choice>
-    <mc:Fallback>
+    <mc:Fallback xmlns="">
       <p:transition/>
     </mc:Fallback>
   </mc:AlternateContent>
@@ -10933,97 +11225,6 @@
             </p:seq>
           </p:childTnLst>
         </p:cTn>
-      </p:par>
-    </p:tnLst>
-  </p:timing>
-</p:sld>
-</file>
-
-<file path=ppt/slides/slide19.xml><?xml version="1.0" encoding="utf-8"?>
-<p:sld xmlns:a="http://schemas.openxmlformats.org/drawingml/2006/main" xmlns:r="http://schemas.openxmlformats.org/officeDocument/2006/relationships" xmlns:p="http://schemas.openxmlformats.org/presentationml/2006/main">
-  <p:cSld>
-    <p:spTree>
-      <p:nvGrpSpPr>
-        <p:cNvPr id="1" name=""/>
-        <p:cNvGrpSpPr/>
-        <p:nvPr/>
-      </p:nvGrpSpPr>
-      <p:grpSpPr>
-        <a:xfrm>
-          <a:off x="0" y="0"/>
-          <a:ext cx="0" cy="0"/>
-          <a:chOff x="0" y="0"/>
-          <a:chExt cx="0" cy="0"/>
-        </a:xfrm>
-      </p:grpSpPr>
-      <p:sp>
-        <p:nvSpPr>
-          <p:cNvPr id="4" name="Subtitle 3"/>
-          <p:cNvSpPr>
-            <a:spLocks noGrp="1"/>
-          </p:cNvSpPr>
-          <p:nvPr>
-            <p:ph type="subTitle"/>
-          </p:nvPr>
-        </p:nvSpPr>
-        <p:spPr/>
-        <p:txBody>
-          <a:bodyPr/>
-          <a:lstStyle/>
-          <a:p>
-            <a:pPr algn="l"/>
-            <a:r>
-              <a:rPr lang="en-US" sz="9600" dirty="0" smtClean="0">
-                <a:latin typeface="Calibri" panose="020F0502020204030204" pitchFamily="34" charset="0"/>
-                <a:cs typeface="Calibri" panose="020F0502020204030204" pitchFamily="34" charset="0"/>
-              </a:rPr>
-              <a:t>		Why </a:t>
-            </a:r>
-          </a:p>
-          <a:p>
-            <a:pPr algn="ctr"/>
-            <a:r>
-              <a:rPr lang="en-US" sz="9600" dirty="0">
-                <a:latin typeface="Calibri" panose="020F0502020204030204" pitchFamily="34" charset="0"/>
-                <a:cs typeface="Calibri" panose="020F0502020204030204" pitchFamily="34" charset="0"/>
-              </a:rPr>
-              <a:t>	</a:t>
-            </a:r>
-            <a:r>
-              <a:rPr lang="en-US" sz="9600" dirty="0" smtClean="0">
-                <a:latin typeface="Calibri" panose="020F0502020204030204" pitchFamily="34" charset="0"/>
-                <a:cs typeface="Calibri" panose="020F0502020204030204" pitchFamily="34" charset="0"/>
-              </a:rPr>
-              <a:t>	</a:t>
-            </a:r>
-            <a:r>
-              <a:rPr lang="en-US" sz="9600" dirty="0" smtClean="0">
-                <a:latin typeface="Calibri" panose="020F0502020204030204" pitchFamily="34" charset="0"/>
-                <a:cs typeface="Calibri" panose="020F0502020204030204" pitchFamily="34" charset="0"/>
-              </a:rPr>
-              <a:t>Gradle?</a:t>
-            </a:r>
-            <a:endParaRPr lang="en-US" sz="9600" dirty="0">
-              <a:latin typeface="Calibri" panose="020F0502020204030204" pitchFamily="34" charset="0"/>
-              <a:cs typeface="Calibri" panose="020F0502020204030204" pitchFamily="34" charset="0"/>
-            </a:endParaRPr>
-          </a:p>
-        </p:txBody>
-      </p:sp>
-    </p:spTree>
-    <p:extLst>
-      <p:ext uri="{BB962C8B-B14F-4D97-AF65-F5344CB8AC3E}">
-        <p14:creationId xmlns:p14="http://schemas.microsoft.com/office/powerpoint/2010/main" val="1492429301"/>
-      </p:ext>
-    </p:extLst>
-  </p:cSld>
-  <p:clrMapOvr>
-    <a:masterClrMapping/>
-  </p:clrMapOvr>
-  <p:timing>
-    <p:tnLst>
-      <p:par>
-        <p:cTn id="1" dur="indefinite" restart="never" nodeType="tmRoot"/>
       </p:par>
     </p:tnLst>
   </p:timing>
@@ -11206,6 +11407,90 @@
 </file>
 
 <file path=ppt/slides/slide20.xml><?xml version="1.0" encoding="utf-8"?>
+<p:sld xmlns:a="http://schemas.openxmlformats.org/drawingml/2006/main" xmlns:r="http://schemas.openxmlformats.org/officeDocument/2006/relationships" xmlns:p="http://schemas.openxmlformats.org/presentationml/2006/main">
+  <p:cSld>
+    <p:spTree>
+      <p:nvGrpSpPr>
+        <p:cNvPr id="1" name=""/>
+        <p:cNvGrpSpPr/>
+        <p:nvPr/>
+      </p:nvGrpSpPr>
+      <p:grpSpPr>
+        <a:xfrm>
+          <a:off x="0" y="0"/>
+          <a:ext cx="0" cy="0"/>
+          <a:chOff x="0" y="0"/>
+          <a:chExt cx="0" cy="0"/>
+        </a:xfrm>
+      </p:grpSpPr>
+      <p:sp>
+        <p:nvSpPr>
+          <p:cNvPr id="4" name="Subtitle 3"/>
+          <p:cNvSpPr>
+            <a:spLocks noGrp="1"/>
+          </p:cNvSpPr>
+          <p:nvPr>
+            <p:ph type="subTitle"/>
+          </p:nvPr>
+        </p:nvSpPr>
+        <p:spPr/>
+        <p:txBody>
+          <a:bodyPr/>
+          <a:lstStyle/>
+          <a:p>
+            <a:pPr algn="l"/>
+            <a:r>
+              <a:rPr lang="en-US" sz="9600" dirty="0" smtClean="0">
+                <a:latin typeface="Calibri" panose="020F0502020204030204" pitchFamily="34" charset="0"/>
+                <a:cs typeface="Calibri" panose="020F0502020204030204" pitchFamily="34" charset="0"/>
+              </a:rPr>
+              <a:t>		Why </a:t>
+            </a:r>
+          </a:p>
+          <a:p>
+            <a:pPr algn="ctr"/>
+            <a:r>
+              <a:rPr lang="en-US" sz="9600" dirty="0">
+                <a:latin typeface="Calibri" panose="020F0502020204030204" pitchFamily="34" charset="0"/>
+                <a:cs typeface="Calibri" panose="020F0502020204030204" pitchFamily="34" charset="0"/>
+              </a:rPr>
+              <a:t>	</a:t>
+            </a:r>
+            <a:r>
+              <a:rPr lang="en-US" sz="9600" dirty="0" smtClean="0">
+                <a:latin typeface="Calibri" panose="020F0502020204030204" pitchFamily="34" charset="0"/>
+                <a:cs typeface="Calibri" panose="020F0502020204030204" pitchFamily="34" charset="0"/>
+              </a:rPr>
+              <a:t>	Gradle?</a:t>
+            </a:r>
+            <a:endParaRPr lang="en-US" sz="9600" dirty="0">
+              <a:latin typeface="Calibri" panose="020F0502020204030204" pitchFamily="34" charset="0"/>
+              <a:cs typeface="Calibri" panose="020F0502020204030204" pitchFamily="34" charset="0"/>
+            </a:endParaRPr>
+          </a:p>
+        </p:txBody>
+      </p:sp>
+    </p:spTree>
+    <p:extLst>
+      <p:ext uri="{BB962C8B-B14F-4D97-AF65-F5344CB8AC3E}">
+        <p14:creationId xmlns:p14="http://schemas.microsoft.com/office/powerpoint/2010/main" val="1492429301"/>
+      </p:ext>
+    </p:extLst>
+  </p:cSld>
+  <p:clrMapOvr>
+    <a:masterClrMapping/>
+  </p:clrMapOvr>
+  <p:timing>
+    <p:tnLst>
+      <p:par>
+        <p:cTn id="1" dur="indefinite" restart="never" nodeType="tmRoot"/>
+      </p:par>
+    </p:tnLst>
+  </p:timing>
+</p:sld>
+</file>
+
+<file path=ppt/slides/slide21.xml><?xml version="1.0" encoding="utf-8"?>
 <p:sld xmlns:a="http://schemas.openxmlformats.org/drawingml/2006/main" xmlns:r="http://schemas.openxmlformats.org/officeDocument/2006/relationships" xmlns:p="http://schemas.openxmlformats.org/presentationml/2006/main" show="0">
   <p:cSld>
     <p:spTree>
@@ -11394,11 +11679,11 @@
   <p:clrMapOvr>
     <a:masterClrMapping/>
   </p:clrMapOvr>
-  <mc:AlternateContent xmlns:mc="http://schemas.openxmlformats.org/markup-compatibility/2006">
-    <mc:Choice xmlns:p14="http://schemas.microsoft.com/office/powerpoint/2010/main" Requires="p14">
+  <mc:AlternateContent xmlns:mc="http://schemas.openxmlformats.org/markup-compatibility/2006" xmlns:p14="http://schemas.microsoft.com/office/powerpoint/2010/main">
+    <mc:Choice Requires="p14">
       <p:transition spd="slow" p14:dur="2000"/>
     </mc:Choice>
-    <mc:Fallback>
+    <mc:Fallback xmlns="">
       <p:transition spd="slow"/>
     </mc:Fallback>
   </mc:AlternateContent>
@@ -11706,7 +11991,7 @@
 </p:sld>
 </file>
 
-<file path=ppt/slides/slide21.xml><?xml version="1.0" encoding="utf-8"?>
+<file path=ppt/slides/slide22.xml><?xml version="1.0" encoding="utf-8"?>
 <p:sld xmlns:a="http://schemas.openxmlformats.org/drawingml/2006/main" xmlns:r="http://schemas.openxmlformats.org/officeDocument/2006/relationships" xmlns:p="http://schemas.openxmlformats.org/presentationml/2006/main">
   <p:cSld>
     <p:spTree>
@@ -11746,13 +12031,7 @@
               <a:rPr lang="en-US" sz="3600" dirty="0" smtClean="0">
                 <a:latin typeface="Calibri"/>
               </a:rPr>
-              <a:t>Gradle - Personal </a:t>
-            </a:r>
-            <a:r>
-              <a:rPr lang="en-US" sz="3600" dirty="0" smtClean="0">
-                <a:latin typeface="Calibri"/>
-              </a:rPr>
-              <a:t>story</a:t>
+              <a:t>Gradle - Personal story</a:t>
             </a:r>
             <a:endParaRPr dirty="0"/>
           </a:p>
@@ -11908,12 +12187,6 @@
               </a:rPr>
               <a:t>1:30 hours</a:t>
             </a:r>
-            <a:endParaRPr lang="en-US" sz="3300" b="1" dirty="0" smtClean="0">
-              <a:solidFill>
-                <a:srgbClr val="FF0000"/>
-              </a:solidFill>
-              <a:latin typeface="Calibri"/>
-            </a:endParaRPr>
           </a:p>
           <a:p>
             <a:pPr marL="285750" indent="-285750">
@@ -11935,19 +12208,7 @@
               <a:rPr lang="en-US" sz="2000" dirty="0" smtClean="0">
                 <a:latin typeface="Calibri"/>
               </a:rPr>
-              <a:t>Hybrid </a:t>
-            </a:r>
-            <a:r>
-              <a:rPr lang="en-US" sz="2000" dirty="0" smtClean="0">
-                <a:latin typeface="Calibri"/>
-              </a:rPr>
-              <a:t>Gradle + Maven </a:t>
-            </a:r>
-            <a:r>
-              <a:rPr lang="en-US" sz="2000" dirty="0" smtClean="0">
-                <a:latin typeface="Calibri"/>
-              </a:rPr>
-              <a:t>build time - </a:t>
+              <a:t>Hybrid Gradle + Maven build time - </a:t>
             </a:r>
             <a:r>
               <a:rPr lang="en-US" sz="3600" b="1" dirty="0" smtClean="0">
@@ -11956,25 +12217,7 @@
                 </a:solidFill>
                 <a:latin typeface="Calibri"/>
               </a:rPr>
-              <a:t>12 </a:t>
-            </a:r>
-            <a:r>
-              <a:rPr lang="en-US" sz="3600" b="1" dirty="0" smtClean="0">
-                <a:solidFill>
-                  <a:srgbClr val="00B050"/>
-                </a:solidFill>
-                <a:latin typeface="Calibri"/>
-              </a:rPr>
-              <a:t>minutes </a:t>
-            </a:r>
-            <a:r>
-              <a:rPr lang="en-US" sz="3600" b="1" dirty="0" smtClean="0">
-                <a:solidFill>
-                  <a:srgbClr val="00B050"/>
-                </a:solidFill>
-                <a:latin typeface="Calibri"/>
-              </a:rPr>
-              <a:t>(on average)</a:t>
+              <a:t>12 minutes (on average)</a:t>
             </a:r>
             <a:endParaRPr lang="en-US" sz="2400" dirty="0" smtClean="0">
               <a:solidFill>
@@ -12039,7 +12282,7 @@
 </p:sld>
 </file>
 
-<file path=ppt/slides/slide22.xml><?xml version="1.0" encoding="utf-8"?>
+<file path=ppt/slides/slide23.xml><?xml version="1.0" encoding="utf-8"?>
 <p:sld xmlns:a="http://schemas.openxmlformats.org/drawingml/2006/main" xmlns:r="http://schemas.openxmlformats.org/officeDocument/2006/relationships" xmlns:p="http://schemas.openxmlformats.org/presentationml/2006/main">
   <p:cSld>
     <p:spTree>
@@ -12257,8 +12500,8 @@
 </p:sld>
 </file>
 
-<file path=ppt/slides/slide23.xml><?xml version="1.0" encoding="utf-8"?>
-<p:sld xmlns:a="http://schemas.openxmlformats.org/drawingml/2006/main" xmlns:r="http://schemas.openxmlformats.org/officeDocument/2006/relationships" xmlns:p="http://schemas.openxmlformats.org/presentationml/2006/main">
+<file path=ppt/slides/slide24.xml><?xml version="1.0" encoding="utf-8"?>
+<p:sld xmlns:a="http://schemas.openxmlformats.org/drawingml/2006/main" xmlns:r="http://schemas.openxmlformats.org/officeDocument/2006/relationships" xmlns:p="http://schemas.openxmlformats.org/presentationml/2006/main" show="0">
   <p:cSld>
     <p:spTree>
       <p:nvGrpSpPr>
@@ -12380,14 +12623,7 @@
                 <a:latin typeface="Calibri" panose="020F0502020204030204" pitchFamily="34" charset="0"/>
                 <a:cs typeface="Calibri" panose="020F0502020204030204" pitchFamily="34" charset="0"/>
               </a:rPr>
-              <a:t>Multi-module </a:t>
-            </a:r>
-            <a:r>
-              <a:rPr lang="en-US" sz="2400" dirty="0" smtClean="0">
-                <a:latin typeface="Calibri" panose="020F0502020204030204" pitchFamily="34" charset="0"/>
-                <a:cs typeface="Calibri" panose="020F0502020204030204" pitchFamily="34" charset="0"/>
-              </a:rPr>
-              <a:t>support</a:t>
+              <a:t>Multi-module support</a:t>
             </a:r>
           </a:p>
           <a:p>
@@ -12483,6 +12719,14 @@
   <p:clrMapOvr>
     <a:masterClrMapping/>
   </p:clrMapOvr>
+  <mc:AlternateContent xmlns:mc="http://schemas.openxmlformats.org/markup-compatibility/2006">
+    <mc:Choice xmlns:p14="http://schemas.microsoft.com/office/powerpoint/2010/main" Requires="p14">
+      <p:transition spd="slow" p14:dur="2000"/>
+    </mc:Choice>
+    <mc:Fallback>
+      <p:transition spd="slow"/>
+    </mc:Fallback>
+  </mc:AlternateContent>
   <p:timing>
     <p:tnLst>
       <p:par>
@@ -12513,7 +12757,7 @@
 </p:sld>
 </file>
 
-<file path=ppt/slides/slide24.xml><?xml version="1.0" encoding="utf-8"?>
+<file path=ppt/slides/slide25.xml><?xml version="1.0" encoding="utf-8"?>
 <p:sld xmlns:a="http://schemas.openxmlformats.org/drawingml/2006/main" xmlns:r="http://schemas.openxmlformats.org/officeDocument/2006/relationships" xmlns:p="http://schemas.openxmlformats.org/presentationml/2006/main" show="0">
   <p:cSld>
     <p:spTree>
@@ -12682,11 +12926,11 @@
   <p:clrMapOvr>
     <a:masterClrMapping/>
   </p:clrMapOvr>
-  <mc:AlternateContent xmlns:mc="http://schemas.openxmlformats.org/markup-compatibility/2006">
-    <mc:Choice xmlns:p14="http://schemas.microsoft.com/office/powerpoint/2010/main" Requires="p14">
+  <mc:AlternateContent xmlns:mc="http://schemas.openxmlformats.org/markup-compatibility/2006" xmlns:p14="http://schemas.microsoft.com/office/powerpoint/2010/main">
+    <mc:Choice Requires="p14">
       <p:transition spd="slow" p14:dur="2000"/>
     </mc:Choice>
-    <mc:Fallback>
+    <mc:Fallback xmlns="">
       <p:transition spd="slow"/>
     </mc:Fallback>
   </mc:AlternateContent>
@@ -12700,7 +12944,7 @@
 </p:sld>
 </file>
 
-<file path=ppt/slides/slide25.xml><?xml version="1.0" encoding="utf-8"?>
+<file path=ppt/slides/slide26.xml><?xml version="1.0" encoding="utf-8"?>
 <p:sld xmlns:a="http://schemas.openxmlformats.org/drawingml/2006/main" xmlns:r="http://schemas.openxmlformats.org/officeDocument/2006/relationships" xmlns:p="http://schemas.openxmlformats.org/presentationml/2006/main" show="0">
   <p:cSld>
     <p:spTree>
@@ -12830,11 +13074,11 @@
   <p:clrMapOvr>
     <a:masterClrMapping/>
   </p:clrMapOvr>
-  <mc:AlternateContent xmlns:mc="http://schemas.openxmlformats.org/markup-compatibility/2006">
-    <mc:Choice xmlns:p14="http://schemas.microsoft.com/office/powerpoint/2010/main" Requires="p14">
+  <mc:AlternateContent xmlns:mc="http://schemas.openxmlformats.org/markup-compatibility/2006" xmlns:p14="http://schemas.microsoft.com/office/powerpoint/2010/main">
+    <mc:Choice Requires="p14">
       <p:transition spd="slow" p14:dur="2000"/>
     </mc:Choice>
-    <mc:Fallback>
+    <mc:Fallback xmlns="">
       <p:transition spd="slow"/>
     </mc:Fallback>
   </mc:AlternateContent>
@@ -12868,7 +13112,7 @@
 </p:sld>
 </file>
 
-<file path=ppt/slides/slide26.xml><?xml version="1.0" encoding="utf-8"?>
+<file path=ppt/slides/slide27.xml><?xml version="1.0" encoding="utf-8"?>
 <p:sld xmlns:a="http://schemas.openxmlformats.org/drawingml/2006/main" xmlns:r="http://schemas.openxmlformats.org/officeDocument/2006/relationships" xmlns:p="http://schemas.openxmlformats.org/presentationml/2006/main" show="0">
   <p:cSld>
     <p:spTree>
@@ -13157,11 +13401,11 @@
   <p:clrMapOvr>
     <a:masterClrMapping/>
   </p:clrMapOvr>
-  <mc:AlternateContent xmlns:mc="http://schemas.openxmlformats.org/markup-compatibility/2006">
-    <mc:Choice xmlns:p14="http://schemas.microsoft.com/office/powerpoint/2010/main" Requires="p14">
+  <mc:AlternateContent xmlns:mc="http://schemas.openxmlformats.org/markup-compatibility/2006" xmlns:p14="http://schemas.microsoft.com/office/powerpoint/2010/main">
+    <mc:Choice Requires="p14">
       <p:transition spd="slow" p14:dur="2000"/>
     </mc:Choice>
-    <mc:Fallback>
+    <mc:Fallback xmlns="">
       <p:transition spd="slow"/>
     </mc:Fallback>
   </mc:AlternateContent>
@@ -13325,7 +13569,7 @@
 </p:sld>
 </file>
 
-<file path=ppt/slides/slide27.xml><?xml version="1.0" encoding="utf-8"?>
+<file path=ppt/slides/slide28.xml><?xml version="1.0" encoding="utf-8"?>
 <p:sld xmlns:a="http://schemas.openxmlformats.org/drawingml/2006/main" xmlns:r="http://schemas.openxmlformats.org/officeDocument/2006/relationships" xmlns:p="http://schemas.openxmlformats.org/presentationml/2006/main" show="0">
   <p:cSld>
     <p:spTree>
@@ -15223,7 +15467,7 @@
 </p:sld>
 </file>
 
-<file path=ppt/slides/slide28.xml><?xml version="1.0" encoding="utf-8"?>
+<file path=ppt/slides/slide29.xml><?xml version="1.0" encoding="utf-8"?>
 <p:sld xmlns:a="http://schemas.openxmlformats.org/drawingml/2006/main" xmlns:r="http://schemas.openxmlformats.org/officeDocument/2006/relationships" xmlns:p="http://schemas.openxmlformats.org/presentationml/2006/main">
   <p:cSld>
     <p:spTree>
@@ -15942,81 +16186,14 @@
   <p:clrMapOvr>
     <a:masterClrMapping/>
   </p:clrMapOvr>
-  <mc:AlternateContent xmlns:mc="http://schemas.openxmlformats.org/markup-compatibility/2006">
-    <mc:Choice xmlns:p14="http://schemas.microsoft.com/office/powerpoint/2010/main" Requires="p14">
+  <mc:AlternateContent xmlns:mc="http://schemas.openxmlformats.org/markup-compatibility/2006" xmlns:p14="http://schemas.microsoft.com/office/powerpoint/2010/main">
+    <mc:Choice Requires="p14">
       <p:transition spd="slow" p14:dur="2000"/>
     </mc:Choice>
-    <mc:Fallback>
+    <mc:Fallback xmlns="">
       <p:transition spd="slow"/>
     </mc:Fallback>
   </mc:AlternateContent>
-  <p:timing>
-    <p:tnLst>
-      <p:par>
-        <p:cTn id="1" dur="indefinite" restart="never" nodeType="tmRoot"/>
-      </p:par>
-    </p:tnLst>
-  </p:timing>
-</p:sld>
-</file>
-
-<file path=ppt/slides/slide29.xml><?xml version="1.0" encoding="utf-8"?>
-<p:sld xmlns:a="http://schemas.openxmlformats.org/drawingml/2006/main" xmlns:r="http://schemas.openxmlformats.org/officeDocument/2006/relationships" xmlns:p="http://schemas.openxmlformats.org/presentationml/2006/main">
-  <p:cSld>
-    <p:spTree>
-      <p:nvGrpSpPr>
-        <p:cNvPr id="1" name=""/>
-        <p:cNvGrpSpPr/>
-        <p:nvPr/>
-      </p:nvGrpSpPr>
-      <p:grpSpPr>
-        <a:xfrm>
-          <a:off x="0" y="0"/>
-          <a:ext cx="0" cy="0"/>
-          <a:chOff x="0" y="0"/>
-          <a:chExt cx="0" cy="0"/>
-        </a:xfrm>
-      </p:grpSpPr>
-      <p:sp>
-        <p:nvSpPr>
-          <p:cNvPr id="4" name="Subtitle 3"/>
-          <p:cNvSpPr>
-            <a:spLocks noGrp="1"/>
-          </p:cNvSpPr>
-          <p:nvPr>
-            <p:ph type="subTitle"/>
-          </p:nvPr>
-        </p:nvSpPr>
-        <p:spPr/>
-        <p:txBody>
-          <a:bodyPr/>
-          <a:lstStyle/>
-          <a:p>
-            <a:pPr algn="ctr"/>
-            <a:r>
-              <a:rPr lang="en-US" sz="9600" dirty="0" smtClean="0">
-                <a:latin typeface="Calibri" panose="020F0502020204030204" pitchFamily="34" charset="0"/>
-                <a:cs typeface="Calibri" panose="020F0502020204030204" pitchFamily="34" charset="0"/>
-              </a:rPr>
-              <a:t>DEMO</a:t>
-            </a:r>
-            <a:endParaRPr lang="en-US" sz="9600" dirty="0">
-              <a:latin typeface="Calibri" panose="020F0502020204030204" pitchFamily="34" charset="0"/>
-              <a:cs typeface="Calibri" panose="020F0502020204030204" pitchFamily="34" charset="0"/>
-            </a:endParaRPr>
-          </a:p>
-        </p:txBody>
-      </p:sp>
-    </p:spTree>
-    <p:extLst>
-      <p:ext uri="{BB962C8B-B14F-4D97-AF65-F5344CB8AC3E}">
-        <p14:creationId xmlns:p14="http://schemas.microsoft.com/office/powerpoint/2010/main" val="2938910008"/>
-      </p:ext>
-    </p:extLst>
-  </p:cSld>
-  <p:clrMapOvr>
-    <a:masterClrMapping/>
-  </p:clrMapOvr>
   <p:timing>
     <p:tnLst>
       <p:par>
@@ -16169,9 +16346,6 @@
               </a:rPr>
               <a:t>Personal story</a:t>
             </a:r>
-            <a:endParaRPr lang="en-US" sz="2800" dirty="0" smtClean="0">
-              <a:latin typeface="Calibri"/>
-            </a:endParaRPr>
           </a:p>
           <a:p>
             <a:pPr>
@@ -16325,6 +16499,469 @@
                 <a:latin typeface="Calibri" panose="020F0502020204030204" pitchFamily="34" charset="0"/>
                 <a:cs typeface="Calibri" panose="020F0502020204030204" pitchFamily="34" charset="0"/>
               </a:rPr>
+              <a:t>DEMO</a:t>
+            </a:r>
+            <a:endParaRPr lang="en-US" sz="9600" dirty="0">
+              <a:latin typeface="Calibri" panose="020F0502020204030204" pitchFamily="34" charset="0"/>
+              <a:cs typeface="Calibri" panose="020F0502020204030204" pitchFamily="34" charset="0"/>
+            </a:endParaRPr>
+          </a:p>
+        </p:txBody>
+      </p:sp>
+    </p:spTree>
+    <p:extLst>
+      <p:ext uri="{BB962C8B-B14F-4D97-AF65-F5344CB8AC3E}">
+        <p14:creationId xmlns:p14="http://schemas.microsoft.com/office/powerpoint/2010/main" val="2938910008"/>
+      </p:ext>
+    </p:extLst>
+  </p:cSld>
+  <p:clrMapOvr>
+    <a:masterClrMapping/>
+  </p:clrMapOvr>
+  <p:timing>
+    <p:tnLst>
+      <p:par>
+        <p:cTn id="1" dur="indefinite" restart="never" nodeType="tmRoot"/>
+      </p:par>
+    </p:tnLst>
+  </p:timing>
+</p:sld>
+</file>
+
+<file path=ppt/slides/slide31.xml><?xml version="1.0" encoding="utf-8"?>
+<p:sld xmlns:a="http://schemas.openxmlformats.org/drawingml/2006/main" xmlns:r="http://schemas.openxmlformats.org/officeDocument/2006/relationships" xmlns:p="http://schemas.openxmlformats.org/presentationml/2006/main">
+  <p:cSld>
+    <p:spTree>
+      <p:nvGrpSpPr>
+        <p:cNvPr id="1" name=""/>
+        <p:cNvGrpSpPr/>
+        <p:nvPr/>
+      </p:nvGrpSpPr>
+      <p:grpSpPr>
+        <a:xfrm>
+          <a:off x="0" y="0"/>
+          <a:ext cx="0" cy="0"/>
+          <a:chOff x="0" y="0"/>
+          <a:chExt cx="0" cy="0"/>
+        </a:xfrm>
+      </p:grpSpPr>
+      <p:sp>
+        <p:nvSpPr>
+          <p:cNvPr id="108" name="TextShape 1"/>
+          <p:cNvSpPr txBox="1"/>
+          <p:nvPr/>
+        </p:nvSpPr>
+        <p:spPr>
+          <a:xfrm>
+            <a:off x="457200" y="274680"/>
+            <a:ext cx="8229240" cy="1142640"/>
+          </a:xfrm>
+          <a:prstGeom prst="rect">
+            <a:avLst/>
+          </a:prstGeom>
+        </p:spPr>
+        <p:txBody>
+          <a:bodyPr anchor="ctr"/>
+          <a:lstStyle/>
+          <a:p>
+            <a:r>
+              <a:rPr lang="en-US" sz="3600" dirty="0">
+                <a:latin typeface="Calibri"/>
+              </a:rPr>
+              <a:t>Gradle – </a:t>
+            </a:r>
+            <a:r>
+              <a:rPr lang="en-US" sz="3600" dirty="0" smtClean="0">
+                <a:latin typeface="Calibri"/>
+              </a:rPr>
+              <a:t>Resources</a:t>
+            </a:r>
+            <a:endParaRPr dirty="0"/>
+          </a:p>
+        </p:txBody>
+      </p:sp>
+      <p:sp>
+        <p:nvSpPr>
+          <p:cNvPr id="109" name="TextShape 2"/>
+          <p:cNvSpPr txBox="1"/>
+          <p:nvPr/>
+        </p:nvSpPr>
+        <p:spPr>
+          <a:xfrm>
+            <a:off x="152400" y="1447800"/>
+            <a:ext cx="8763000" cy="5029200"/>
+          </a:xfrm>
+          <a:prstGeom prst="rect">
+            <a:avLst/>
+          </a:prstGeom>
+        </p:spPr>
+        <p:txBody>
+          <a:bodyPr/>
+          <a:lstStyle/>
+          <a:p>
+            <a:pPr marL="342900" indent="-342900">
+              <a:buSzPct val="45000"/>
+              <a:buFont typeface="Arial" panose="020B0604020202020204" pitchFamily="34" charset="0"/>
+              <a:buChar char="•"/>
+            </a:pPr>
+            <a:r>
+              <a:rPr lang="en-US" sz="2000" dirty="0" smtClean="0"/>
+              <a:t>Documentation:</a:t>
+            </a:r>
+          </a:p>
+          <a:p>
+            <a:pPr lvl="1">
+              <a:buSzPct val="45000"/>
+            </a:pPr>
+            <a:endParaRPr lang="en-US" sz="1200" dirty="0" smtClean="0"/>
+          </a:p>
+          <a:p>
+            <a:pPr marL="800100" lvl="1" indent="-342900">
+              <a:buSzPct val="45000"/>
+              <a:buFont typeface="Arial" panose="020B0604020202020204" pitchFamily="34" charset="0"/>
+              <a:buChar char="•"/>
+            </a:pPr>
+            <a:r>
+              <a:rPr lang="en-US" sz="2000" dirty="0" smtClean="0"/>
+              <a:t>User guide: </a:t>
+            </a:r>
+            <a:r>
+              <a:rPr lang="en-US" sz="2000" dirty="0">
+                <a:hlinkClick r:id="rId2"/>
+              </a:rPr>
+              <a:t>http://</a:t>
+            </a:r>
+            <a:r>
+              <a:rPr lang="en-US" sz="2000" dirty="0" smtClean="0">
+                <a:hlinkClick r:id="rId2"/>
+              </a:rPr>
+              <a:t>www.gradle.org/docs/current/userguide/userguide.html</a:t>
+            </a:r>
+            <a:endParaRPr lang="en-US" sz="2000" dirty="0" smtClean="0"/>
+          </a:p>
+          <a:p>
+            <a:pPr lvl="1">
+              <a:buSzPct val="45000"/>
+            </a:pPr>
+            <a:endParaRPr lang="en-US" sz="1200" dirty="0"/>
+          </a:p>
+          <a:p>
+            <a:pPr marL="800100" lvl="1" indent="-342900">
+              <a:buSzPct val="45000"/>
+              <a:buFont typeface="Arial" panose="020B0604020202020204" pitchFamily="34" charset="0"/>
+              <a:buChar char="•"/>
+            </a:pPr>
+            <a:r>
+              <a:rPr lang="en-US" sz="2000" dirty="0" smtClean="0"/>
+              <a:t>DSL:</a:t>
+            </a:r>
+          </a:p>
+          <a:p>
+            <a:pPr lvl="1">
+              <a:buSzPct val="45000"/>
+            </a:pPr>
+            <a:r>
+              <a:rPr lang="en-US" sz="2000" dirty="0"/>
+              <a:t> </a:t>
+            </a:r>
+            <a:r>
+              <a:rPr lang="en-US" sz="2000" dirty="0" smtClean="0"/>
+              <a:t>    </a:t>
+            </a:r>
+            <a:r>
+              <a:rPr lang="en-US" sz="2000" dirty="0" smtClean="0">
+                <a:hlinkClick r:id="rId3"/>
+              </a:rPr>
+              <a:t>http</a:t>
+            </a:r>
+            <a:r>
+              <a:rPr lang="en-US" sz="2000" dirty="0">
+                <a:hlinkClick r:id="rId3"/>
+              </a:rPr>
+              <a:t>://www.gradle.org/docs/current/dsl</a:t>
+            </a:r>
+            <a:r>
+              <a:rPr lang="en-US" sz="2000" dirty="0" smtClean="0">
+                <a:hlinkClick r:id="rId3"/>
+              </a:rPr>
+              <a:t>/</a:t>
+            </a:r>
+            <a:endParaRPr lang="en-US" sz="2000" dirty="0" smtClean="0"/>
+          </a:p>
+          <a:p>
+            <a:pPr lvl="1">
+              <a:buSzPct val="45000"/>
+            </a:pPr>
+            <a:endParaRPr lang="en-US" sz="1200" dirty="0" smtClean="0"/>
+          </a:p>
+          <a:p>
+            <a:pPr marL="800100" lvl="1" indent="-342900">
+              <a:buSzPct val="45000"/>
+              <a:buFont typeface="Arial" panose="020B0604020202020204" pitchFamily="34" charset="0"/>
+              <a:buChar char="•"/>
+            </a:pPr>
+            <a:r>
+              <a:rPr lang="en-US" sz="2000" dirty="0" smtClean="0"/>
+              <a:t>Javadoc:</a:t>
+            </a:r>
+          </a:p>
+          <a:p>
+            <a:pPr lvl="1">
+              <a:buSzPct val="45000"/>
+            </a:pPr>
+            <a:r>
+              <a:rPr lang="en-US" sz="2000" dirty="0" smtClean="0"/>
+              <a:t>     </a:t>
+            </a:r>
+            <a:r>
+              <a:rPr lang="en-US" sz="2000" dirty="0">
+                <a:hlinkClick r:id="rId3"/>
+              </a:rPr>
+              <a:t>http://www.gradle.org/docs/current/dsl</a:t>
+            </a:r>
+            <a:r>
+              <a:rPr lang="en-US" sz="2000" dirty="0" smtClean="0">
+                <a:hlinkClick r:id="rId3"/>
+              </a:rPr>
+              <a:t>/</a:t>
+            </a:r>
+            <a:endParaRPr lang="en-US" sz="2000" dirty="0" smtClean="0"/>
+          </a:p>
+          <a:p>
+            <a:pPr lvl="1">
+              <a:buSzPct val="45000"/>
+            </a:pPr>
+            <a:endParaRPr lang="en-US" sz="1200" dirty="0"/>
+          </a:p>
+          <a:p>
+            <a:pPr marL="800100" lvl="1" indent="-342900">
+              <a:buSzPct val="45000"/>
+              <a:buFont typeface="Arial" panose="020B0604020202020204" pitchFamily="34" charset="0"/>
+              <a:buChar char="•"/>
+            </a:pPr>
+            <a:r>
+              <a:rPr lang="en-US" sz="2000" dirty="0"/>
+              <a:t>Groovy </a:t>
+            </a:r>
+            <a:r>
+              <a:rPr lang="en-US" sz="2000" dirty="0" smtClean="0"/>
+              <a:t>Doc:</a:t>
+            </a:r>
+          </a:p>
+          <a:p>
+            <a:pPr lvl="1">
+              <a:buSzPct val="45000"/>
+            </a:pPr>
+            <a:r>
+              <a:rPr lang="en-US" sz="2000" dirty="0" smtClean="0"/>
+              <a:t>     </a:t>
+            </a:r>
+            <a:r>
+              <a:rPr lang="en-US" sz="2000" dirty="0">
+                <a:hlinkClick r:id="rId4"/>
+              </a:rPr>
+              <a:t>http://www.gradle.org/docs/current/groovydoc/</a:t>
+            </a:r>
+            <a:endParaRPr lang="en-US" dirty="0" smtClean="0"/>
+          </a:p>
+          <a:p>
+            <a:pPr lvl="1">
+              <a:buSzPct val="45000"/>
+            </a:pPr>
+            <a:r>
+              <a:rPr lang="en-US" sz="2000" dirty="0" smtClean="0"/>
+              <a:t>   </a:t>
+            </a:r>
+            <a:endParaRPr lang="en-US" sz="2000" dirty="0" smtClean="0"/>
+          </a:p>
+          <a:p>
+            <a:pPr marL="342900" indent="-342900">
+              <a:buSzPct val="45000"/>
+              <a:buFont typeface="Arial" panose="020B0604020202020204" pitchFamily="34" charset="0"/>
+              <a:buChar char="•"/>
+            </a:pPr>
+            <a:r>
+              <a:rPr lang="en-US" sz="2000" dirty="0"/>
+              <a:t>Plugin </a:t>
+            </a:r>
+            <a:r>
+              <a:rPr lang="en-US" sz="2000" dirty="0" smtClean="0"/>
+              <a:t>search: </a:t>
+            </a:r>
+            <a:r>
+              <a:rPr lang="en-US" sz="2000" dirty="0">
+                <a:hlinkClick r:id="rId5"/>
+              </a:rPr>
+              <a:t>https://plugins.gradle.org</a:t>
+            </a:r>
+            <a:r>
+              <a:rPr lang="en-US" sz="2000" dirty="0" smtClean="0">
+                <a:hlinkClick r:id="rId5"/>
+              </a:rPr>
+              <a:t>/</a:t>
+            </a:r>
+            <a:endParaRPr lang="en-US" sz="2000" dirty="0" smtClean="0"/>
+          </a:p>
+          <a:p>
+            <a:pPr marL="342900" indent="-342900">
+              <a:buSzPct val="45000"/>
+              <a:buFont typeface="Arial" panose="020B0604020202020204" pitchFamily="34" charset="0"/>
+              <a:buChar char="•"/>
+            </a:pPr>
+            <a:endParaRPr lang="en-US" sz="2000" dirty="0" smtClean="0"/>
+          </a:p>
+          <a:p>
+            <a:pPr>
+              <a:buSzPct val="45000"/>
+            </a:pPr>
+            <a:endParaRPr sz="2000" dirty="0">
+              <a:solidFill>
+                <a:srgbClr val="0070C0"/>
+              </a:solidFill>
+            </a:endParaRPr>
+          </a:p>
+        </p:txBody>
+      </p:sp>
+    </p:spTree>
+    <p:extLst>
+      <p:ext uri="{BB962C8B-B14F-4D97-AF65-F5344CB8AC3E}">
+        <p14:creationId xmlns:p14="http://schemas.microsoft.com/office/powerpoint/2010/main" val="3619970965"/>
+      </p:ext>
+    </p:extLst>
+  </p:cSld>
+  <p:clrMapOvr>
+    <a:masterClrMapping/>
+  </p:clrMapOvr>
+  <mc:AlternateContent xmlns:mc="http://schemas.openxmlformats.org/markup-compatibility/2006" xmlns:p14="http://schemas.microsoft.com/office/powerpoint/2010/main">
+    <mc:Choice Requires="p14">
+      <p:transition spd="slow" p14:dur="2000"/>
+    </mc:Choice>
+    <mc:Fallback xmlns="">
+      <p:transition spd="slow"/>
+    </mc:Fallback>
+  </mc:AlternateContent>
+  <p:timing>
+    <p:tnLst>
+      <p:par>
+        <p:cTn id="1" dur="indefinite" restart="never" nodeType="tmRoot"/>
+      </p:par>
+    </p:tnLst>
+  </p:timing>
+</p:sld>
+</file>
+
+<file path=ppt/slides/slide32.xml><?xml version="1.0" encoding="utf-8"?>
+<p:sld xmlns:a="http://schemas.openxmlformats.org/drawingml/2006/main" xmlns:r="http://schemas.openxmlformats.org/officeDocument/2006/relationships" xmlns:p="http://schemas.openxmlformats.org/presentationml/2006/main">
+  <p:cSld>
+    <p:spTree>
+      <p:nvGrpSpPr>
+        <p:cNvPr id="1" name=""/>
+        <p:cNvGrpSpPr/>
+        <p:nvPr/>
+      </p:nvGrpSpPr>
+      <p:grpSpPr>
+        <a:xfrm>
+          <a:off x="0" y="0"/>
+          <a:ext cx="0" cy="0"/>
+          <a:chOff x="0" y="0"/>
+          <a:chExt cx="0" cy="0"/>
+        </a:xfrm>
+      </p:grpSpPr>
+      <p:sp>
+        <p:nvSpPr>
+          <p:cNvPr id="4" name="Subtitle 3"/>
+          <p:cNvSpPr>
+            <a:spLocks noGrp="1"/>
+          </p:cNvSpPr>
+          <p:nvPr>
+            <p:ph type="subTitle"/>
+          </p:nvPr>
+        </p:nvSpPr>
+        <p:spPr/>
+        <p:txBody>
+          <a:bodyPr/>
+          <a:lstStyle/>
+          <a:p>
+            <a:pPr algn="ctr"/>
+            <a:r>
+              <a:rPr lang="en-US" sz="9600" dirty="0" err="1" smtClean="0">
+                <a:latin typeface="Calibri" panose="020F0502020204030204" pitchFamily="34" charset="0"/>
+                <a:cs typeface="Calibri" panose="020F0502020204030204" pitchFamily="34" charset="0"/>
+              </a:rPr>
+              <a:t>Gradle</a:t>
+            </a:r>
+            <a:r>
+              <a:rPr lang="en-US" sz="9600" dirty="0" smtClean="0">
+                <a:latin typeface="Calibri" panose="020F0502020204030204" pitchFamily="34" charset="0"/>
+                <a:cs typeface="Calibri" panose="020F0502020204030204" pitchFamily="34" charset="0"/>
+              </a:rPr>
+              <a:t> @Citi Innovation lab</a:t>
+            </a:r>
+            <a:endParaRPr lang="en-US" sz="9600" dirty="0">
+              <a:latin typeface="Calibri" panose="020F0502020204030204" pitchFamily="34" charset="0"/>
+              <a:cs typeface="Calibri" panose="020F0502020204030204" pitchFamily="34" charset="0"/>
+            </a:endParaRPr>
+          </a:p>
+        </p:txBody>
+      </p:sp>
+    </p:spTree>
+    <p:extLst>
+      <p:ext uri="{BB962C8B-B14F-4D97-AF65-F5344CB8AC3E}">
+        <p14:creationId xmlns:p14="http://schemas.microsoft.com/office/powerpoint/2010/main" val="607593374"/>
+      </p:ext>
+    </p:extLst>
+  </p:cSld>
+  <p:clrMapOvr>
+    <a:masterClrMapping/>
+  </p:clrMapOvr>
+  <p:timing>
+    <p:tnLst>
+      <p:par>
+        <p:cTn id="1" dur="indefinite" restart="never" nodeType="tmRoot"/>
+      </p:par>
+    </p:tnLst>
+  </p:timing>
+</p:sld>
+</file>
+
+<file path=ppt/slides/slide33.xml><?xml version="1.0" encoding="utf-8"?>
+<p:sld xmlns:a="http://schemas.openxmlformats.org/drawingml/2006/main" xmlns:r="http://schemas.openxmlformats.org/officeDocument/2006/relationships" xmlns:p="http://schemas.openxmlformats.org/presentationml/2006/main">
+  <p:cSld>
+    <p:spTree>
+      <p:nvGrpSpPr>
+        <p:cNvPr id="1" name=""/>
+        <p:cNvGrpSpPr/>
+        <p:nvPr/>
+      </p:nvGrpSpPr>
+      <p:grpSpPr>
+        <a:xfrm>
+          <a:off x="0" y="0"/>
+          <a:ext cx="0" cy="0"/>
+          <a:chOff x="0" y="0"/>
+          <a:chExt cx="0" cy="0"/>
+        </a:xfrm>
+      </p:grpSpPr>
+      <p:sp>
+        <p:nvSpPr>
+          <p:cNvPr id="4" name="Subtitle 3"/>
+          <p:cNvSpPr>
+            <a:spLocks noGrp="1"/>
+          </p:cNvSpPr>
+          <p:nvPr>
+            <p:ph type="subTitle"/>
+          </p:nvPr>
+        </p:nvSpPr>
+        <p:spPr/>
+        <p:txBody>
+          <a:bodyPr/>
+          <a:lstStyle/>
+          <a:p>
+            <a:pPr algn="ctr"/>
+            <a:r>
+              <a:rPr lang="en-US" sz="9600" dirty="0" smtClean="0">
+                <a:latin typeface="Calibri" panose="020F0502020204030204" pitchFamily="34" charset="0"/>
+                <a:cs typeface="Calibri" panose="020F0502020204030204" pitchFamily="34" charset="0"/>
+              </a:rPr>
               <a:t>Summary</a:t>
             </a:r>
             <a:endParaRPr lang="en-US" sz="9600" dirty="0">
@@ -16354,7 +16991,7 @@
 </p:sld>
 </file>
 
-<file path=ppt/slides/slide31.xml><?xml version="1.0" encoding="utf-8"?>
+<file path=ppt/slides/slide34.xml><?xml version="1.0" encoding="utf-8"?>
 <p:sld xmlns:a="http://schemas.openxmlformats.org/drawingml/2006/main" xmlns:r="http://schemas.openxmlformats.org/officeDocument/2006/relationships" xmlns:p="http://schemas.openxmlformats.org/presentationml/2006/main">
   <p:cSld>
     <p:spTree>
@@ -16638,18 +17275,7 @@
                           <a:ea typeface="+mn-ea"/>
                           <a:cs typeface="+mn-cs"/>
                         </a:rPr>
-                        <a:t>“Magic</a:t>
-                      </a:r>
-                      <a:r>
-                        <a:rPr lang="en-US" sz="1600" dirty="0" smtClean="0">
-                          <a:solidFill>
-                            <a:schemeClr val="dk1"/>
-                          </a:solidFill>
-                          <a:latin typeface="+mn-lt"/>
-                          <a:ea typeface="+mn-ea"/>
-                          <a:cs typeface="+mn-cs"/>
-                        </a:rPr>
-                        <a:t>”</a:t>
+                        <a:t>“Magic”</a:t>
                       </a:r>
                     </a:p>
                     <a:p>
@@ -16721,18 +17347,7 @@
                           <a:ea typeface="+mn-ea"/>
                           <a:cs typeface="+mn-cs"/>
                         </a:rPr>
-                        <a:t>Build files are mostly the same across different </a:t>
-                      </a:r>
-                      <a:r>
-                        <a:rPr lang="en-US" sz="1600" dirty="0" smtClean="0">
-                          <a:solidFill>
-                            <a:schemeClr val="dk1"/>
-                          </a:solidFill>
-                          <a:latin typeface="+mn-lt"/>
-                          <a:ea typeface="+mn-ea"/>
-                          <a:cs typeface="+mn-cs"/>
-                        </a:rPr>
-                        <a:t>projects</a:t>
+                        <a:t>Build files are mostly the same across different projects</a:t>
                       </a:r>
                     </a:p>
                     <a:p>
@@ -16866,29 +17481,7 @@
                           <a:ea typeface="+mn-ea"/>
                           <a:cs typeface="+mn-cs"/>
                         </a:rPr>
-                        <a:t>Declarative </a:t>
-                      </a:r>
-                      <a:r>
-                        <a:rPr lang="en-US" sz="1600" dirty="0" smtClean="0">
-                          <a:solidFill>
-                            <a:schemeClr val="dk1"/>
-                          </a:solidFill>
-                          <a:latin typeface="+mn-lt"/>
-                          <a:ea typeface="+mn-ea"/>
-                          <a:cs typeface="+mn-cs"/>
-                        </a:rPr>
-                        <a:t>as well as </a:t>
-                      </a:r>
-                      <a:r>
-                        <a:rPr lang="en-US" sz="1600" dirty="0" smtClean="0">
-                          <a:solidFill>
-                            <a:schemeClr val="dk1"/>
-                          </a:solidFill>
-                          <a:latin typeface="+mn-lt"/>
-                          <a:ea typeface="+mn-ea"/>
-                          <a:cs typeface="+mn-cs"/>
-                        </a:rPr>
-                        <a:t>imperative</a:t>
+                        <a:t>Declarative as well as imperative</a:t>
                       </a:r>
                       <a:endParaRPr lang="he-IL" sz="1600" dirty="0" smtClean="0">
                         <a:solidFill>
@@ -16915,14 +17508,6 @@
                         </a:rPr>
                         <a:t>Easy migration</a:t>
                       </a:r>
-                      <a:endParaRPr lang="en-US" sz="1600" dirty="0" smtClean="0">
-                        <a:solidFill>
-                          <a:schemeClr val="dk1"/>
-                        </a:solidFill>
-                        <a:latin typeface="+mn-lt"/>
-                        <a:ea typeface="+mn-ea"/>
-                        <a:cs typeface="+mn-cs"/>
-                      </a:endParaRPr>
                     </a:p>
                     <a:p>
                       <a:pPr marL="285750" indent="-285750">
@@ -17030,7 +17615,6 @@
                         <a:rPr lang="en-US" sz="1600" baseline="0" dirty="0" smtClean="0"/>
                         <a:t>Imperative build tool</a:t>
                       </a:r>
-                      <a:endParaRPr lang="en-US" sz="1600" baseline="0" dirty="0" smtClean="0"/>
                     </a:p>
                   </a:txBody>
                   <a:tcPr/>
@@ -17098,18 +17682,7 @@
                           <a:ea typeface="+mn-ea"/>
                           <a:cs typeface="+mn-cs"/>
                         </a:rPr>
-                        <a:t> multi-module </a:t>
-                      </a:r>
-                      <a:r>
-                        <a:rPr lang="en-US" sz="1600" baseline="0" dirty="0" smtClean="0">
-                          <a:solidFill>
-                            <a:schemeClr val="dk1"/>
-                          </a:solidFill>
-                          <a:latin typeface="+mn-lt"/>
-                          <a:ea typeface="+mn-ea"/>
-                          <a:cs typeface="+mn-cs"/>
-                        </a:rPr>
-                        <a:t>support</a:t>
+                        <a:t> multi-module support</a:t>
                       </a:r>
                     </a:p>
                     <a:p>
@@ -17126,29 +17699,7 @@
                           <a:ea typeface="+mn-ea"/>
                           <a:cs typeface="+mn-cs"/>
                         </a:rPr>
-                        <a:t>Not </a:t>
-                      </a:r>
-                      <a:r>
-                        <a:rPr lang="en-US" sz="1600" baseline="0" dirty="0" smtClean="0">
-                          <a:solidFill>
-                            <a:schemeClr val="dk1"/>
-                          </a:solidFill>
-                          <a:latin typeface="+mn-lt"/>
-                          <a:ea typeface="+mn-ea"/>
-                          <a:cs typeface="+mn-cs"/>
-                        </a:rPr>
-                        <a:t>optimal for </a:t>
-                      </a:r>
-                      <a:r>
-                        <a:rPr lang="en-US" sz="1600" baseline="0" dirty="0" smtClean="0">
-                          <a:solidFill>
-                            <a:schemeClr val="dk1"/>
-                          </a:solidFill>
-                          <a:latin typeface="+mn-lt"/>
-                          <a:ea typeface="+mn-ea"/>
-                          <a:cs typeface="+mn-cs"/>
-                        </a:rPr>
-                        <a:t>large projects </a:t>
+                        <a:t>Not optimal for large projects </a:t>
                       </a:r>
                       <a:endParaRPr lang="he-IL" sz="1600" baseline="0" dirty="0" smtClean="0">
                         <a:solidFill>
@@ -17259,18 +17810,7 @@
                           <a:ea typeface="+mn-ea"/>
                           <a:cs typeface="+mn-cs"/>
                         </a:rPr>
-                        <a:t>Groovy </a:t>
-                      </a:r>
-                      <a:r>
-                        <a:rPr lang="en-US" sz="1600" baseline="0" dirty="0" smtClean="0">
-                          <a:solidFill>
-                            <a:schemeClr val="dk1"/>
-                          </a:solidFill>
-                          <a:latin typeface="+mn-lt"/>
-                          <a:ea typeface="+mn-ea"/>
-                          <a:cs typeface="+mn-cs"/>
-                        </a:rPr>
-                        <a:t>code</a:t>
+                        <a:t>Groovy code</a:t>
                       </a:r>
                       <a:endParaRPr lang="he-IL" sz="1600" baseline="0" dirty="0" smtClean="0">
                         <a:solidFill>
@@ -17761,6 +18301,36 @@
           </a:p>
         </p:txBody>
       </p:sp>
+      <p:pic>
+        <p:nvPicPr>
+          <p:cNvPr id="2" name="תמונה 1"/>
+          <p:cNvPicPr>
+            <a:picLocks noChangeAspect="1"/>
+          </p:cNvPicPr>
+          <p:nvPr/>
+        </p:nvPicPr>
+        <p:blipFill>
+          <a:blip r:embed="rId2">
+            <a:extLst>
+              <a:ext uri="{28A0092B-C50C-407E-A947-70E740481C1C}">
+                <a14:useLocalDpi xmlns:a14="http://schemas.microsoft.com/office/drawing/2010/main" val="0"/>
+              </a:ext>
+            </a:extLst>
+          </a:blip>
+          <a:stretch>
+            <a:fillRect/>
+          </a:stretch>
+        </p:blipFill>
+        <p:spPr>
+          <a:xfrm>
+            <a:off x="6019800" y="3620373"/>
+            <a:ext cx="2209800" cy="2856627"/>
+          </a:xfrm>
+          <a:prstGeom prst="rect">
+            <a:avLst/>
+          </a:prstGeom>
+        </p:spPr>
+      </p:pic>
     </p:spTree>
     <p:extLst>
       <p:ext uri="{BB962C8B-B14F-4D97-AF65-F5344CB8AC3E}">
@@ -17850,13 +18420,7 @@
               <a:rPr lang="en-US" sz="2000" dirty="0">
                 <a:latin typeface="Arial"/>
               </a:rPr>
-              <a:t>  &lt;</a:t>
-            </a:r>
-            <a:r>
-              <a:rPr lang="en-US" sz="2000" dirty="0">
-                <a:latin typeface="Arial"/>
-              </a:rPr>
-              <a:t>property name="</a:t>
+              <a:t>  &lt;property name="</a:t>
             </a:r>
             <a:r>
               <a:rPr lang="en-US" sz="2000" dirty="0" err="1">
@@ -17902,13 +18466,7 @@
               <a:rPr lang="en-US" sz="2000" dirty="0">
                 <a:latin typeface="Arial"/>
               </a:rPr>
-              <a:t>  &lt;property name="dist"  location="dist</a:t>
-            </a:r>
-            <a:r>
-              <a:rPr lang="en-US" sz="2000" dirty="0">
-                <a:latin typeface="Arial"/>
-              </a:rPr>
-              <a:t>"/&gt;</a:t>
+              <a:t>  &lt;property name="dist"  location="dist"/&gt;</a:t>
             </a:r>
           </a:p>
           <a:p>
@@ -17953,13 +18511,7 @@
               <a:rPr lang="en-US" sz="2000" dirty="0">
                 <a:latin typeface="Arial"/>
               </a:rPr>
-              <a:t>    </a:t>
-            </a:r>
-            <a:r>
-              <a:rPr lang="en-US" sz="2000" dirty="0">
-                <a:latin typeface="Arial"/>
-              </a:rPr>
-              <a:t>&lt;</a:t>
+              <a:t>    &lt;</a:t>
             </a:r>
             <a:r>
               <a:rPr lang="en-US" sz="2000" dirty="0" smtClean="0">
@@ -18023,13 +18575,7 @@
               <a:rPr lang="en-US" sz="2000" dirty="0">
                 <a:latin typeface="Arial"/>
               </a:rPr>
-              <a:t>  &lt;/target</a:t>
-            </a:r>
-            <a:r>
-              <a:rPr lang="en-US" sz="2000" dirty="0">
-                <a:latin typeface="Arial"/>
-              </a:rPr>
-              <a:t>&gt;</a:t>
+              <a:t>  &lt;/target&gt;</a:t>
             </a:r>
             <a:endParaRPr sz="2000" dirty="0">
               <a:latin typeface="Arial"/>
@@ -18143,13 +18689,7 @@
               <a:rPr lang="en-US" sz="2000" dirty="0">
                 <a:latin typeface="Arial"/>
               </a:rPr>
-              <a:t>  &lt;/target</a:t>
-            </a:r>
-            <a:r>
-              <a:rPr lang="en-US" sz="2000" dirty="0">
-                <a:latin typeface="Arial"/>
-              </a:rPr>
-              <a:t>&gt;</a:t>
+              <a:t>  &lt;/target&gt;</a:t>
             </a:r>
             <a:endParaRPr sz="2000" dirty="0">
               <a:latin typeface="Arial"/>
@@ -18245,23 +18785,8 @@
               <a:rPr lang="en-US" sz="2000" dirty="0">
                 <a:latin typeface="Arial"/>
               </a:rPr>
-              <a:t>="${dist}/</a:t>
-            </a:r>
-            <a:r>
-              <a:rPr lang="en-US" sz="2000" dirty="0">
-                <a:latin typeface="Arial"/>
-              </a:rPr>
-              <a:t>lib/example.jar</a:t>
-            </a:r>
-            <a:r>
-              <a:rPr lang="en-US" sz="2000" dirty="0">
-                <a:latin typeface="Arial"/>
-              </a:rPr>
-              <a:t>" </a:t>
-            </a:r>
-            <a:endParaRPr lang="en-US" sz="2000" dirty="0">
-              <a:latin typeface="Arial"/>
-            </a:endParaRPr>
+              <a:t>="${dist}/lib/example.jar" </a:t>
+            </a:r>
           </a:p>
           <a:p>
             <a:r>
@@ -18291,13 +18816,7 @@
               <a:rPr lang="en-US" sz="2000" dirty="0">
                 <a:latin typeface="Arial"/>
               </a:rPr>
-              <a:t>  &lt;/target</a:t>
-            </a:r>
-            <a:r>
-              <a:rPr lang="en-US" sz="2000" dirty="0">
-                <a:latin typeface="Arial"/>
-              </a:rPr>
-              <a:t>&gt;</a:t>
+              <a:t>  &lt;/target&gt;</a:t>
             </a:r>
           </a:p>
           <a:p>
@@ -18543,13 +19062,7 @@
                 <a:rPr lang="en-US" sz="1900" u="none" kern="1200" dirty="0" smtClean="0">
                   <a:latin typeface="+mn-lt"/>
                 </a:rPr>
-                <a:t> </a:t>
-              </a:r>
-              <a:r>
-                <a:rPr lang="en-US" sz="1900" u="none" kern="1200" dirty="0" smtClean="0">
-                  <a:latin typeface="+mn-lt"/>
-                </a:rPr>
-                <a:t>compiled code + output paths</a:t>
+                <a:t> compiled code + output paths</a:t>
               </a:r>
               <a:endParaRPr lang="en-US" sz="1900" u="sng" kern="1200" dirty="0" smtClean="0">
                 <a:latin typeface="+mn-lt"/>
@@ -18577,13 +19090,7 @@
                 <a:rPr lang="en-US" sz="1900" u="none" kern="1200" dirty="0" smtClean="0">
                   <a:latin typeface="+mn-lt"/>
                 </a:rPr>
-                <a:t> jar </a:t>
-              </a:r>
-              <a:r>
-                <a:rPr lang="en-US" sz="1900" u="none" kern="1200" dirty="0" smtClean="0">
-                  <a:latin typeface="+mn-lt"/>
-                </a:rPr>
-                <a:t>file</a:t>
+                <a:t> jar file</a:t>
               </a:r>
               <a:endParaRPr lang="he-IL" sz="1900" u="sng" kern="1200" dirty="0">
                 <a:latin typeface="+mn-lt"/>
@@ -18837,11 +19344,7 @@
               </a:r>
               <a:r>
                 <a:rPr lang="en-US" sz="2000" kern="1200" dirty="0" smtClean="0"/>
-                <a:t> source </a:t>
-              </a:r>
-              <a:r>
-                <a:rPr lang="en-US" sz="2000" kern="1200" dirty="0" smtClean="0"/>
-                <a:t>+ compiled code </a:t>
+                <a:t> source + compiled code </a:t>
               </a:r>
               <a:r>
                 <a:rPr lang="he-IL" sz="2000" kern="1200" dirty="0" smtClean="0"/>
@@ -18851,7 +19354,6 @@
                 <a:rPr lang="en-US" sz="2000" kern="1200" dirty="0" smtClean="0"/>
                 <a:t>paths</a:t>
               </a:r>
-              <a:endParaRPr lang="en-US" sz="2000" kern="1200" dirty="0" smtClean="0"/>
             </a:p>
             <a:p>
               <a:pPr lvl="0" defTabSz="1422400" rtl="1">
@@ -18867,19 +19369,11 @@
               </a:pPr>
               <a:r>
                 <a:rPr lang="en-US" sz="2000" u="sng" kern="1200" dirty="0" smtClean="0"/>
-                <a:t>Output</a:t>
-              </a:r>
-              <a:r>
-                <a:rPr lang="en-US" sz="2000" u="sng" kern="1200" dirty="0" smtClean="0"/>
-                <a:t>:</a:t>
+                <a:t>Output:</a:t>
               </a:r>
               <a:r>
                 <a:rPr lang="en-US" sz="2000" kern="1200" dirty="0" smtClean="0"/>
-                <a:t> </a:t>
-              </a:r>
-              <a:r>
-                <a:rPr lang="en-US" sz="2000" kern="1200" dirty="0" smtClean="0"/>
-                <a:t>compiled files</a:t>
+                <a:t> compiled files</a:t>
               </a:r>
               <a:endParaRPr lang="he-IL" sz="2000" kern="1200" dirty="0"/>
             </a:p>
@@ -19131,15 +19625,7 @@
               </a:r>
               <a:r>
                 <a:rPr lang="en-US" sz="2000" u="none" kern="1200" dirty="0" smtClean="0"/>
-                <a:t> </a:t>
-              </a:r>
-              <a:r>
-                <a:rPr lang="en-US" sz="2000" u="none" kern="1200" dirty="0" smtClean="0"/>
-                <a:t>compiled code </a:t>
-              </a:r>
-              <a:r>
-                <a:rPr lang="en-US" sz="2000" u="none" kern="1200" dirty="0" smtClean="0"/>
-                <a:t>path</a:t>
+                <a:t> compiled code path</a:t>
               </a:r>
             </a:p>
             <a:p>
@@ -19240,7 +19726,7 @@
                                         <p:tgtEl>
                                           <p:spTgt spid="7">
                                             <p:txEl>
-                                              <p:pRg st="2" end="2"/>
+                                              <p:pRg st="13" end="13"/>
                                             </p:txEl>
                                           </p:spTgt>
                                         </p:tgtEl>
@@ -19258,189 +19744,6 @@
                                         <p:tgtEl>
                                           <p:spTgt spid="7">
                                             <p:txEl>
-                                              <p:pRg st="2" end="2"/>
-                                            </p:txEl>
-                                          </p:spTgt>
-                                        </p:tgtEl>
-                                      </p:cBhvr>
-                                    </p:animEffect>
-                                  </p:childTnLst>
-                                </p:cTn>
-                              </p:par>
-                            </p:childTnLst>
-                          </p:cTn>
-                        </p:par>
-                      </p:childTnLst>
-                    </p:cTn>
-                  </p:par>
-                  <p:par>
-                    <p:cTn id="8" fill="hold">
-                      <p:stCondLst>
-                        <p:cond delay="indefinite"/>
-                      </p:stCondLst>
-                      <p:childTnLst>
-                        <p:par>
-                          <p:cTn id="9" fill="hold">
-                            <p:stCondLst>
-                              <p:cond delay="0"/>
-                            </p:stCondLst>
-                            <p:childTnLst>
-                              <p:par>
-                                <p:cTn id="10" presetID="10" presetClass="entr" presetSubtype="0" fill="hold" nodeType="clickEffect">
-                                  <p:stCondLst>
-                                    <p:cond delay="0"/>
-                                  </p:stCondLst>
-                                  <p:childTnLst>
-                                    <p:set>
-                                      <p:cBhvr>
-                                        <p:cTn id="11" dur="1" fill="hold">
-                                          <p:stCondLst>
-                                            <p:cond delay="0"/>
-                                          </p:stCondLst>
-                                        </p:cTn>
-                                        <p:tgtEl>
-                                          <p:spTgt spid="7">
-                                            <p:txEl>
-                                              <p:pRg st="3" end="3"/>
-                                            </p:txEl>
-                                          </p:spTgt>
-                                        </p:tgtEl>
-                                        <p:attrNameLst>
-                                          <p:attrName>style.visibility</p:attrName>
-                                        </p:attrNameLst>
-                                      </p:cBhvr>
-                                      <p:to>
-                                        <p:strVal val="visible"/>
-                                      </p:to>
-                                    </p:set>
-                                    <p:animEffect transition="in" filter="fade">
-                                      <p:cBhvr>
-                                        <p:cTn id="12" dur="2000"/>
-                                        <p:tgtEl>
-                                          <p:spTgt spid="7">
-                                            <p:txEl>
-                                              <p:pRg st="3" end="3"/>
-                                            </p:txEl>
-                                          </p:spTgt>
-                                        </p:tgtEl>
-                                      </p:cBhvr>
-                                    </p:animEffect>
-                                  </p:childTnLst>
-                                </p:cTn>
-                              </p:par>
-                            </p:childTnLst>
-                          </p:cTn>
-                        </p:par>
-                      </p:childTnLst>
-                    </p:cTn>
-                  </p:par>
-                  <p:par>
-                    <p:cTn id="13" fill="hold">
-                      <p:stCondLst>
-                        <p:cond delay="indefinite"/>
-                      </p:stCondLst>
-                      <p:childTnLst>
-                        <p:par>
-                          <p:cTn id="14" fill="hold">
-                            <p:stCondLst>
-                              <p:cond delay="0"/>
-                            </p:stCondLst>
-                            <p:childTnLst>
-                              <p:par>
-                                <p:cTn id="15" presetID="10" presetClass="entr" presetSubtype="0" fill="hold" nodeType="clickEffect">
-                                  <p:stCondLst>
-                                    <p:cond delay="0"/>
-                                  </p:stCondLst>
-                                  <p:childTnLst>
-                                    <p:set>
-                                      <p:cBhvr>
-                                        <p:cTn id="16" dur="1" fill="hold">
-                                          <p:stCondLst>
-                                            <p:cond delay="0"/>
-                                          </p:stCondLst>
-                                        </p:cTn>
-                                        <p:tgtEl>
-                                          <p:spTgt spid="7">
-                                            <p:txEl>
-                                              <p:pRg st="4" end="4"/>
-                                            </p:txEl>
-                                          </p:spTgt>
-                                        </p:tgtEl>
-                                        <p:attrNameLst>
-                                          <p:attrName>style.visibility</p:attrName>
-                                        </p:attrNameLst>
-                                      </p:cBhvr>
-                                      <p:to>
-                                        <p:strVal val="visible"/>
-                                      </p:to>
-                                    </p:set>
-                                    <p:animEffect transition="in" filter="fade">
-                                      <p:cBhvr>
-                                        <p:cTn id="17" dur="2000"/>
-                                        <p:tgtEl>
-                                          <p:spTgt spid="7">
-                                            <p:txEl>
-                                              <p:pRg st="4" end="4"/>
-                                            </p:txEl>
-                                          </p:spTgt>
-                                        </p:tgtEl>
-                                      </p:cBhvr>
-                                    </p:animEffect>
-                                  </p:childTnLst>
-                                </p:cTn>
-                              </p:par>
-                            </p:childTnLst>
-                          </p:cTn>
-                        </p:par>
-                      </p:childTnLst>
-                    </p:cTn>
-                  </p:par>
-                  <p:par>
-                    <p:cTn id="18" fill="hold">
-                      <p:stCondLst>
-                        <p:cond delay="indefinite"/>
-                      </p:stCondLst>
-                      <p:childTnLst>
-                        <p:par>
-                          <p:cTn id="19" fill="hold">
-                            <p:stCondLst>
-                              <p:cond delay="0"/>
-                            </p:stCondLst>
-                            <p:childTnLst>
-                              <p:par>
-                                <p:cTn id="20" presetID="10" presetClass="entr" presetSubtype="0" fill="hold" nodeType="clickEffect">
-                                  <p:stCondLst>
-                                    <p:cond delay="0"/>
-                                  </p:stCondLst>
-                                  <p:childTnLst>
-                                    <p:set>
-                                      <p:cBhvr>
-                                        <p:cTn id="21" dur="1" fill="hold">
-                                          <p:stCondLst>
-                                            <p:cond delay="0"/>
-                                          </p:stCondLst>
-                                        </p:cTn>
-                                        <p:tgtEl>
-                                          <p:spTgt spid="7">
-                                            <p:txEl>
-                                              <p:pRg st="13" end="13"/>
-                                            </p:txEl>
-                                          </p:spTgt>
-                                        </p:tgtEl>
-                                        <p:attrNameLst>
-                                          <p:attrName>style.visibility</p:attrName>
-                                        </p:attrNameLst>
-                                      </p:cBhvr>
-                                      <p:to>
-                                        <p:strVal val="visible"/>
-                                      </p:to>
-                                    </p:set>
-                                    <p:animEffect transition="in" filter="fade">
-                                      <p:cBhvr>
-                                        <p:cTn id="22" dur="2000"/>
-                                        <p:tgtEl>
-                                          <p:spTgt spid="7">
-                                            <p:txEl>
                                               <p:pRg st="13" end="13"/>
                                             </p:txEl>
                                           </p:spTgt>
@@ -19451,14 +19754,14 @@
                                 </p:cTn>
                               </p:par>
                               <p:par>
-                                <p:cTn id="23" presetID="10" presetClass="entr" presetSubtype="0" fill="hold" nodeType="withEffect">
+                                <p:cTn id="8" presetID="10" presetClass="entr" presetSubtype="0" fill="hold" nodeType="withEffect">
                                   <p:stCondLst>
                                     <p:cond delay="0"/>
                                   </p:stCondLst>
                                   <p:childTnLst>
                                     <p:set>
                                       <p:cBhvr>
-                                        <p:cTn id="24" dur="1" fill="hold">
+                                        <p:cTn id="9" dur="1" fill="hold">
                                           <p:stCondLst>
                                             <p:cond delay="0"/>
                                           </p:stCondLst>
@@ -19480,7 +19783,7 @@
                                     </p:set>
                                     <p:animEffect transition="in" filter="fade">
                                       <p:cBhvr>
-                                        <p:cTn id="25" dur="2000"/>
+                                        <p:cTn id="10" dur="2000"/>
                                         <p:tgtEl>
                                           <p:spTgt spid="7">
                                             <p:txEl>
@@ -19494,14 +19797,14 @@
                                 </p:cTn>
                               </p:par>
                               <p:par>
-                                <p:cTn id="26" presetID="10" presetClass="entr" presetSubtype="0" fill="hold" nodeType="withEffect">
+                                <p:cTn id="11" presetID="10" presetClass="entr" presetSubtype="0" fill="hold" nodeType="withEffect">
                                   <p:stCondLst>
                                     <p:cond delay="0"/>
                                   </p:stCondLst>
                                   <p:childTnLst>
                                     <p:set>
                                       <p:cBhvr>
-                                        <p:cTn id="27" dur="1" fill="hold">
+                                        <p:cTn id="12" dur="1" fill="hold">
                                           <p:stCondLst>
                                             <p:cond delay="0"/>
                                           </p:stCondLst>
@@ -19523,7 +19826,7 @@
                                     </p:set>
                                     <p:animEffect transition="in" filter="fade">
                                       <p:cBhvr>
-                                        <p:cTn id="28" dur="2000"/>
+                                        <p:cTn id="13" dur="2000"/>
                                         <p:tgtEl>
                                           <p:spTgt spid="7">
                                             <p:txEl>
@@ -19537,14 +19840,14 @@
                                 </p:cTn>
                               </p:par>
                               <p:par>
-                                <p:cTn id="29" presetID="10" presetClass="entr" presetSubtype="0" fill="hold" nodeType="withEffect">
+                                <p:cTn id="14" presetID="10" presetClass="entr" presetSubtype="0" fill="hold" nodeType="withEffect">
                                   <p:stCondLst>
                                     <p:cond delay="0"/>
                                   </p:stCondLst>
                                   <p:childTnLst>
                                     <p:set>
                                       <p:cBhvr>
-                                        <p:cTn id="30" dur="1" fill="hold">
+                                        <p:cTn id="15" dur="1" fill="hold">
                                           <p:stCondLst>
                                             <p:cond delay="0"/>
                                           </p:stCondLst>
@@ -19566,7 +19869,7 @@
                                     </p:set>
                                     <p:animEffect transition="in" filter="fade">
                                       <p:cBhvr>
-                                        <p:cTn id="31" dur="2000"/>
+                                        <p:cTn id="16" dur="2000"/>
                                         <p:tgtEl>
                                           <p:spTgt spid="7">
                                             <p:txEl>
@@ -19580,14 +19883,14 @@
                                 </p:cTn>
                               </p:par>
                               <p:par>
-                                <p:cTn id="32" presetID="10" presetClass="entr" presetSubtype="0" fill="hold" nodeType="withEffect">
+                                <p:cTn id="17" presetID="10" presetClass="entr" presetSubtype="0" fill="hold" nodeType="withEffect">
                                   <p:stCondLst>
                                     <p:cond delay="0"/>
                                   </p:stCondLst>
                                   <p:childTnLst>
                                     <p:set>
                                       <p:cBhvr>
-                                        <p:cTn id="33" dur="1" fill="hold">
+                                        <p:cTn id="18" dur="1" fill="hold">
                                           <p:stCondLst>
                                             <p:cond delay="0"/>
                                           </p:stCondLst>
@@ -19609,11 +19912,188 @@
                                     </p:set>
                                     <p:animEffect transition="in" filter="fade">
                                       <p:cBhvr>
+                                        <p:cTn id="19" dur="2000"/>
+                                        <p:tgtEl>
+                                          <p:spTgt spid="7">
+                                            <p:txEl>
+                                              <p:pRg st="17" end="17"/>
+                                            </p:txEl>
+                                          </p:spTgt>
+                                        </p:tgtEl>
+                                      </p:cBhvr>
+                                    </p:animEffect>
+                                  </p:childTnLst>
+                                </p:cTn>
+                              </p:par>
+                              <p:par>
+                                <p:cTn id="20" presetID="10" presetClass="entr" presetSubtype="0" fill="hold" nodeType="withEffect">
+                                  <p:stCondLst>
+                                    <p:cond delay="0"/>
+                                  </p:stCondLst>
+                                  <p:childTnLst>
+                                    <p:set>
+                                      <p:cBhvr>
+                                        <p:cTn id="21" dur="1" fill="hold">
+                                          <p:stCondLst>
+                                            <p:cond delay="0"/>
+                                          </p:stCondLst>
+                                        </p:cTn>
+                                        <p:tgtEl>
+                                          <p:spTgt spid="16"/>
+                                        </p:tgtEl>
+                                        <p:attrNameLst>
+                                          <p:attrName>style.visibility</p:attrName>
+                                        </p:attrNameLst>
+                                      </p:cBhvr>
+                                      <p:to>
+                                        <p:strVal val="visible"/>
+                                      </p:to>
+                                    </p:set>
+                                    <p:animEffect transition="in" filter="fade">
+                                      <p:cBhvr>
+                                        <p:cTn id="22" dur="2000"/>
+                                        <p:tgtEl>
+                                          <p:spTgt spid="16"/>
+                                        </p:tgtEl>
+                                      </p:cBhvr>
+                                    </p:animEffect>
+                                  </p:childTnLst>
+                                </p:cTn>
+                              </p:par>
+                              <p:par>
+                                <p:cTn id="23" presetID="10" presetClass="entr" presetSubtype="0" fill="hold" grpId="1" nodeType="withEffect">
+                                  <p:stCondLst>
+                                    <p:cond delay="0"/>
+                                  </p:stCondLst>
+                                  <p:childTnLst>
+                                    <p:set>
+                                      <p:cBhvr>
+                                        <p:cTn id="24" dur="1" fill="hold">
+                                          <p:stCondLst>
+                                            <p:cond delay="0"/>
+                                          </p:stCondLst>
+                                        </p:cTn>
+                                        <p:tgtEl>
+                                          <p:spTgt spid="2"/>
+                                        </p:tgtEl>
+                                        <p:attrNameLst>
+                                          <p:attrName>style.visibility</p:attrName>
+                                        </p:attrNameLst>
+                                      </p:cBhvr>
+                                      <p:to>
+                                        <p:strVal val="visible"/>
+                                      </p:to>
+                                    </p:set>
+                                    <p:animEffect transition="in" filter="fade">
+                                      <p:cBhvr>
+                                        <p:cTn id="25" dur="2000"/>
+                                        <p:tgtEl>
+                                          <p:spTgt spid="2"/>
+                                        </p:tgtEl>
+                                      </p:cBhvr>
+                                    </p:animEffect>
+                                  </p:childTnLst>
+                                </p:cTn>
+                              </p:par>
+                              <p:par>
+                                <p:cTn id="26" presetID="3" presetClass="emph" presetSubtype="2" fill="hold" grpId="0" nodeType="withEffect">
+                                  <p:stCondLst>
+                                    <p:cond delay="0"/>
+                                  </p:stCondLst>
+                                  <p:childTnLst>
+                                    <p:animClr clrSpc="rgb" dir="cw">
+                                      <p:cBhvr override="childStyle">
+                                        <p:cTn id="27" dur="2000" fill="hold"/>
+                                        <p:tgtEl>
+                                          <p:spTgt spid="31"/>
+                                        </p:tgtEl>
+                                        <p:attrNameLst>
+                                          <p:attrName>style.color</p:attrName>
+                                        </p:attrNameLst>
+                                      </p:cBhvr>
+                                      <p:to>
+                                        <a:srgbClr val="00B0F0"/>
+                                      </p:to>
+                                    </p:animClr>
+                                  </p:childTnLst>
+                                </p:cTn>
+                              </p:par>
+                            </p:childTnLst>
+                          </p:cTn>
+                        </p:par>
+                      </p:childTnLst>
+                    </p:cTn>
+                  </p:par>
+                  <p:par>
+                    <p:cTn id="28" fill="hold">
+                      <p:stCondLst>
+                        <p:cond delay="indefinite"/>
+                      </p:stCondLst>
+                      <p:childTnLst>
+                        <p:par>
+                          <p:cTn id="29" fill="hold">
+                            <p:stCondLst>
+                              <p:cond delay="0"/>
+                            </p:stCondLst>
+                            <p:childTnLst>
+                              <p:par>
+                                <p:cTn id="30" presetID="3" presetClass="emph" presetSubtype="2" fill="hold" grpId="0" nodeType="clickEffect">
+                                  <p:stCondLst>
+                                    <p:cond delay="0"/>
+                                  </p:stCondLst>
+                                  <p:childTnLst>
+                                    <p:animClr clrSpc="rgb" dir="cw">
+                                      <p:cBhvr override="childStyle">
+                                        <p:cTn id="31" dur="2000" fill="hold"/>
+                                        <p:tgtEl>
+                                          <p:spTgt spid="2"/>
+                                        </p:tgtEl>
+                                        <p:attrNameLst>
+                                          <p:attrName>style.color</p:attrName>
+                                        </p:attrNameLst>
+                                      </p:cBhvr>
+                                      <p:to>
+                                        <a:srgbClr val="00B050"/>
+                                      </p:to>
+                                    </p:animClr>
+                                  </p:childTnLst>
+                                </p:cTn>
+                              </p:par>
+                              <p:par>
+                                <p:cTn id="32" presetID="10" presetClass="entr" presetSubtype="0" fill="hold" nodeType="withEffect">
+                                  <p:stCondLst>
+                                    <p:cond delay="0"/>
+                                  </p:stCondLst>
+                                  <p:childTnLst>
+                                    <p:set>
+                                      <p:cBhvr>
+                                        <p:cTn id="33" dur="1" fill="hold">
+                                          <p:stCondLst>
+                                            <p:cond delay="0"/>
+                                          </p:stCondLst>
+                                        </p:cTn>
+                                        <p:tgtEl>
+                                          <p:spTgt spid="7">
+                                            <p:txEl>
+                                              <p:pRg st="10" end="10"/>
+                                            </p:txEl>
+                                          </p:spTgt>
+                                        </p:tgtEl>
+                                        <p:attrNameLst>
+                                          <p:attrName>style.visibility</p:attrName>
+                                        </p:attrNameLst>
+                                      </p:cBhvr>
+                                      <p:to>
+                                        <p:strVal val="visible"/>
+                                      </p:to>
+                                    </p:set>
+                                    <p:animEffect transition="in" filter="fade">
+                                      <p:cBhvr>
                                         <p:cTn id="34" dur="2000"/>
                                         <p:tgtEl>
                                           <p:spTgt spid="7">
                                             <p:txEl>
-                                              <p:pRg st="17" end="17"/>
+                                              <p:pRg st="10" end="10"/>
                                             </p:txEl>
                                           </p:spTgt>
                                         </p:tgtEl>
@@ -19636,183 +20116,6 @@
                                           </p:stCondLst>
                                         </p:cTn>
                                         <p:tgtEl>
-                                          <p:spTgt spid="16"/>
-                                        </p:tgtEl>
-                                        <p:attrNameLst>
-                                          <p:attrName>style.visibility</p:attrName>
-                                        </p:attrNameLst>
-                                      </p:cBhvr>
-                                      <p:to>
-                                        <p:strVal val="visible"/>
-                                      </p:to>
-                                    </p:set>
-                                    <p:animEffect transition="in" filter="fade">
-                                      <p:cBhvr>
-                                        <p:cTn id="37" dur="2000"/>
-                                        <p:tgtEl>
-                                          <p:spTgt spid="16"/>
-                                        </p:tgtEl>
-                                      </p:cBhvr>
-                                    </p:animEffect>
-                                  </p:childTnLst>
-                                </p:cTn>
-                              </p:par>
-                              <p:par>
-                                <p:cTn id="38" presetID="10" presetClass="entr" presetSubtype="0" fill="hold" grpId="1" nodeType="withEffect">
-                                  <p:stCondLst>
-                                    <p:cond delay="0"/>
-                                  </p:stCondLst>
-                                  <p:childTnLst>
-                                    <p:set>
-                                      <p:cBhvr>
-                                        <p:cTn id="39" dur="1" fill="hold">
-                                          <p:stCondLst>
-                                            <p:cond delay="0"/>
-                                          </p:stCondLst>
-                                        </p:cTn>
-                                        <p:tgtEl>
-                                          <p:spTgt spid="2"/>
-                                        </p:tgtEl>
-                                        <p:attrNameLst>
-                                          <p:attrName>style.visibility</p:attrName>
-                                        </p:attrNameLst>
-                                      </p:cBhvr>
-                                      <p:to>
-                                        <p:strVal val="visible"/>
-                                      </p:to>
-                                    </p:set>
-                                    <p:animEffect transition="in" filter="fade">
-                                      <p:cBhvr>
-                                        <p:cTn id="40" dur="2000"/>
-                                        <p:tgtEl>
-                                          <p:spTgt spid="2"/>
-                                        </p:tgtEl>
-                                      </p:cBhvr>
-                                    </p:animEffect>
-                                  </p:childTnLst>
-                                </p:cTn>
-                              </p:par>
-                              <p:par>
-                                <p:cTn id="41" presetID="3" presetClass="emph" presetSubtype="2" fill="hold" grpId="0" nodeType="withEffect">
-                                  <p:stCondLst>
-                                    <p:cond delay="0"/>
-                                  </p:stCondLst>
-                                  <p:childTnLst>
-                                    <p:animClr clrSpc="rgb" dir="cw">
-                                      <p:cBhvr override="childStyle">
-                                        <p:cTn id="42" dur="2000" fill="hold"/>
-                                        <p:tgtEl>
-                                          <p:spTgt spid="31"/>
-                                        </p:tgtEl>
-                                        <p:attrNameLst>
-                                          <p:attrName>style.color</p:attrName>
-                                        </p:attrNameLst>
-                                      </p:cBhvr>
-                                      <p:to>
-                                        <a:srgbClr val="00B0F0"/>
-                                      </p:to>
-                                    </p:animClr>
-                                  </p:childTnLst>
-                                </p:cTn>
-                              </p:par>
-                            </p:childTnLst>
-                          </p:cTn>
-                        </p:par>
-                      </p:childTnLst>
-                    </p:cTn>
-                  </p:par>
-                  <p:par>
-                    <p:cTn id="43" fill="hold">
-                      <p:stCondLst>
-                        <p:cond delay="indefinite"/>
-                      </p:stCondLst>
-                      <p:childTnLst>
-                        <p:par>
-                          <p:cTn id="44" fill="hold">
-                            <p:stCondLst>
-                              <p:cond delay="0"/>
-                            </p:stCondLst>
-                            <p:childTnLst>
-                              <p:par>
-                                <p:cTn id="45" presetID="3" presetClass="emph" presetSubtype="2" fill="hold" grpId="0" nodeType="clickEffect">
-                                  <p:stCondLst>
-                                    <p:cond delay="0"/>
-                                  </p:stCondLst>
-                                  <p:childTnLst>
-                                    <p:animClr clrSpc="rgb" dir="cw">
-                                      <p:cBhvr override="childStyle">
-                                        <p:cTn id="46" dur="2000" fill="hold"/>
-                                        <p:tgtEl>
-                                          <p:spTgt spid="2"/>
-                                        </p:tgtEl>
-                                        <p:attrNameLst>
-                                          <p:attrName>style.color</p:attrName>
-                                        </p:attrNameLst>
-                                      </p:cBhvr>
-                                      <p:to>
-                                        <a:srgbClr val="00B050"/>
-                                      </p:to>
-                                    </p:animClr>
-                                  </p:childTnLst>
-                                </p:cTn>
-                              </p:par>
-                              <p:par>
-                                <p:cTn id="47" presetID="10" presetClass="entr" presetSubtype="0" fill="hold" nodeType="withEffect">
-                                  <p:stCondLst>
-                                    <p:cond delay="0"/>
-                                  </p:stCondLst>
-                                  <p:childTnLst>
-                                    <p:set>
-                                      <p:cBhvr>
-                                        <p:cTn id="48" dur="1" fill="hold">
-                                          <p:stCondLst>
-                                            <p:cond delay="0"/>
-                                          </p:stCondLst>
-                                        </p:cTn>
-                                        <p:tgtEl>
-                                          <p:spTgt spid="7">
-                                            <p:txEl>
-                                              <p:pRg st="10" end="10"/>
-                                            </p:txEl>
-                                          </p:spTgt>
-                                        </p:tgtEl>
-                                        <p:attrNameLst>
-                                          <p:attrName>style.visibility</p:attrName>
-                                        </p:attrNameLst>
-                                      </p:cBhvr>
-                                      <p:to>
-                                        <p:strVal val="visible"/>
-                                      </p:to>
-                                    </p:set>
-                                    <p:animEffect transition="in" filter="fade">
-                                      <p:cBhvr>
-                                        <p:cTn id="49" dur="2000"/>
-                                        <p:tgtEl>
-                                          <p:spTgt spid="7">
-                                            <p:txEl>
-                                              <p:pRg st="10" end="10"/>
-                                            </p:txEl>
-                                          </p:spTgt>
-                                        </p:tgtEl>
-                                      </p:cBhvr>
-                                    </p:animEffect>
-                                  </p:childTnLst>
-                                </p:cTn>
-                              </p:par>
-                              <p:par>
-                                <p:cTn id="50" presetID="10" presetClass="entr" presetSubtype="0" fill="hold" nodeType="withEffect">
-                                  <p:stCondLst>
-                                    <p:cond delay="0"/>
-                                  </p:stCondLst>
-                                  <p:childTnLst>
-                                    <p:set>
-                                      <p:cBhvr>
-                                        <p:cTn id="51" dur="1" fill="hold">
-                                          <p:stCondLst>
-                                            <p:cond delay="0"/>
-                                          </p:stCondLst>
-                                        </p:cTn>
-                                        <p:tgtEl>
                                           <p:spTgt spid="7">
                                             <p:txEl>
                                               <p:pRg st="11" end="11"/>
@@ -19829,7 +20132,7 @@
                                     </p:set>
                                     <p:animEffect transition="in" filter="fade">
                                       <p:cBhvr>
-                                        <p:cTn id="52" dur="2000"/>
+                                        <p:cTn id="37" dur="2000"/>
                                         <p:tgtEl>
                                           <p:spTgt spid="7">
                                             <p:txEl>
@@ -19843,14 +20146,14 @@
                                 </p:cTn>
                               </p:par>
                               <p:par>
-                                <p:cTn id="53" presetID="10" presetClass="entr" presetSubtype="0" fill="hold" nodeType="withEffect">
+                                <p:cTn id="38" presetID="10" presetClass="entr" presetSubtype="0" fill="hold" nodeType="withEffect">
                                   <p:stCondLst>
                                     <p:cond delay="0"/>
                                   </p:stCondLst>
                                   <p:childTnLst>
                                     <p:set>
                                       <p:cBhvr>
-                                        <p:cTn id="54" dur="1" fill="hold">
+                                        <p:cTn id="39" dur="1" fill="hold">
                                           <p:stCondLst>
                                             <p:cond delay="0"/>
                                           </p:stCondLst>
@@ -19872,7 +20175,7 @@
                                     </p:set>
                                     <p:animEffect transition="in" filter="fade">
                                       <p:cBhvr>
-                                        <p:cTn id="55" dur="2000"/>
+                                        <p:cTn id="40" dur="2000"/>
                                         <p:tgtEl>
                                           <p:spTgt spid="7">
                                             <p:txEl>
@@ -19886,14 +20189,14 @@
                                 </p:cTn>
                               </p:par>
                               <p:par>
-                                <p:cTn id="56" presetID="10" presetClass="entr" presetSubtype="0" fill="hold" grpId="1" nodeType="withEffect">
+                                <p:cTn id="41" presetID="10" presetClass="entr" presetSubtype="0" fill="hold" grpId="1" nodeType="withEffect">
                                   <p:stCondLst>
                                     <p:cond delay="0"/>
                                   </p:stCondLst>
                                   <p:childTnLst>
                                     <p:set>
                                       <p:cBhvr>
-                                        <p:cTn id="57" dur="1" fill="hold">
+                                        <p:cTn id="42" dur="1" fill="hold">
                                           <p:stCondLst>
                                             <p:cond delay="0"/>
                                           </p:stCondLst>
@@ -19911,7 +20214,7 @@
                                     </p:set>
                                     <p:animEffect transition="in" filter="fade">
                                       <p:cBhvr>
-                                        <p:cTn id="58" dur="2000"/>
+                                        <p:cTn id="43" dur="2000"/>
                                         <p:tgtEl>
                                           <p:spTgt spid="14"/>
                                         </p:tgtEl>
@@ -19921,14 +20224,14 @@
                                 </p:cTn>
                               </p:par>
                               <p:par>
-                                <p:cTn id="59" presetID="10" presetClass="entr" presetSubtype="0" fill="hold" nodeType="withEffect">
+                                <p:cTn id="44" presetID="10" presetClass="entr" presetSubtype="0" fill="hold" nodeType="withEffect">
                                   <p:stCondLst>
                                     <p:cond delay="0"/>
                                   </p:stCondLst>
                                   <p:childTnLst>
                                     <p:set>
                                       <p:cBhvr>
-                                        <p:cTn id="60" dur="1" fill="hold">
+                                        <p:cTn id="45" dur="1" fill="hold">
                                           <p:stCondLst>
                                             <p:cond delay="0"/>
                                           </p:stCondLst>
@@ -19946,7 +20249,7 @@
                                     </p:set>
                                     <p:animEffect transition="in" filter="fade">
                                       <p:cBhvr>
-                                        <p:cTn id="61" dur="2000"/>
+                                        <p:cTn id="46" dur="2000"/>
                                         <p:tgtEl>
                                           <p:spTgt spid="19"/>
                                         </p:tgtEl>
@@ -19956,14 +20259,14 @@
                                 </p:cTn>
                               </p:par>
                               <p:par>
-                                <p:cTn id="62" presetID="10" presetClass="entr" presetSubtype="0" fill="hold" nodeType="withEffect">
+                                <p:cTn id="47" presetID="10" presetClass="entr" presetSubtype="0" fill="hold" nodeType="withEffect">
                                   <p:stCondLst>
                                     <p:cond delay="0"/>
                                   </p:stCondLst>
                                   <p:childTnLst>
                                     <p:set>
                                       <p:cBhvr>
-                                        <p:cTn id="63" dur="1" fill="hold">
+                                        <p:cTn id="48" dur="1" fill="hold">
                                           <p:stCondLst>
                                             <p:cond delay="0"/>
                                           </p:stCondLst>
@@ -19981,7 +20284,7 @@
                                     </p:set>
                                     <p:animEffect transition="in" filter="fade">
                                       <p:cBhvr>
-                                        <p:cTn id="64" dur="2000"/>
+                                        <p:cTn id="49" dur="2000"/>
                                         <p:tgtEl>
                                           <p:spTgt spid="22"/>
                                         </p:tgtEl>
@@ -19997,26 +20300,26 @@
                     </p:cTn>
                   </p:par>
                   <p:par>
-                    <p:cTn id="65" fill="hold">
+                    <p:cTn id="50" fill="hold">
                       <p:stCondLst>
                         <p:cond delay="indefinite"/>
                       </p:stCondLst>
                       <p:childTnLst>
                         <p:par>
-                          <p:cTn id="66" fill="hold">
+                          <p:cTn id="51" fill="hold">
                             <p:stCondLst>
                               <p:cond delay="0"/>
                             </p:stCondLst>
                             <p:childTnLst>
                               <p:par>
-                                <p:cTn id="67" presetID="3" presetClass="emph" presetSubtype="2" fill="hold" grpId="0" nodeType="clickEffect">
+                                <p:cTn id="52" presetID="3" presetClass="emph" presetSubtype="2" fill="hold" grpId="0" nodeType="clickEffect">
                                   <p:stCondLst>
                                     <p:cond delay="0"/>
                                   </p:stCondLst>
                                   <p:childTnLst>
                                     <p:animClr clrSpc="rgb" dir="cw">
                                       <p:cBhvr override="childStyle">
-                                        <p:cTn id="68" dur="2000" fill="hold"/>
+                                        <p:cTn id="53" dur="2000" fill="hold"/>
                                         <p:tgtEl>
                                           <p:spTgt spid="14"/>
                                         </p:tgtEl>
@@ -20032,14 +20335,14 @@
                                 </p:cTn>
                               </p:par>
                               <p:par>
-                                <p:cTn id="69" presetID="10" presetClass="entr" presetSubtype="0" fill="hold" nodeType="withEffect">
+                                <p:cTn id="54" presetID="10" presetClass="entr" presetSubtype="0" fill="hold" nodeType="withEffect">
                                   <p:stCondLst>
                                     <p:cond delay="0"/>
                                   </p:stCondLst>
                                   <p:childTnLst>
                                     <p:set>
                                       <p:cBhvr>
-                                        <p:cTn id="70" dur="1" fill="hold">
+                                        <p:cTn id="55" dur="1" fill="hold">
                                           <p:stCondLst>
                                             <p:cond delay="0"/>
                                           </p:stCondLst>
@@ -20061,7 +20364,7 @@
                                     </p:set>
                                     <p:animEffect transition="in" filter="fade">
                                       <p:cBhvr>
-                                        <p:cTn id="71" dur="2000"/>
+                                        <p:cTn id="56" dur="2000"/>
                                         <p:tgtEl>
                                           <p:spTgt spid="7">
                                             <p:txEl>
@@ -20075,14 +20378,14 @@
                                 </p:cTn>
                               </p:par>
                               <p:par>
-                                <p:cTn id="72" presetID="10" presetClass="entr" presetSubtype="0" fill="hold" nodeType="withEffect">
+                                <p:cTn id="57" presetID="10" presetClass="entr" presetSubtype="0" fill="hold" nodeType="withEffect">
                                   <p:stCondLst>
                                     <p:cond delay="0"/>
                                   </p:stCondLst>
                                   <p:childTnLst>
                                     <p:set>
                                       <p:cBhvr>
-                                        <p:cTn id="73" dur="1" fill="hold">
+                                        <p:cTn id="58" dur="1" fill="hold">
                                           <p:stCondLst>
                                             <p:cond delay="0"/>
                                           </p:stCondLst>
@@ -20104,7 +20407,7 @@
                                     </p:set>
                                     <p:animEffect transition="in" filter="fade">
                                       <p:cBhvr>
-                                        <p:cTn id="74" dur="2000"/>
+                                        <p:cTn id="59" dur="2000"/>
                                         <p:tgtEl>
                                           <p:spTgt spid="7">
                                             <p:txEl>
@@ -20118,14 +20421,14 @@
                                 </p:cTn>
                               </p:par>
                               <p:par>
-                                <p:cTn id="75" presetID="10" presetClass="entr" presetSubtype="0" fill="hold" nodeType="withEffect">
+                                <p:cTn id="60" presetID="10" presetClass="entr" presetSubtype="0" fill="hold" nodeType="withEffect">
                                   <p:stCondLst>
                                     <p:cond delay="0"/>
                                   </p:stCondLst>
                                   <p:childTnLst>
                                     <p:set>
                                       <p:cBhvr>
-                                        <p:cTn id="76" dur="1" fill="hold">
+                                        <p:cTn id="61" dur="1" fill="hold">
                                           <p:stCondLst>
                                             <p:cond delay="0"/>
                                           </p:stCondLst>
@@ -20147,7 +20450,7 @@
                                     </p:set>
                                     <p:animEffect transition="in" filter="fade">
                                       <p:cBhvr>
-                                        <p:cTn id="77" dur="2000"/>
+                                        <p:cTn id="62" dur="2000"/>
                                         <p:tgtEl>
                                           <p:spTgt spid="7">
                                             <p:txEl>
@@ -20161,14 +20464,14 @@
                                 </p:cTn>
                               </p:par>
                               <p:par>
-                                <p:cTn id="78" presetID="10" presetClass="entr" presetSubtype="0" fill="hold" nodeType="withEffect">
+                                <p:cTn id="63" presetID="10" presetClass="entr" presetSubtype="0" fill="hold" nodeType="withEffect">
                                   <p:stCondLst>
                                     <p:cond delay="0"/>
                                   </p:stCondLst>
                                   <p:childTnLst>
                                     <p:set>
                                       <p:cBhvr>
-                                        <p:cTn id="79" dur="1" fill="hold">
+                                        <p:cTn id="64" dur="1" fill="hold">
                                           <p:stCondLst>
                                             <p:cond delay="0"/>
                                           </p:stCondLst>
@@ -20190,7 +20493,7 @@
                                     </p:set>
                                     <p:animEffect transition="in" filter="fade">
                                       <p:cBhvr>
-                                        <p:cTn id="80" dur="2000"/>
+                                        <p:cTn id="65" dur="2000"/>
                                         <p:tgtEl>
                                           <p:spTgt spid="7">
                                             <p:txEl>
@@ -20204,14 +20507,14 @@
                                 </p:cTn>
                               </p:par>
                               <p:par>
-                                <p:cTn id="81" presetID="10" presetClass="entr" presetSubtype="0" fill="hold" nodeType="withEffect">
+                                <p:cTn id="66" presetID="10" presetClass="entr" presetSubtype="0" fill="hold" nodeType="withEffect">
                                   <p:stCondLst>
                                     <p:cond delay="0"/>
                                   </p:stCondLst>
                                   <p:childTnLst>
                                     <p:set>
                                       <p:cBhvr>
-                                        <p:cTn id="82" dur="1" fill="hold">
+                                        <p:cTn id="67" dur="1" fill="hold">
                                           <p:stCondLst>
                                             <p:cond delay="0"/>
                                           </p:stCondLst>
@@ -20229,7 +20532,7 @@
                                     </p:set>
                                     <p:animEffect transition="in" filter="fade">
                                       <p:cBhvr>
-                                        <p:cTn id="83" dur="2000"/>
+                                        <p:cTn id="68" dur="2000"/>
                                         <p:tgtEl>
                                           <p:spTgt spid="25"/>
                                         </p:tgtEl>
@@ -20239,14 +20542,14 @@
                                 </p:cTn>
                               </p:par>
                               <p:par>
-                                <p:cTn id="84" presetID="10" presetClass="entr" presetSubtype="0" fill="hold" nodeType="withEffect">
+                                <p:cTn id="69" presetID="10" presetClass="entr" presetSubtype="0" fill="hold" nodeType="withEffect">
                                   <p:stCondLst>
                                     <p:cond delay="0"/>
                                   </p:stCondLst>
                                   <p:childTnLst>
                                     <p:set>
                                       <p:cBhvr>
-                                        <p:cTn id="85" dur="1" fill="hold">
+                                        <p:cTn id="70" dur="1" fill="hold">
                                           <p:stCondLst>
                                             <p:cond delay="0"/>
                                           </p:stCondLst>
@@ -20264,7 +20567,7 @@
                                     </p:set>
                                     <p:animEffect transition="in" filter="fade">
                                       <p:cBhvr>
-                                        <p:cTn id="86" dur="2000"/>
+                                        <p:cTn id="71" dur="2000"/>
                                         <p:tgtEl>
                                           <p:spTgt spid="26"/>
                                         </p:tgtEl>
@@ -20543,6 +20846,36 @@
           <a:xfrm>
             <a:off x="5400675" y="2895600"/>
             <a:ext cx="390525" cy="381000"/>
+          </a:xfrm>
+          <a:prstGeom prst="rect">
+            <a:avLst/>
+          </a:prstGeom>
+        </p:spPr>
+      </p:pic>
+      <p:pic>
+        <p:nvPicPr>
+          <p:cNvPr id="9" name="תמונה 8"/>
+          <p:cNvPicPr>
+            <a:picLocks noChangeAspect="1"/>
+          </p:cNvPicPr>
+          <p:nvPr/>
+        </p:nvPicPr>
+        <p:blipFill>
+          <a:blip r:embed="rId4">
+            <a:extLst>
+              <a:ext uri="{28A0092B-C50C-407E-A947-70E740481C1C}">
+                <a14:useLocalDpi xmlns:a14="http://schemas.microsoft.com/office/drawing/2010/main" val="0"/>
+              </a:ext>
+            </a:extLst>
+          </a:blip>
+          <a:stretch>
+            <a:fillRect/>
+          </a:stretch>
+        </p:blipFill>
+        <p:spPr>
+          <a:xfrm>
+            <a:off x="6019800" y="3620373"/>
+            <a:ext cx="2209800" cy="2856627"/>
           </a:xfrm>
           <a:prstGeom prst="rect">
             <a:avLst/>

</xml_diff>

<commit_message>
Add background and transparent pics
</commit_message>
<xml_diff>
--- a/presentation/Introduction to Gradle.pptx
+++ b/presentation/Introduction to Gradle.pptx
@@ -6,7 +6,7 @@
     <p:sldMasterId id="2147483661" r:id="rId2"/>
   </p:sldMasterIdLst>
   <p:notesMasterIdLst>
-    <p:notesMasterId r:id="rId26"/>
+    <p:notesMasterId r:id="rId27"/>
   </p:notesMasterIdLst>
   <p:sldIdLst>
     <p:sldId id="256" r:id="rId3"/>
@@ -28,10 +28,11 @@
     <p:sldId id="265" r:id="rId19"/>
     <p:sldId id="266" r:id="rId20"/>
     <p:sldId id="271" r:id="rId21"/>
-    <p:sldId id="294" r:id="rId22"/>
-    <p:sldId id="293" r:id="rId23"/>
-    <p:sldId id="273" r:id="rId24"/>
-    <p:sldId id="275" r:id="rId25"/>
+    <p:sldId id="293" r:id="rId22"/>
+    <p:sldId id="273" r:id="rId23"/>
+    <p:sldId id="275" r:id="rId24"/>
+    <p:sldId id="295" r:id="rId25"/>
+    <p:sldId id="296" r:id="rId26"/>
   </p:sldIdLst>
   <p:sldSz cx="9144000" cy="6858000" type="screen4x3"/>
   <p:notesSz cx="7559675" cy="10691813"/>
@@ -797,6 +798,107 @@
       </p:grpSpPr>
       <p:sp>
         <p:nvSpPr>
+          <p:cNvPr id="2" name="מציין מיקום של תמונת שקופית 1"/>
+          <p:cNvSpPr>
+            <a:spLocks noGrp="1" noRot="1" noChangeAspect="1"/>
+          </p:cNvSpPr>
+          <p:nvPr>
+            <p:ph type="sldImg"/>
+          </p:nvPr>
+        </p:nvSpPr>
+        <p:spPr>
+          <a:xfrm>
+            <a:off x="1106488" y="801688"/>
+            <a:ext cx="5346700" cy="4010025"/>
+          </a:xfrm>
+          <a:prstGeom prst="rect">
+            <a:avLst/>
+          </a:prstGeom>
+          <a:noFill/>
+          <a:ln w="12700">
+            <a:solidFill>
+              <a:prstClr val="black"/>
+            </a:solidFill>
+          </a:ln>
+        </p:spPr>
+      </p:sp>
+      <p:sp>
+        <p:nvSpPr>
+          <p:cNvPr id="3" name="מציין מיקום של הערות 2"/>
+          <p:cNvSpPr>
+            <a:spLocks noGrp="1"/>
+          </p:cNvSpPr>
+          <p:nvPr>
+            <p:ph type="body" idx="1"/>
+          </p:nvPr>
+        </p:nvSpPr>
+        <p:spPr/>
+        <p:txBody>
+          <a:bodyPr/>
+          <a:lstStyle/>
+          <a:p>
+            <a:endParaRPr lang="he-IL" dirty="0"/>
+          </a:p>
+        </p:txBody>
+      </p:sp>
+      <p:sp>
+        <p:nvSpPr>
+          <p:cNvPr id="4" name="מציין מיקום של מספר שקופית 3"/>
+          <p:cNvSpPr>
+            <a:spLocks noGrp="1"/>
+          </p:cNvSpPr>
+          <p:nvPr>
+            <p:ph type="sldNum" idx="10"/>
+          </p:nvPr>
+        </p:nvSpPr>
+        <p:spPr/>
+        <p:txBody>
+          <a:bodyPr/>
+          <a:lstStyle/>
+          <a:p>
+            <a:pPr algn="r"/>
+            <a:fld id="{56E24ABB-6974-4A56-9206-79FAA3B15D9D}" type="slidenum">
+              <a:rPr lang="en-US" sz="1400" smtClean="0">
+                <a:latin typeface="Times New Roman"/>
+              </a:rPr>
+              <a:t>18</a:t>
+            </a:fld>
+            <a:endParaRPr lang="en-US"/>
+          </a:p>
+        </p:txBody>
+      </p:sp>
+    </p:spTree>
+    <p:extLst>
+      <p:ext uri="{BB962C8B-B14F-4D97-AF65-F5344CB8AC3E}">
+        <p14:creationId xmlns:p14="http://schemas.microsoft.com/office/powerpoint/2010/main" val="3519243259"/>
+      </p:ext>
+    </p:extLst>
+  </p:cSld>
+  <p:clrMapOvr>
+    <a:masterClrMapping/>
+  </p:clrMapOvr>
+</p:notes>
+</file>
+
+<file path=ppt/notesSlides/notesSlide6.xml><?xml version="1.0" encoding="utf-8"?>
+<p:notes xmlns:a="http://schemas.openxmlformats.org/drawingml/2006/main" xmlns:r="http://schemas.openxmlformats.org/officeDocument/2006/relationships" xmlns:p="http://schemas.openxmlformats.org/presentationml/2006/main">
+  <p:cSld>
+    <p:spTree>
+      <p:nvGrpSpPr>
+        <p:cNvPr id="1" name=""/>
+        <p:cNvGrpSpPr/>
+        <p:nvPr/>
+      </p:nvGrpSpPr>
+      <p:grpSpPr>
+        <a:xfrm>
+          <a:off x="0" y="0"/>
+          <a:ext cx="0" cy="0"/>
+          <a:chOff x="0" y="0"/>
+          <a:chExt cx="0" cy="0"/>
+        </a:xfrm>
+      </p:grpSpPr>
+      <p:sp>
+        <p:nvSpPr>
           <p:cNvPr id="2" name="Slide Image Placeholder 1"/>
           <p:cNvSpPr>
             <a:spLocks noGrp="1" noRot="1" noChangeAspect="1"/>
@@ -895,7 +997,7 @@
               <a:rPr lang="en-US" sz="1400" smtClean="0">
                 <a:latin typeface="Times New Roman"/>
               </a:rPr>
-              <a:t>23</a:t>
+              <a:t>22</a:t>
             </a:fld>
             <a:endParaRPr lang="en-US"/>
           </a:p>
@@ -3351,9 +3453,16 @@
   <p:cSld>
     <p:bg>
       <p:bgPr>
-        <a:solidFill>
-          <a:srgbClr val="FFFFFF"/>
-        </a:solidFill>
+        <a:blipFill dpi="0" rotWithShape="1">
+          <a:blip r:embed="rId14">
+            <a:alphaModFix amt="50000"/>
+            <a:lum/>
+          </a:blip>
+          <a:srcRect/>
+          <a:stretch>
+            <a:fillRect/>
+          </a:stretch>
+        </a:blipFill>
         <a:effectLst/>
       </p:bgPr>
     </p:bg>
@@ -3674,9 +3783,16 @@
   <p:cSld>
     <p:bg>
       <p:bgPr>
-        <a:solidFill>
-          <a:srgbClr val="FFFFFF"/>
-        </a:solidFill>
+        <a:blipFill dpi="0" rotWithShape="1">
+          <a:blip r:embed="rId14">
+            <a:alphaModFix amt="50000"/>
+            <a:lum/>
+          </a:blip>
+          <a:srcRect/>
+          <a:stretch>
+            <a:fillRect/>
+          </a:stretch>
+        </a:blipFill>
         <a:effectLst/>
       </p:bgPr>
     </p:bg>
@@ -4094,6 +4210,21 @@
 <file path=ppt/slides/slide1.xml><?xml version="1.0" encoding="utf-8"?>
 <p:sld xmlns:a="http://schemas.openxmlformats.org/drawingml/2006/main" xmlns:r="http://schemas.openxmlformats.org/officeDocument/2006/relationships" xmlns:p="http://schemas.openxmlformats.org/presentationml/2006/main">
   <p:cSld>
+    <p:bg>
+      <p:bgPr>
+        <a:blipFill dpi="0" rotWithShape="1">
+          <a:blip r:embed="rId2">
+            <a:alphaModFix amt="40000"/>
+            <a:lum/>
+          </a:blip>
+          <a:srcRect/>
+          <a:stretch>
+            <a:fillRect/>
+          </a:stretch>
+        </a:blipFill>
+        <a:effectLst/>
+      </p:bgPr>
+    </p:bg>
     <p:spTree>
       <p:nvGrpSpPr>
         <p:cNvPr id="1" name=""/>
@@ -4319,7 +4450,7 @@
       </p:sp>
       <p:pic>
         <p:nvPicPr>
-          <p:cNvPr id="3" name="תמונה 2"/>
+          <p:cNvPr id="2" name="תמונה 1"/>
           <p:cNvPicPr>
             <a:picLocks noChangeAspect="1"/>
           </p:cNvPicPr>
@@ -4339,8 +4470,8 @@
         </p:blipFill>
         <p:spPr>
           <a:xfrm>
-            <a:off x="1371600" y="1451487"/>
-            <a:ext cx="6629400" cy="5025513"/>
+            <a:off x="1676400" y="1371600"/>
+            <a:ext cx="6544046" cy="4960810"/>
           </a:xfrm>
           <a:prstGeom prst="rect">
             <a:avLst/>
@@ -4677,8 +4808,13 @@
             <a:avLst/>
           </a:prstGeom>
           <a:noFill/>
-          <a:ln>
-            <a:noFill/>
+          <a:ln w="9525">
+            <a:solidFill>
+              <a:schemeClr val="tx1"/>
+            </a:solidFill>
+            <a:miter lim="800000"/>
+            <a:headEnd/>
+            <a:tailEnd/>
           </a:ln>
           <a:extLst>
             <a:ext uri="{909E8E84-426E-40DD-AFC4-6F175D3DCCD1}">
@@ -4687,16 +4823,6 @@
                   <a:schemeClr val="accent1"/>
                 </a:solidFill>
               </a14:hiddenFill>
-            </a:ext>
-            <a:ext uri="{91240B29-F687-4F45-9708-019B960494DF}">
-              <a14:hiddenLine xmlns:a14="http://schemas.microsoft.com/office/drawing/2010/main" w="9525">
-                <a:solidFill>
-                  <a:schemeClr val="tx1"/>
-                </a:solidFill>
-                <a:miter lim="800000"/>
-                <a:headEnd/>
-                <a:tailEnd/>
-              </a14:hiddenLine>
             </a:ext>
           </a:extLst>
         </p:spPr>
@@ -4795,7 +4921,7 @@
       </p:sp>
       <p:pic>
         <p:nvPicPr>
-          <p:cNvPr id="2" name="תמונה 1"/>
+          <p:cNvPr id="3" name="תמונה 2"/>
           <p:cNvPicPr>
             <a:picLocks noChangeAspect="1"/>
           </p:cNvPicPr>
@@ -4815,8 +4941,8 @@
         </p:blipFill>
         <p:spPr>
           <a:xfrm>
-            <a:off x="1219200" y="1435703"/>
-            <a:ext cx="6705600" cy="4965097"/>
+            <a:off x="1066620" y="1439091"/>
+            <a:ext cx="7010400" cy="5190783"/>
           </a:xfrm>
           <a:prstGeom prst="rect">
             <a:avLst/>
@@ -6341,7 +6467,15 @@
             </a:pPr>
             <a:r>
               <a:rPr lang="en-US" sz="2800" dirty="0" smtClean="0"/>
-              <a:t>Create distribution file (jar)</a:t>
+              <a:t>Create </a:t>
+            </a:r>
+            <a:r>
+              <a:rPr lang="en-US" sz="2800" dirty="0" smtClean="0"/>
+              <a:t>a distribution </a:t>
+            </a:r>
+            <a:r>
+              <a:rPr lang="en-US" sz="2800" dirty="0" smtClean="0"/>
+              <a:t>file (jar)</a:t>
             </a:r>
           </a:p>
         </p:txBody>
@@ -6379,7 +6513,7 @@
       </p:sp>
       <p:pic>
         <p:nvPicPr>
-          <p:cNvPr id="3" name="תמונה 2"/>
+          <p:cNvPr id="11" name="תמונה 10"/>
           <p:cNvPicPr>
             <a:picLocks noChangeAspect="1"/>
           </p:cNvPicPr>
@@ -6399,8 +6533,8 @@
         </p:blipFill>
         <p:spPr>
           <a:xfrm>
-            <a:off x="5400675" y="1981200"/>
-            <a:ext cx="390525" cy="381000"/>
+            <a:off x="6400800" y="3520080"/>
+            <a:ext cx="1981199" cy="2856627"/>
           </a:xfrm>
           <a:prstGeom prst="rect">
             <a:avLst/>
@@ -6409,67 +6543,7 @@
       </p:pic>
       <p:pic>
         <p:nvPicPr>
-          <p:cNvPr id="6" name="תמונה 5"/>
-          <p:cNvPicPr>
-            <a:picLocks noChangeAspect="1"/>
-          </p:cNvPicPr>
-          <p:nvPr/>
-        </p:nvPicPr>
-        <p:blipFill>
-          <a:blip r:embed="rId2">
-            <a:extLst>
-              <a:ext uri="{28A0092B-C50C-407E-A947-70E740481C1C}">
-                <a14:useLocalDpi xmlns:a14="http://schemas.microsoft.com/office/drawing/2010/main" val="0"/>
-              </a:ext>
-            </a:extLst>
-          </a:blip>
-          <a:stretch>
-            <a:fillRect/>
-          </a:stretch>
-        </p:blipFill>
-        <p:spPr>
-          <a:xfrm>
-            <a:off x="5400675" y="2438400"/>
-            <a:ext cx="390525" cy="381000"/>
-          </a:xfrm>
-          <a:prstGeom prst="rect">
-            <a:avLst/>
-          </a:prstGeom>
-        </p:spPr>
-      </p:pic>
-      <p:pic>
-        <p:nvPicPr>
-          <p:cNvPr id="8" name="תמונה 7"/>
-          <p:cNvPicPr>
-            <a:picLocks noChangeAspect="1"/>
-          </p:cNvPicPr>
-          <p:nvPr/>
-        </p:nvPicPr>
-        <p:blipFill>
-          <a:blip r:embed="rId2">
-            <a:extLst>
-              <a:ext uri="{28A0092B-C50C-407E-A947-70E740481C1C}">
-                <a14:useLocalDpi xmlns:a14="http://schemas.microsoft.com/office/drawing/2010/main" val="0"/>
-              </a:ext>
-            </a:extLst>
-          </a:blip>
-          <a:stretch>
-            <a:fillRect/>
-          </a:stretch>
-        </p:blipFill>
-        <p:spPr>
-          <a:xfrm>
-            <a:off x="5400675" y="2895600"/>
-            <a:ext cx="390525" cy="381000"/>
-          </a:xfrm>
-          <a:prstGeom prst="rect">
-            <a:avLst/>
-          </a:prstGeom>
-        </p:spPr>
-      </p:pic>
-      <p:pic>
-        <p:nvPicPr>
-          <p:cNvPr id="9" name="תמונה 8"/>
+          <p:cNvPr id="2" name="תמונה 1"/>
           <p:cNvPicPr>
             <a:picLocks noChangeAspect="1"/>
           </p:cNvPicPr>
@@ -6489,8 +6563,8 @@
         </p:blipFill>
         <p:spPr>
           <a:xfrm>
-            <a:off x="6019800" y="3620373"/>
-            <a:ext cx="2209800" cy="2856627"/>
+            <a:off x="5781674" y="2895600"/>
+            <a:ext cx="390525" cy="381000"/>
           </a:xfrm>
           <a:prstGeom prst="rect">
             <a:avLst/>
@@ -6499,14 +6573,14 @@
       </p:pic>
       <p:pic>
         <p:nvPicPr>
-          <p:cNvPr id="10" name="תמונה 9"/>
+          <p:cNvPr id="12" name="תמונה 11"/>
           <p:cNvPicPr>
             <a:picLocks noChangeAspect="1"/>
           </p:cNvPicPr>
           <p:nvPr/>
         </p:nvPicPr>
         <p:blipFill>
-          <a:blip r:embed="rId2">
+          <a:blip r:embed="rId3">
             <a:extLst>
               <a:ext uri="{28A0092B-C50C-407E-A947-70E740481C1C}">
                 <a14:useLocalDpi xmlns:a14="http://schemas.microsoft.com/office/drawing/2010/main" val="0"/>
@@ -6519,7 +6593,67 @@
         </p:blipFill>
         <p:spPr>
           <a:xfrm>
-            <a:off x="6467475" y="1524000"/>
+            <a:off x="5781673" y="2409631"/>
+            <a:ext cx="390525" cy="381000"/>
+          </a:xfrm>
+          <a:prstGeom prst="rect">
+            <a:avLst/>
+          </a:prstGeom>
+        </p:spPr>
+      </p:pic>
+      <p:pic>
+        <p:nvPicPr>
+          <p:cNvPr id="13" name="תמונה 12"/>
+          <p:cNvPicPr>
+            <a:picLocks noChangeAspect="1"/>
+          </p:cNvPicPr>
+          <p:nvPr/>
+        </p:nvPicPr>
+        <p:blipFill>
+          <a:blip r:embed="rId3">
+            <a:extLst>
+              <a:ext uri="{28A0092B-C50C-407E-A947-70E740481C1C}">
+                <a14:useLocalDpi xmlns:a14="http://schemas.microsoft.com/office/drawing/2010/main" val="0"/>
+              </a:ext>
+            </a:extLst>
+          </a:blip>
+          <a:stretch>
+            <a:fillRect/>
+          </a:stretch>
+        </p:blipFill>
+        <p:spPr>
+          <a:xfrm>
+            <a:off x="5781674" y="2019301"/>
+            <a:ext cx="390525" cy="381000"/>
+          </a:xfrm>
+          <a:prstGeom prst="rect">
+            <a:avLst/>
+          </a:prstGeom>
+        </p:spPr>
+      </p:pic>
+      <p:pic>
+        <p:nvPicPr>
+          <p:cNvPr id="14" name="תמונה 13"/>
+          <p:cNvPicPr>
+            <a:picLocks noChangeAspect="1"/>
+          </p:cNvPicPr>
+          <p:nvPr/>
+        </p:nvPicPr>
+        <p:blipFill>
+          <a:blip r:embed="rId3">
+            <a:extLst>
+              <a:ext uri="{28A0092B-C50C-407E-A947-70E740481C1C}">
+                <a14:useLocalDpi xmlns:a14="http://schemas.microsoft.com/office/drawing/2010/main" val="0"/>
+              </a:ext>
+            </a:extLst>
+          </a:blip>
+          <a:stretch>
+            <a:fillRect/>
+          </a:stretch>
+        </p:blipFill>
+        <p:spPr>
+          <a:xfrm>
+            <a:off x="6467474" y="1524000"/>
             <a:ext cx="390525" cy="381000"/>
           </a:xfrm>
           <a:prstGeom prst="rect">
@@ -7082,27 +7216,32 @@
       </p:sp>
       <p:pic>
         <p:nvPicPr>
-          <p:cNvPr id="107" name="Picture 2"/>
-          <p:cNvPicPr/>
+          <p:cNvPr id="3" name="תמונה 2"/>
+          <p:cNvPicPr>
+            <a:picLocks noChangeAspect="1"/>
+          </p:cNvPicPr>
           <p:nvPr/>
         </p:nvPicPr>
         <p:blipFill>
-          <a:blip r:embed="rId2"/>
+          <a:blip r:embed="rId2">
+            <a:extLst>
+              <a:ext uri="{28A0092B-C50C-407E-A947-70E740481C1C}">
+                <a14:useLocalDpi xmlns:a14="http://schemas.microsoft.com/office/drawing/2010/main" val="0"/>
+              </a:ext>
+            </a:extLst>
+          </a:blip>
           <a:stretch>
             <a:fillRect/>
           </a:stretch>
         </p:blipFill>
         <p:spPr>
           <a:xfrm>
-            <a:off x="6818280" y="4988280"/>
-            <a:ext cx="1944720" cy="1641120"/>
-          </a:xfrm>
-          <a:prstGeom prst="rect">
-            <a:avLst/>
-          </a:prstGeom>
-          <a:ln>
-            <a:noFill/>
-          </a:ln>
+            <a:off x="6819629" y="4988280"/>
+            <a:ext cx="1943371" cy="1644385"/>
+          </a:xfrm>
+          <a:prstGeom prst="rect">
+            <a:avLst/>
+          </a:prstGeom>
         </p:spPr>
       </p:pic>
     </p:spTree>
@@ -7241,7 +7380,7 @@
             <a:r>
               <a:rPr lang="en-US" sz="2000" dirty="0">
                 <a:solidFill>
-                  <a:srgbClr val="00B0F0"/>
+                  <a:srgbClr val="002060"/>
                 </a:solidFill>
               </a:rPr>
               <a:t>group = </a:t>
@@ -7249,7 +7388,7 @@
             <a:r>
               <a:rPr lang="en-US" sz="2000" dirty="0" smtClean="0">
                 <a:solidFill>
-                  <a:srgbClr val="00B0F0"/>
+                  <a:srgbClr val="002060"/>
                 </a:solidFill>
               </a:rPr>
               <a:t>'</a:t>
@@ -7257,7 +7396,7 @@
             <a:r>
               <a:rPr lang="en-US" sz="2000" dirty="0" err="1" smtClean="0">
                 <a:solidFill>
-                  <a:srgbClr val="00B0F0"/>
+                  <a:srgbClr val="002060"/>
                 </a:solidFill>
               </a:rPr>
               <a:t>org.gradleintro</a:t>
@@ -7265,14 +7404,14 @@
             <a:r>
               <a:rPr lang="en-US" sz="2000" dirty="0" smtClean="0">
                 <a:solidFill>
-                  <a:srgbClr val="00B0F0"/>
+                  <a:srgbClr val="002060"/>
                 </a:solidFill>
               </a:rPr>
               <a:t>'</a:t>
             </a:r>
             <a:endParaRPr sz="2000" dirty="0">
               <a:solidFill>
-                <a:srgbClr val="00B0F0"/>
+                <a:srgbClr val="002060"/>
               </a:solidFill>
             </a:endParaRPr>
           </a:p>
@@ -7283,14 +7422,14 @@
             <a:r>
               <a:rPr lang="en-US" sz="2000" dirty="0">
                 <a:solidFill>
-                  <a:srgbClr val="00B0F0"/>
+                  <a:srgbClr val="002060"/>
                 </a:solidFill>
               </a:rPr>
               <a:t>version = '1.0-SNAPSHOT'</a:t>
             </a:r>
             <a:endParaRPr sz="2000" dirty="0">
               <a:solidFill>
-                <a:srgbClr val="00B0F0"/>
+                <a:srgbClr val="002060"/>
               </a:solidFill>
             </a:endParaRPr>
           </a:p>
@@ -7423,7 +7562,7 @@
             <a:r>
               <a:rPr lang="en-US" sz="2000" dirty="0">
                 <a:solidFill>
-                  <a:srgbClr val="00B0F0"/>
+                  <a:srgbClr val="002060"/>
                 </a:solidFill>
               </a:rPr>
               <a:t>&lt;</a:t>
@@ -7431,7 +7570,7 @@
             <a:r>
               <a:rPr lang="en-US" sz="2000" dirty="0" err="1" smtClean="0">
                 <a:solidFill>
-                  <a:srgbClr val="00B0F0"/>
+                  <a:srgbClr val="002060"/>
                 </a:solidFill>
               </a:rPr>
               <a:t>groupId</a:t>
@@ -7439,7 +7578,7 @@
             <a:r>
               <a:rPr lang="en-US" sz="2000" dirty="0" smtClean="0">
                 <a:solidFill>
-                  <a:srgbClr val="00B0F0"/>
+                  <a:srgbClr val="002060"/>
                 </a:solidFill>
               </a:rPr>
               <a:t>&gt;</a:t>
@@ -7447,7 +7586,7 @@
             <a:r>
               <a:rPr lang="en-US" sz="2000" dirty="0" err="1" smtClean="0">
                 <a:solidFill>
-                  <a:srgbClr val="00B0F0"/>
+                  <a:srgbClr val="002060"/>
                 </a:solidFill>
               </a:rPr>
               <a:t>org.gradleintro</a:t>
@@ -7455,7 +7594,7 @@
             <a:r>
               <a:rPr lang="en-US" sz="2000" dirty="0" smtClean="0">
                 <a:solidFill>
-                  <a:srgbClr val="00B0F0"/>
+                  <a:srgbClr val="002060"/>
                 </a:solidFill>
               </a:rPr>
               <a:t>&lt;/</a:t>
@@ -7463,7 +7602,7 @@
             <a:r>
               <a:rPr lang="en-US" sz="2000" dirty="0" err="1">
                 <a:solidFill>
-                  <a:srgbClr val="00B0F0"/>
+                  <a:srgbClr val="002060"/>
                 </a:solidFill>
               </a:rPr>
               <a:t>groupId</a:t>
@@ -7471,14 +7610,14 @@
             <a:r>
               <a:rPr lang="en-US" sz="2000" dirty="0">
                 <a:solidFill>
-                  <a:srgbClr val="00B0F0"/>
+                  <a:srgbClr val="002060"/>
                 </a:solidFill>
               </a:rPr>
               <a:t>&gt;</a:t>
             </a:r>
             <a:endParaRPr sz="2000" dirty="0">
               <a:solidFill>
-                <a:srgbClr val="00B0F0"/>
+                <a:srgbClr val="002060"/>
               </a:solidFill>
             </a:endParaRPr>
           </a:p>
@@ -7489,7 +7628,7 @@
             <a:r>
               <a:rPr lang="en-US" sz="2000" dirty="0">
                 <a:solidFill>
-                  <a:srgbClr val="00B0F0"/>
+                  <a:srgbClr val="002060"/>
                 </a:solidFill>
               </a:rPr>
               <a:t>    &lt;</a:t>
@@ -7497,7 +7636,7 @@
             <a:r>
               <a:rPr lang="en-US" sz="2000" dirty="0" err="1">
                 <a:solidFill>
-                  <a:srgbClr val="00B0F0"/>
+                  <a:srgbClr val="002060"/>
                 </a:solidFill>
               </a:rPr>
               <a:t>artifactId</a:t>
@@ -7505,7 +7644,7 @@
             <a:r>
               <a:rPr lang="en-US" sz="2000" dirty="0">
                 <a:solidFill>
-                  <a:srgbClr val="00B0F0"/>
+                  <a:srgbClr val="002060"/>
                 </a:solidFill>
               </a:rPr>
               <a:t>&gt;example&lt;/</a:t>
@@ -7513,7 +7652,7 @@
             <a:r>
               <a:rPr lang="en-US" sz="2000" dirty="0" err="1">
                 <a:solidFill>
-                  <a:srgbClr val="00B0F0"/>
+                  <a:srgbClr val="002060"/>
                 </a:solidFill>
               </a:rPr>
               <a:t>artifactId</a:t>
@@ -7521,14 +7660,14 @@
             <a:r>
               <a:rPr lang="en-US" sz="2000" dirty="0">
                 <a:solidFill>
-                  <a:srgbClr val="00B0F0"/>
+                  <a:srgbClr val="002060"/>
                 </a:solidFill>
               </a:rPr>
               <a:t>&gt;</a:t>
             </a:r>
             <a:endParaRPr sz="2000" dirty="0">
               <a:solidFill>
-                <a:srgbClr val="00B0F0"/>
+                <a:srgbClr val="002060"/>
               </a:solidFill>
             </a:endParaRPr>
           </a:p>
@@ -7539,14 +7678,14 @@
             <a:r>
               <a:rPr lang="en-US" sz="2000" dirty="0">
                 <a:solidFill>
-                  <a:srgbClr val="00B0F0"/>
+                  <a:srgbClr val="002060"/>
                 </a:solidFill>
               </a:rPr>
               <a:t>    &lt;version&gt;1.0-SNAPSHOT&lt;/version&gt;</a:t>
             </a:r>
             <a:endParaRPr sz="2000" dirty="0">
               <a:solidFill>
-                <a:srgbClr val="00B0F0"/>
+                <a:srgbClr val="002060"/>
               </a:solidFill>
             </a:endParaRPr>
           </a:p>
@@ -7557,14 +7696,14 @@
             <a:r>
               <a:rPr lang="en-US" sz="2000" dirty="0">
                 <a:solidFill>
-                  <a:srgbClr val="00B0F0"/>
+                  <a:srgbClr val="002060"/>
                 </a:solidFill>
               </a:rPr>
               <a:t>    &lt;packaging&gt;jar&lt;/packaging&gt;</a:t>
             </a:r>
             <a:endParaRPr sz="2000" dirty="0">
               <a:solidFill>
-                <a:srgbClr val="00B0F0"/>
+                <a:srgbClr val="002060"/>
               </a:solidFill>
             </a:endParaRPr>
           </a:p>
@@ -7947,6 +8086,18 @@
 <file path=ppt/slides/slide2.xml><?xml version="1.0" encoding="utf-8"?>
 <p:sld xmlns:a="http://schemas.openxmlformats.org/drawingml/2006/main" xmlns:r="http://schemas.openxmlformats.org/officeDocument/2006/relationships" xmlns:p="http://schemas.openxmlformats.org/presentationml/2006/main">
   <p:cSld>
+    <p:bg>
+      <p:bgPr>
+        <a:blipFill dpi="0" rotWithShape="1">
+          <a:blip r:embed="rId2">
+            <a:alphaModFix amt="50000"/>
+          </a:blip>
+          <a:srcRect/>
+          <a:tile tx="0" ty="0" sx="100000" sy="100000" flip="none" algn="tl"/>
+        </a:blipFill>
+        <a:effectLst/>
+      </p:bgPr>
+    </p:bg>
     <p:spTree>
       <p:nvGrpSpPr>
         <p:cNvPr id="1" name=""/>
@@ -8138,276 +8289,37 @@
       </p:grpSpPr>
       <p:sp>
         <p:nvSpPr>
-          <p:cNvPr id="108" name="TextShape 1"/>
-          <p:cNvSpPr txBox="1"/>
-          <p:nvPr/>
-        </p:nvSpPr>
-        <p:spPr>
-          <a:xfrm>
-            <a:off x="457200" y="274680"/>
-            <a:ext cx="8229240" cy="1142640"/>
-          </a:xfrm>
-          <a:prstGeom prst="rect">
-            <a:avLst/>
-          </a:prstGeom>
-        </p:spPr>
-        <p:txBody>
-          <a:bodyPr anchor="ctr"/>
-          <a:lstStyle/>
-          <a:p>
-            <a:r>
-              <a:rPr lang="en-US" sz="3600" dirty="0">
-                <a:latin typeface="Calibri"/>
-              </a:rPr>
-              <a:t>Gradle – </a:t>
-            </a:r>
-            <a:r>
-              <a:rPr lang="en-US" sz="3600" dirty="0" smtClean="0">
-                <a:latin typeface="Calibri"/>
-              </a:rPr>
-              <a:t>Resources</a:t>
-            </a:r>
-            <a:endParaRPr dirty="0"/>
-          </a:p>
-        </p:txBody>
-      </p:sp>
-      <p:sp>
-        <p:nvSpPr>
-          <p:cNvPr id="109" name="TextShape 2"/>
-          <p:cNvSpPr txBox="1"/>
-          <p:nvPr/>
-        </p:nvSpPr>
-        <p:spPr>
-          <a:xfrm>
-            <a:off x="152400" y="1447800"/>
-            <a:ext cx="8763000" cy="5029200"/>
-          </a:xfrm>
-          <a:prstGeom prst="rect">
-            <a:avLst/>
-          </a:prstGeom>
-        </p:spPr>
+          <p:cNvPr id="4" name="Subtitle 3"/>
+          <p:cNvSpPr>
+            <a:spLocks noGrp="1"/>
+          </p:cNvSpPr>
+          <p:nvPr>
+            <p:ph type="subTitle"/>
+          </p:nvPr>
+        </p:nvSpPr>
+        <p:spPr/>
         <p:txBody>
           <a:bodyPr/>
           <a:lstStyle/>
           <a:p>
-            <a:pPr marL="342900" indent="-342900">
-              <a:buSzPct val="45000"/>
-              <a:buFont typeface="Arial" panose="020B0604020202020204" pitchFamily="34" charset="0"/>
-              <a:buChar char="•"/>
-            </a:pPr>
-            <a:r>
-              <a:rPr lang="en-US" sz="2000" dirty="0" smtClean="0"/>
-              <a:t>Documentation:</a:t>
-            </a:r>
-          </a:p>
-          <a:p>
-            <a:pPr lvl="1">
-              <a:buSzPct val="45000"/>
-            </a:pPr>
-            <a:endParaRPr lang="en-US" sz="1200" dirty="0" smtClean="0"/>
-          </a:p>
-          <a:p>
-            <a:pPr marL="800100" lvl="1" indent="-342900">
-              <a:buSzPct val="45000"/>
-              <a:buFont typeface="Arial" panose="020B0604020202020204" pitchFamily="34" charset="0"/>
-              <a:buChar char="•"/>
-            </a:pPr>
-            <a:r>
-              <a:rPr lang="en-US" sz="2000" dirty="0" smtClean="0"/>
-              <a:t>User guide: </a:t>
-            </a:r>
-            <a:r>
-              <a:rPr lang="en-US" sz="2000" dirty="0">
-                <a:hlinkClick r:id="rId2"/>
-              </a:rPr>
-              <a:t>http://</a:t>
-            </a:r>
-            <a:r>
-              <a:rPr lang="en-US" sz="2000" dirty="0" smtClean="0">
-                <a:hlinkClick r:id="rId2"/>
-              </a:rPr>
-              <a:t>www.gradle.org/docs/current/userguide/userguide.html</a:t>
-            </a:r>
-            <a:endParaRPr lang="en-US" sz="2000" dirty="0" smtClean="0"/>
-          </a:p>
-          <a:p>
-            <a:pPr lvl="1">
-              <a:buSzPct val="45000"/>
-            </a:pPr>
-            <a:endParaRPr lang="en-US" sz="1200" dirty="0"/>
-          </a:p>
-          <a:p>
-            <a:pPr marL="800100" lvl="1" indent="-342900">
-              <a:buSzPct val="45000"/>
-              <a:buFont typeface="Arial" panose="020B0604020202020204" pitchFamily="34" charset="0"/>
-              <a:buChar char="•"/>
-            </a:pPr>
-            <a:r>
-              <a:rPr lang="en-US" sz="2000" dirty="0" smtClean="0"/>
-              <a:t>DSL:</a:t>
-            </a:r>
-          </a:p>
-          <a:p>
-            <a:pPr lvl="1">
-              <a:buSzPct val="45000"/>
-            </a:pPr>
-            <a:r>
-              <a:rPr lang="en-US" sz="2000" dirty="0"/>
-              <a:t> </a:t>
-            </a:r>
-            <a:r>
-              <a:rPr lang="en-US" sz="2000" dirty="0" smtClean="0"/>
-              <a:t>    </a:t>
-            </a:r>
-            <a:r>
-              <a:rPr lang="en-US" sz="2000" dirty="0" smtClean="0">
-                <a:hlinkClick r:id="rId3"/>
-              </a:rPr>
-              <a:t>http</a:t>
-            </a:r>
-            <a:r>
-              <a:rPr lang="en-US" sz="2000" dirty="0">
-                <a:hlinkClick r:id="rId3"/>
-              </a:rPr>
-              <a:t>://www.gradle.org/docs/current/dsl</a:t>
-            </a:r>
-            <a:r>
-              <a:rPr lang="en-US" sz="2000" dirty="0" smtClean="0">
-                <a:hlinkClick r:id="rId3"/>
-              </a:rPr>
-              <a:t>/</a:t>
-            </a:r>
-            <a:endParaRPr lang="en-US" sz="2000" dirty="0" smtClean="0"/>
-          </a:p>
-          <a:p>
-            <a:pPr lvl="1">
-              <a:buSzPct val="45000"/>
-            </a:pPr>
-            <a:endParaRPr lang="en-US" sz="1200" dirty="0" smtClean="0"/>
-          </a:p>
-          <a:p>
-            <a:pPr marL="800100" lvl="1" indent="-342900">
-              <a:buSzPct val="45000"/>
-              <a:buFont typeface="Arial" panose="020B0604020202020204" pitchFamily="34" charset="0"/>
-              <a:buChar char="•"/>
-            </a:pPr>
-            <a:r>
-              <a:rPr lang="en-US" sz="2000" dirty="0" smtClean="0"/>
-              <a:t>Javadoc:</a:t>
-            </a:r>
-          </a:p>
-          <a:p>
-            <a:pPr lvl="1">
-              <a:buSzPct val="45000"/>
-            </a:pPr>
-            <a:r>
-              <a:rPr lang="en-US" sz="2000" dirty="0" smtClean="0"/>
-              <a:t>     </a:t>
-            </a:r>
-            <a:r>
-              <a:rPr lang="en-US" sz="2000" dirty="0">
-                <a:hlinkClick r:id="rId3"/>
-              </a:rPr>
-              <a:t>http://www.gradle.org/docs/current/dsl</a:t>
-            </a:r>
-            <a:r>
-              <a:rPr lang="en-US" sz="2000" dirty="0" smtClean="0">
-                <a:hlinkClick r:id="rId3"/>
-              </a:rPr>
-              <a:t>/</a:t>
-            </a:r>
-            <a:endParaRPr lang="en-US" sz="2000" dirty="0" smtClean="0"/>
-          </a:p>
-          <a:p>
-            <a:pPr lvl="1">
-              <a:buSzPct val="45000"/>
-            </a:pPr>
-            <a:endParaRPr lang="en-US" sz="1200" dirty="0"/>
-          </a:p>
-          <a:p>
-            <a:pPr marL="800100" lvl="1" indent="-342900">
-              <a:buSzPct val="45000"/>
-              <a:buFont typeface="Arial" panose="020B0604020202020204" pitchFamily="34" charset="0"/>
-              <a:buChar char="•"/>
-            </a:pPr>
-            <a:r>
-              <a:rPr lang="en-US" sz="2000" dirty="0"/>
-              <a:t>Groovy </a:t>
-            </a:r>
-            <a:r>
-              <a:rPr lang="en-US" sz="2000" dirty="0" smtClean="0"/>
-              <a:t>Doc:</a:t>
-            </a:r>
-          </a:p>
-          <a:p>
-            <a:pPr lvl="1">
-              <a:buSzPct val="45000"/>
-            </a:pPr>
-            <a:r>
-              <a:rPr lang="en-US" sz="2000" dirty="0" smtClean="0"/>
-              <a:t>     </a:t>
-            </a:r>
-            <a:r>
-              <a:rPr lang="en-US" sz="2000" dirty="0">
-                <a:hlinkClick r:id="rId4"/>
-              </a:rPr>
-              <a:t>http://www.gradle.org/docs/current/groovydoc/</a:t>
-            </a:r>
-            <a:endParaRPr lang="en-US" dirty="0" smtClean="0"/>
-          </a:p>
-          <a:p>
-            <a:pPr lvl="1">
-              <a:buSzPct val="45000"/>
-            </a:pPr>
-            <a:r>
-              <a:rPr lang="en-US" sz="2000" dirty="0" smtClean="0"/>
-              <a:t>   </a:t>
-            </a:r>
-          </a:p>
-          <a:p>
-            <a:pPr marL="342900" indent="-342900">
-              <a:buSzPct val="45000"/>
-              <a:buFont typeface="Arial" panose="020B0604020202020204" pitchFamily="34" charset="0"/>
-              <a:buChar char="•"/>
-            </a:pPr>
-            <a:r>
-              <a:rPr lang="en-US" sz="2000" dirty="0"/>
-              <a:t>Plugin </a:t>
-            </a:r>
-            <a:r>
-              <a:rPr lang="en-US" sz="2000" dirty="0" smtClean="0"/>
-              <a:t>search: </a:t>
-            </a:r>
-            <a:r>
-              <a:rPr lang="en-US" sz="2000" dirty="0">
-                <a:hlinkClick r:id="rId5"/>
-              </a:rPr>
-              <a:t>https://plugins.gradle.org</a:t>
-            </a:r>
-            <a:r>
-              <a:rPr lang="en-US" sz="2000" dirty="0" smtClean="0">
-                <a:hlinkClick r:id="rId5"/>
-              </a:rPr>
-              <a:t>/</a:t>
-            </a:r>
-            <a:endParaRPr lang="en-US" sz="2000" dirty="0" smtClean="0"/>
-          </a:p>
-          <a:p>
-            <a:pPr marL="342900" indent="-342900">
-              <a:buSzPct val="45000"/>
-              <a:buFont typeface="Arial" panose="020B0604020202020204" pitchFamily="34" charset="0"/>
-              <a:buChar char="•"/>
-            </a:pPr>
-            <a:endParaRPr lang="en-US" sz="2000" dirty="0" smtClean="0"/>
-          </a:p>
-          <a:p>
-            <a:pPr>
-              <a:buSzPct val="45000"/>
-            </a:pPr>
-            <a:endParaRPr sz="2000" dirty="0">
-              <a:solidFill>
-                <a:srgbClr val="0070C0"/>
-              </a:solidFill>
+            <a:pPr algn="ctr"/>
+            <a:r>
+              <a:rPr lang="en-US" sz="9600" dirty="0" err="1" smtClean="0">
+                <a:latin typeface="Calibri" panose="020F0502020204030204" pitchFamily="34" charset="0"/>
+                <a:cs typeface="Calibri" panose="020F0502020204030204" pitchFamily="34" charset="0"/>
+              </a:rPr>
+              <a:t>Gradle</a:t>
+            </a:r>
+            <a:r>
+              <a:rPr lang="en-US" sz="9600" dirty="0" smtClean="0">
+                <a:latin typeface="Calibri" panose="020F0502020204030204" pitchFamily="34" charset="0"/>
+                <a:cs typeface="Calibri" panose="020F0502020204030204" pitchFamily="34" charset="0"/>
+              </a:rPr>
+              <a:t> @Citi Innovation lab</a:t>
+            </a:r>
+            <a:endParaRPr lang="en-US" sz="9600" dirty="0">
+              <a:latin typeface="Calibri" panose="020F0502020204030204" pitchFamily="34" charset="0"/>
+              <a:cs typeface="Calibri" panose="020F0502020204030204" pitchFamily="34" charset="0"/>
             </a:endParaRPr>
           </a:p>
         </p:txBody>
@@ -8415,21 +8327,13 @@
     </p:spTree>
     <p:extLst>
       <p:ext uri="{BB962C8B-B14F-4D97-AF65-F5344CB8AC3E}">
-        <p14:creationId xmlns:p14="http://schemas.microsoft.com/office/powerpoint/2010/main" val="3619970965"/>
+        <p14:creationId xmlns:p14="http://schemas.microsoft.com/office/powerpoint/2010/main" val="607593374"/>
       </p:ext>
     </p:extLst>
   </p:cSld>
   <p:clrMapOvr>
     <a:masterClrMapping/>
   </p:clrMapOvr>
-  <mc:AlternateContent xmlns:mc="http://schemas.openxmlformats.org/markup-compatibility/2006" xmlns:p14="http://schemas.microsoft.com/office/powerpoint/2010/main">
-    <mc:Choice Requires="p14">
-      <p:transition spd="slow" p14:dur="2000"/>
-    </mc:Choice>
-    <mc:Fallback xmlns="">
-      <p:transition spd="slow"/>
-    </mc:Fallback>
-  </mc:AlternateContent>
   <p:timing>
     <p:tnLst>
       <p:par>
@@ -8474,80 +8378,6 @@
           <a:p>
             <a:pPr algn="ctr"/>
             <a:r>
-              <a:rPr lang="en-US" sz="9600" dirty="0" err="1" smtClean="0">
-                <a:latin typeface="Calibri" panose="020F0502020204030204" pitchFamily="34" charset="0"/>
-                <a:cs typeface="Calibri" panose="020F0502020204030204" pitchFamily="34" charset="0"/>
-              </a:rPr>
-              <a:t>Gradle</a:t>
-            </a:r>
-            <a:r>
-              <a:rPr lang="en-US" sz="9600" dirty="0" smtClean="0">
-                <a:latin typeface="Calibri" panose="020F0502020204030204" pitchFamily="34" charset="0"/>
-                <a:cs typeface="Calibri" panose="020F0502020204030204" pitchFamily="34" charset="0"/>
-              </a:rPr>
-              <a:t> @Citi Innovation lab</a:t>
-            </a:r>
-            <a:endParaRPr lang="en-US" sz="9600" dirty="0">
-              <a:latin typeface="Calibri" panose="020F0502020204030204" pitchFamily="34" charset="0"/>
-              <a:cs typeface="Calibri" panose="020F0502020204030204" pitchFamily="34" charset="0"/>
-            </a:endParaRPr>
-          </a:p>
-        </p:txBody>
-      </p:sp>
-    </p:spTree>
-    <p:extLst>
-      <p:ext uri="{BB962C8B-B14F-4D97-AF65-F5344CB8AC3E}">
-        <p14:creationId xmlns:p14="http://schemas.microsoft.com/office/powerpoint/2010/main" val="607593374"/>
-      </p:ext>
-    </p:extLst>
-  </p:cSld>
-  <p:clrMapOvr>
-    <a:masterClrMapping/>
-  </p:clrMapOvr>
-  <p:timing>
-    <p:tnLst>
-      <p:par>
-        <p:cTn id="1" dur="indefinite" restart="never" nodeType="tmRoot"/>
-      </p:par>
-    </p:tnLst>
-  </p:timing>
-</p:sld>
-</file>
-
-<file path=ppt/slides/slide22.xml><?xml version="1.0" encoding="utf-8"?>
-<p:sld xmlns:a="http://schemas.openxmlformats.org/drawingml/2006/main" xmlns:r="http://schemas.openxmlformats.org/officeDocument/2006/relationships" xmlns:p="http://schemas.openxmlformats.org/presentationml/2006/main">
-  <p:cSld>
-    <p:spTree>
-      <p:nvGrpSpPr>
-        <p:cNvPr id="1" name=""/>
-        <p:cNvGrpSpPr/>
-        <p:nvPr/>
-      </p:nvGrpSpPr>
-      <p:grpSpPr>
-        <a:xfrm>
-          <a:off x="0" y="0"/>
-          <a:ext cx="0" cy="0"/>
-          <a:chOff x="0" y="0"/>
-          <a:chExt cx="0" cy="0"/>
-        </a:xfrm>
-      </p:grpSpPr>
-      <p:sp>
-        <p:nvSpPr>
-          <p:cNvPr id="4" name="Subtitle 3"/>
-          <p:cNvSpPr>
-            <a:spLocks noGrp="1"/>
-          </p:cNvSpPr>
-          <p:nvPr>
-            <p:ph type="subTitle"/>
-          </p:nvPr>
-        </p:nvSpPr>
-        <p:spPr/>
-        <p:txBody>
-          <a:bodyPr/>
-          <a:lstStyle/>
-          <a:p>
-            <a:pPr algn="ctr"/>
-            <a:r>
               <a:rPr lang="en-US" sz="9600" dirty="0" smtClean="0">
                 <a:latin typeface="Calibri" panose="020F0502020204030204" pitchFamily="34" charset="0"/>
                 <a:cs typeface="Calibri" panose="020F0502020204030204" pitchFamily="34" charset="0"/>
@@ -8581,7 +8411,7 @@
 </p:sld>
 </file>
 
-<file path=ppt/slides/slide23.xml><?xml version="1.0" encoding="utf-8"?>
+<file path=ppt/slides/slide22.xml><?xml version="1.0" encoding="utf-8"?>
 <p:sld xmlns:a="http://schemas.openxmlformats.org/drawingml/2006/main" xmlns:r="http://schemas.openxmlformats.org/officeDocument/2006/relationships" xmlns:p="http://schemas.openxmlformats.org/presentationml/2006/main">
   <p:cSld>
     <p:spTree>
@@ -9497,7 +9327,7 @@
 </p:sld>
 </file>
 
-<file path=ppt/slides/slide3.xml><?xml version="1.0" encoding="utf-8"?>
+<file path=ppt/slides/slide23.xml><?xml version="1.0" encoding="utf-8"?>
 <p:sld xmlns:a="http://schemas.openxmlformats.org/drawingml/2006/main" xmlns:r="http://schemas.openxmlformats.org/officeDocument/2006/relationships" xmlns:p="http://schemas.openxmlformats.org/presentationml/2006/main">
   <p:cSld>
     <p:spTree>
@@ -9516,6 +9346,403 @@
       </p:grpSpPr>
       <p:sp>
         <p:nvSpPr>
+          <p:cNvPr id="108" name="TextShape 1"/>
+          <p:cNvSpPr txBox="1"/>
+          <p:nvPr/>
+        </p:nvSpPr>
+        <p:spPr>
+          <a:xfrm>
+            <a:off x="457200" y="274680"/>
+            <a:ext cx="8229240" cy="1142640"/>
+          </a:xfrm>
+          <a:prstGeom prst="rect">
+            <a:avLst/>
+          </a:prstGeom>
+        </p:spPr>
+        <p:txBody>
+          <a:bodyPr anchor="ctr"/>
+          <a:lstStyle/>
+          <a:p>
+            <a:r>
+              <a:rPr lang="en-US" sz="3600" dirty="0">
+                <a:latin typeface="Calibri"/>
+              </a:rPr>
+              <a:t>Gradle – </a:t>
+            </a:r>
+            <a:r>
+              <a:rPr lang="en-US" sz="3600" dirty="0" smtClean="0">
+                <a:latin typeface="Calibri"/>
+              </a:rPr>
+              <a:t>Resources</a:t>
+            </a:r>
+            <a:endParaRPr dirty="0"/>
+          </a:p>
+        </p:txBody>
+      </p:sp>
+      <p:sp>
+        <p:nvSpPr>
+          <p:cNvPr id="109" name="TextShape 2"/>
+          <p:cNvSpPr txBox="1"/>
+          <p:nvPr/>
+        </p:nvSpPr>
+        <p:spPr>
+          <a:xfrm>
+            <a:off x="152400" y="1447800"/>
+            <a:ext cx="8763000" cy="5029200"/>
+          </a:xfrm>
+          <a:prstGeom prst="rect">
+            <a:avLst/>
+          </a:prstGeom>
+        </p:spPr>
+        <p:txBody>
+          <a:bodyPr/>
+          <a:lstStyle/>
+          <a:p>
+            <a:pPr marL="342900" indent="-342900">
+              <a:buSzPct val="45000"/>
+              <a:buFont typeface="Arial" panose="020B0604020202020204" pitchFamily="34" charset="0"/>
+              <a:buChar char="•"/>
+            </a:pPr>
+            <a:r>
+              <a:rPr lang="en-US" sz="2000" dirty="0" smtClean="0"/>
+              <a:t>Documentation:</a:t>
+            </a:r>
+          </a:p>
+          <a:p>
+            <a:pPr lvl="1">
+              <a:buSzPct val="45000"/>
+            </a:pPr>
+            <a:endParaRPr lang="en-US" sz="1200" dirty="0" smtClean="0"/>
+          </a:p>
+          <a:p>
+            <a:pPr marL="800100" lvl="1" indent="-342900">
+              <a:buSzPct val="45000"/>
+              <a:buFont typeface="Arial" panose="020B0604020202020204" pitchFamily="34" charset="0"/>
+              <a:buChar char="•"/>
+            </a:pPr>
+            <a:r>
+              <a:rPr lang="en-US" sz="2000" dirty="0" smtClean="0"/>
+              <a:t>User guide: </a:t>
+            </a:r>
+            <a:r>
+              <a:rPr lang="en-US" sz="2000" dirty="0">
+                <a:hlinkClick r:id="rId2"/>
+              </a:rPr>
+              <a:t>http://</a:t>
+            </a:r>
+            <a:r>
+              <a:rPr lang="en-US" sz="2000" dirty="0" smtClean="0">
+                <a:hlinkClick r:id="rId2"/>
+              </a:rPr>
+              <a:t>www.gradle.org/docs/current/userguide/userguide.html</a:t>
+            </a:r>
+            <a:endParaRPr lang="en-US" sz="2000" dirty="0" smtClean="0"/>
+          </a:p>
+          <a:p>
+            <a:pPr lvl="1">
+              <a:buSzPct val="45000"/>
+            </a:pPr>
+            <a:endParaRPr lang="en-US" sz="1200" dirty="0"/>
+          </a:p>
+          <a:p>
+            <a:pPr marL="800100" lvl="1" indent="-342900">
+              <a:buSzPct val="45000"/>
+              <a:buFont typeface="Arial" panose="020B0604020202020204" pitchFamily="34" charset="0"/>
+              <a:buChar char="•"/>
+            </a:pPr>
+            <a:r>
+              <a:rPr lang="en-US" sz="2000" dirty="0" smtClean="0"/>
+              <a:t>DSL:</a:t>
+            </a:r>
+          </a:p>
+          <a:p>
+            <a:pPr lvl="1">
+              <a:buSzPct val="45000"/>
+            </a:pPr>
+            <a:r>
+              <a:rPr lang="en-US" sz="2000" dirty="0"/>
+              <a:t> </a:t>
+            </a:r>
+            <a:r>
+              <a:rPr lang="en-US" sz="2000" dirty="0" smtClean="0"/>
+              <a:t>    </a:t>
+            </a:r>
+            <a:r>
+              <a:rPr lang="en-US" sz="2000" dirty="0" smtClean="0">
+                <a:hlinkClick r:id="rId3"/>
+              </a:rPr>
+              <a:t>http</a:t>
+            </a:r>
+            <a:r>
+              <a:rPr lang="en-US" sz="2000" dirty="0">
+                <a:hlinkClick r:id="rId3"/>
+              </a:rPr>
+              <a:t>://www.gradle.org/docs/current/dsl</a:t>
+            </a:r>
+            <a:r>
+              <a:rPr lang="en-US" sz="2000" dirty="0" smtClean="0">
+                <a:hlinkClick r:id="rId3"/>
+              </a:rPr>
+              <a:t>/</a:t>
+            </a:r>
+            <a:endParaRPr lang="en-US" sz="2000" dirty="0" smtClean="0"/>
+          </a:p>
+          <a:p>
+            <a:pPr lvl="1">
+              <a:buSzPct val="45000"/>
+            </a:pPr>
+            <a:endParaRPr lang="en-US" sz="1200" dirty="0" smtClean="0"/>
+          </a:p>
+          <a:p>
+            <a:pPr marL="800100" lvl="1" indent="-342900">
+              <a:buSzPct val="45000"/>
+              <a:buFont typeface="Arial" panose="020B0604020202020204" pitchFamily="34" charset="0"/>
+              <a:buChar char="•"/>
+            </a:pPr>
+            <a:r>
+              <a:rPr lang="en-US" sz="2000" dirty="0" smtClean="0"/>
+              <a:t>Javadoc:</a:t>
+            </a:r>
+          </a:p>
+          <a:p>
+            <a:pPr lvl="1">
+              <a:buSzPct val="45000"/>
+            </a:pPr>
+            <a:r>
+              <a:rPr lang="en-US" sz="2000" dirty="0" smtClean="0"/>
+              <a:t>     </a:t>
+            </a:r>
+            <a:r>
+              <a:rPr lang="en-US" sz="2000" dirty="0">
+                <a:hlinkClick r:id="rId3"/>
+              </a:rPr>
+              <a:t>http://www.gradle.org/docs/current/dsl</a:t>
+            </a:r>
+            <a:r>
+              <a:rPr lang="en-US" sz="2000" dirty="0" smtClean="0">
+                <a:hlinkClick r:id="rId3"/>
+              </a:rPr>
+              <a:t>/</a:t>
+            </a:r>
+            <a:endParaRPr lang="en-US" sz="2000" dirty="0" smtClean="0"/>
+          </a:p>
+          <a:p>
+            <a:pPr lvl="1">
+              <a:buSzPct val="45000"/>
+            </a:pPr>
+            <a:endParaRPr lang="en-US" sz="1200" dirty="0"/>
+          </a:p>
+          <a:p>
+            <a:pPr marL="800100" lvl="1" indent="-342900">
+              <a:buSzPct val="45000"/>
+              <a:buFont typeface="Arial" panose="020B0604020202020204" pitchFamily="34" charset="0"/>
+              <a:buChar char="•"/>
+            </a:pPr>
+            <a:r>
+              <a:rPr lang="en-US" sz="2000" dirty="0"/>
+              <a:t>Groovy </a:t>
+            </a:r>
+            <a:r>
+              <a:rPr lang="en-US" sz="2000" dirty="0" smtClean="0"/>
+              <a:t>Doc:</a:t>
+            </a:r>
+          </a:p>
+          <a:p>
+            <a:pPr lvl="1">
+              <a:buSzPct val="45000"/>
+            </a:pPr>
+            <a:r>
+              <a:rPr lang="en-US" sz="2000" dirty="0" smtClean="0"/>
+              <a:t>     </a:t>
+            </a:r>
+            <a:r>
+              <a:rPr lang="en-US" sz="2000" dirty="0">
+                <a:hlinkClick r:id="rId4"/>
+              </a:rPr>
+              <a:t>http://www.gradle.org/docs/current/groovydoc/</a:t>
+            </a:r>
+            <a:endParaRPr lang="en-US" dirty="0" smtClean="0"/>
+          </a:p>
+          <a:p>
+            <a:pPr lvl="1">
+              <a:buSzPct val="45000"/>
+            </a:pPr>
+            <a:r>
+              <a:rPr lang="en-US" sz="2000" dirty="0" smtClean="0"/>
+              <a:t>   </a:t>
+            </a:r>
+          </a:p>
+          <a:p>
+            <a:pPr marL="342900" indent="-342900">
+              <a:buSzPct val="45000"/>
+              <a:buFont typeface="Arial" panose="020B0604020202020204" pitchFamily="34" charset="0"/>
+              <a:buChar char="•"/>
+            </a:pPr>
+            <a:r>
+              <a:rPr lang="en-US" sz="2000" dirty="0"/>
+              <a:t>Plugin </a:t>
+            </a:r>
+            <a:r>
+              <a:rPr lang="en-US" sz="2000" dirty="0" smtClean="0"/>
+              <a:t>search: </a:t>
+            </a:r>
+            <a:r>
+              <a:rPr lang="en-US" sz="2000" dirty="0">
+                <a:hlinkClick r:id="rId5"/>
+              </a:rPr>
+              <a:t>https://plugins.gradle.org</a:t>
+            </a:r>
+            <a:r>
+              <a:rPr lang="en-US" sz="2000" dirty="0" smtClean="0">
+                <a:hlinkClick r:id="rId5"/>
+              </a:rPr>
+              <a:t>/</a:t>
+            </a:r>
+            <a:endParaRPr lang="en-US" sz="2000" dirty="0" smtClean="0"/>
+          </a:p>
+          <a:p>
+            <a:pPr marL="342900" indent="-342900">
+              <a:buSzPct val="45000"/>
+              <a:buFont typeface="Arial" panose="020B0604020202020204" pitchFamily="34" charset="0"/>
+              <a:buChar char="•"/>
+            </a:pPr>
+            <a:endParaRPr lang="en-US" sz="2000" dirty="0" smtClean="0"/>
+          </a:p>
+          <a:p>
+            <a:pPr>
+              <a:buSzPct val="45000"/>
+            </a:pPr>
+            <a:endParaRPr sz="2000" dirty="0">
+              <a:solidFill>
+                <a:srgbClr val="0070C0"/>
+              </a:solidFill>
+            </a:endParaRPr>
+          </a:p>
+        </p:txBody>
+      </p:sp>
+    </p:spTree>
+    <p:extLst>
+      <p:ext uri="{BB962C8B-B14F-4D97-AF65-F5344CB8AC3E}">
+        <p14:creationId xmlns:p14="http://schemas.microsoft.com/office/powerpoint/2010/main" val="4134781769"/>
+      </p:ext>
+    </p:extLst>
+  </p:cSld>
+  <p:clrMapOvr>
+    <a:masterClrMapping/>
+  </p:clrMapOvr>
+  <mc:AlternateContent xmlns:mc="http://schemas.openxmlformats.org/markup-compatibility/2006" xmlns:p14="http://schemas.microsoft.com/office/powerpoint/2010/main">
+    <mc:Choice Requires="p14">
+      <p:transition spd="slow" p14:dur="2000"/>
+    </mc:Choice>
+    <mc:Fallback xmlns="">
+      <p:transition spd="slow"/>
+    </mc:Fallback>
+  </mc:AlternateContent>
+  <p:timing>
+    <p:tnLst>
+      <p:par>
+        <p:cTn id="1" dur="indefinite" restart="never" nodeType="tmRoot"/>
+      </p:par>
+    </p:tnLst>
+  </p:timing>
+</p:sld>
+</file>
+
+<file path=ppt/slides/slide24.xml><?xml version="1.0" encoding="utf-8"?>
+<p:sld xmlns:a="http://schemas.openxmlformats.org/drawingml/2006/main" xmlns:r="http://schemas.openxmlformats.org/officeDocument/2006/relationships" xmlns:p="http://schemas.openxmlformats.org/presentationml/2006/main">
+  <p:cSld>
+    <p:spTree>
+      <p:nvGrpSpPr>
+        <p:cNvPr id="1" name=""/>
+        <p:cNvGrpSpPr/>
+        <p:nvPr/>
+      </p:nvGrpSpPr>
+      <p:grpSpPr>
+        <a:xfrm>
+          <a:off x="0" y="0"/>
+          <a:ext cx="0" cy="0"/>
+          <a:chOff x="0" y="0"/>
+          <a:chExt cx="0" cy="0"/>
+        </a:xfrm>
+      </p:grpSpPr>
+      <p:sp>
+        <p:nvSpPr>
+          <p:cNvPr id="4" name="Subtitle 3"/>
+          <p:cNvSpPr>
+            <a:spLocks noGrp="1"/>
+          </p:cNvSpPr>
+          <p:nvPr>
+            <p:ph type="subTitle"/>
+          </p:nvPr>
+        </p:nvSpPr>
+        <p:spPr/>
+        <p:txBody>
+          <a:bodyPr/>
+          <a:lstStyle/>
+          <a:p>
+            <a:pPr algn="ctr"/>
+            <a:r>
+              <a:rPr lang="en-US" sz="9600" dirty="0" smtClean="0">
+                <a:latin typeface="Calibri" panose="020F0502020204030204" pitchFamily="34" charset="0"/>
+                <a:cs typeface="Calibri" panose="020F0502020204030204" pitchFamily="34" charset="0"/>
+              </a:rPr>
+              <a:t>Thx!</a:t>
+            </a:r>
+            <a:endParaRPr lang="en-US" sz="9600" dirty="0">
+              <a:latin typeface="Calibri" panose="020F0502020204030204" pitchFamily="34" charset="0"/>
+              <a:cs typeface="Calibri" panose="020F0502020204030204" pitchFamily="34" charset="0"/>
+            </a:endParaRPr>
+          </a:p>
+        </p:txBody>
+      </p:sp>
+    </p:spTree>
+    <p:extLst>
+      <p:ext uri="{BB962C8B-B14F-4D97-AF65-F5344CB8AC3E}">
+        <p14:creationId xmlns:p14="http://schemas.microsoft.com/office/powerpoint/2010/main" val="331660428"/>
+      </p:ext>
+    </p:extLst>
+  </p:cSld>
+  <p:clrMapOvr>
+    <a:masterClrMapping/>
+  </p:clrMapOvr>
+  <p:timing>
+    <p:tnLst>
+      <p:par>
+        <p:cTn id="1" dur="indefinite" restart="never" nodeType="tmRoot"/>
+      </p:par>
+    </p:tnLst>
+  </p:timing>
+</p:sld>
+</file>
+
+<file path=ppt/slides/slide3.xml><?xml version="1.0" encoding="utf-8"?>
+<p:sld xmlns:a="http://schemas.openxmlformats.org/drawingml/2006/main" xmlns:r="http://schemas.openxmlformats.org/officeDocument/2006/relationships" xmlns:p="http://schemas.openxmlformats.org/presentationml/2006/main">
+  <p:cSld>
+    <p:bg>
+      <p:bgPr>
+        <a:blipFill>
+          <a:blip r:embed="rId2"/>
+          <a:tile tx="0" ty="0" sx="100000" sy="100000" flip="none" algn="tl"/>
+        </a:blipFill>
+        <a:effectLst/>
+      </p:bgPr>
+    </p:bg>
+    <p:spTree>
+      <p:nvGrpSpPr>
+        <p:cNvPr id="1" name=""/>
+        <p:cNvGrpSpPr/>
+        <p:nvPr/>
+      </p:nvGrpSpPr>
+      <p:grpSpPr>
+        <a:xfrm>
+          <a:off x="0" y="0"/>
+          <a:ext cx="0" cy="0"/>
+          <a:chOff x="0" y="0"/>
+          <a:chExt cx="0" cy="0"/>
+        </a:xfrm>
+      </p:grpSpPr>
+      <p:sp>
+        <p:nvSpPr>
           <p:cNvPr id="85" name="TextShape 1"/>
           <p:cNvSpPr txBox="1"/>
           <p:nvPr/>
@@ -9535,11 +9762,13 @@
           <a:p>
             <a:r>
               <a:rPr lang="en-US" sz="3600" dirty="0" smtClean="0">
-                <a:latin typeface="Calibri"/>
+                <a:latin typeface="Calibri" panose="020F0502020204030204" pitchFamily="34" charset="0"/>
               </a:rPr>
               <a:t>Agenda</a:t>
             </a:r>
-            <a:endParaRPr dirty="0"/>
+            <a:endParaRPr dirty="0">
+              <a:latin typeface="Calibri" panose="020F0502020204030204" pitchFamily="34" charset="0"/>
+            </a:endParaRPr>
           </a:p>
         </p:txBody>
       </p:sp>
@@ -9569,7 +9798,7 @@
             </a:pPr>
             <a:r>
               <a:rPr lang="en-US" sz="2800" dirty="0">
-                <a:latin typeface="Calibri"/>
+                <a:latin typeface="Calibri" panose="020F0502020204030204" pitchFamily="34" charset="0"/>
               </a:rPr>
               <a:t>Build tools overview</a:t>
             </a:r>
@@ -9757,6 +9986,15 @@
 <file path=ppt/slides/slide4.xml><?xml version="1.0" encoding="utf-8"?>
 <p:sld xmlns:a="http://schemas.openxmlformats.org/drawingml/2006/main" xmlns:r="http://schemas.openxmlformats.org/officeDocument/2006/relationships" xmlns:p="http://schemas.openxmlformats.org/presentationml/2006/main">
   <p:cSld>
+    <p:bg>
+      <p:bgPr>
+        <a:blipFill>
+          <a:blip r:embed="rId2"/>
+          <a:tile tx="0" ty="0" sx="100000" sy="100000" flip="none" algn="tl"/>
+        </a:blipFill>
+        <a:effectLst/>
+      </p:bgPr>
+    </p:bg>
     <p:spTree>
       <p:nvGrpSpPr>
         <p:cNvPr id="1" name=""/>
@@ -9824,6 +10062,21 @@
 <file path=ppt/slides/slide5.xml><?xml version="1.0" encoding="utf-8"?>
 <p:sld xmlns:a="http://schemas.openxmlformats.org/drawingml/2006/main" xmlns:r="http://schemas.openxmlformats.org/officeDocument/2006/relationships" xmlns:p="http://schemas.openxmlformats.org/presentationml/2006/main">
   <p:cSld>
+    <p:bg>
+      <p:bgPr>
+        <a:blipFill dpi="0" rotWithShape="1">
+          <a:blip r:embed="rId3">
+            <a:alphaModFix amt="50000"/>
+            <a:lum/>
+          </a:blip>
+          <a:srcRect/>
+          <a:stretch>
+            <a:fillRect/>
+          </a:stretch>
+        </a:blipFill>
+        <a:effectLst/>
+      </p:bgPr>
+    </p:bg>
     <p:spTree>
       <p:nvGrpSpPr>
         <p:cNvPr id="1" name=""/>
@@ -9969,15 +10222,21 @@
           <p:nvPr/>
         </p:nvPicPr>
         <p:blipFill>
-          <a:blip r:embed="rId3"/>
+          <a:blip r:embed="rId3">
+            <a:extLst>
+              <a:ext uri="{28A0092B-C50C-407E-A947-70E740481C1C}">
+                <a14:useLocalDpi xmlns:a14="http://schemas.microsoft.com/office/drawing/2010/main" val="0"/>
+              </a:ext>
+            </a:extLst>
+          </a:blip>
           <a:stretch>
             <a:fillRect/>
           </a:stretch>
         </p:blipFill>
         <p:spPr>
           <a:xfrm>
-            <a:off x="5904000" y="4572000"/>
-            <a:ext cx="2917800" cy="1924200"/>
+            <a:off x="6324600" y="4648200"/>
+            <a:ext cx="2913837" cy="1924200"/>
           </a:xfrm>
           <a:prstGeom prst="rect">
             <a:avLst/>
@@ -10025,6 +10284,21 @@
 <file path=ppt/slides/slide6.xml><?xml version="1.0" encoding="utf-8"?>
 <p:sld xmlns:a="http://schemas.openxmlformats.org/drawingml/2006/main" xmlns:r="http://schemas.openxmlformats.org/officeDocument/2006/relationships" xmlns:p="http://schemas.openxmlformats.org/presentationml/2006/main">
   <p:cSld>
+    <p:bg>
+      <p:bgPr>
+        <a:blipFill dpi="0" rotWithShape="1">
+          <a:blip r:embed="rId2">
+            <a:alphaModFix amt="50000"/>
+            <a:lum/>
+          </a:blip>
+          <a:srcRect/>
+          <a:stretch>
+            <a:fillRect/>
+          </a:stretch>
+        </a:blipFill>
+        <a:effectLst/>
+      </p:bgPr>
+    </p:bg>
     <p:spTree>
       <p:nvGrpSpPr>
         <p:cNvPr id="1" name=""/>
@@ -10104,7 +10378,15 @@
             </a:pPr>
             <a:r>
               <a:rPr lang="en-US" sz="2800" dirty="0" smtClean="0"/>
-              <a:t>Create distribution file (jar)</a:t>
+              <a:t>Create </a:t>
+            </a:r>
+            <a:r>
+              <a:rPr lang="en-US" sz="2800" dirty="0" smtClean="0"/>
+              <a:t>a distribution </a:t>
+            </a:r>
+            <a:r>
+              <a:rPr lang="en-US" sz="2800" dirty="0" smtClean="0"/>
+              <a:t>file (jar)</a:t>
             </a:r>
           </a:p>
         </p:txBody>
@@ -10150,14 +10432,14 @@
       </p:sp>
       <p:pic>
         <p:nvPicPr>
-          <p:cNvPr id="2" name="תמונה 1"/>
+          <p:cNvPr id="5" name="תמונה 4"/>
           <p:cNvPicPr>
             <a:picLocks noChangeAspect="1"/>
           </p:cNvPicPr>
           <p:nvPr/>
         </p:nvPicPr>
         <p:blipFill>
-          <a:blip r:embed="rId2">
+          <a:blip r:embed="rId3">
             <a:extLst>
               <a:ext uri="{28A0092B-C50C-407E-A947-70E740481C1C}">
                 <a14:useLocalDpi xmlns:a14="http://schemas.microsoft.com/office/drawing/2010/main" val="0"/>
@@ -10170,8 +10452,8 @@
         </p:blipFill>
         <p:spPr>
           <a:xfrm>
-            <a:off x="6019800" y="3620373"/>
-            <a:ext cx="2209800" cy="2856627"/>
+            <a:off x="6858000" y="3733800"/>
+            <a:ext cx="1981199" cy="2856627"/>
           </a:xfrm>
           <a:prstGeom prst="rect">
             <a:avLst/>
@@ -10201,6 +10483,21 @@
 <file path=ppt/slides/slide7.xml><?xml version="1.0" encoding="utf-8"?>
 <p:sld xmlns:a="http://schemas.openxmlformats.org/drawingml/2006/main" xmlns:r="http://schemas.openxmlformats.org/officeDocument/2006/relationships" xmlns:p="http://schemas.openxmlformats.org/presentationml/2006/main">
   <p:cSld>
+    <p:bg>
+      <p:bgPr>
+        <a:blipFill dpi="0" rotWithShape="1">
+          <a:blip r:embed="rId2">
+            <a:alphaModFix amt="50000"/>
+            <a:lum/>
+          </a:blip>
+          <a:srcRect/>
+          <a:stretch>
+            <a:fillRect/>
+          </a:stretch>
+        </a:blipFill>
+        <a:effectLst/>
+      </p:bgPr>
+    </p:bg>
     <p:spTree>
       <p:nvGrpSpPr>
         <p:cNvPr id="1" name=""/>
@@ -12543,7 +12840,15 @@
             </a:pPr>
             <a:r>
               <a:rPr lang="en-US" sz="2800" dirty="0" smtClean="0"/>
-              <a:t>Create distribution file (jar)</a:t>
+              <a:t>Create </a:t>
+            </a:r>
+            <a:r>
+              <a:rPr lang="en-US" sz="2800" dirty="0" smtClean="0"/>
+              <a:t>a distribution </a:t>
+            </a:r>
+            <a:r>
+              <a:rPr lang="en-US" sz="2800" dirty="0" smtClean="0"/>
+              <a:t>file (jar)</a:t>
             </a:r>
           </a:p>
         </p:txBody>
@@ -12611,7 +12916,7 @@
       </p:pic>
       <p:pic>
         <p:nvPicPr>
-          <p:cNvPr id="3" name="תמונה 2"/>
+          <p:cNvPr id="4" name="תמונה 3"/>
           <p:cNvPicPr>
             <a:picLocks noChangeAspect="1"/>
           </p:cNvPicPr>
@@ -12631,7 +12936,7 @@
         </p:blipFill>
         <p:spPr>
           <a:xfrm>
-            <a:off x="5400675" y="1981200"/>
+            <a:off x="5781672" y="2895600"/>
             <a:ext cx="390525" cy="381000"/>
           </a:xfrm>
           <a:prstGeom prst="rect">
@@ -12641,7 +12946,7 @@
       </p:pic>
       <p:pic>
         <p:nvPicPr>
-          <p:cNvPr id="6" name="תמונה 5"/>
+          <p:cNvPr id="10" name="תמונה 9"/>
           <p:cNvPicPr>
             <a:picLocks noChangeAspect="1"/>
           </p:cNvPicPr>
@@ -12661,7 +12966,7 @@
         </p:blipFill>
         <p:spPr>
           <a:xfrm>
-            <a:off x="5400675" y="2438400"/>
+            <a:off x="5781671" y="2438400"/>
             <a:ext cx="390525" cy="381000"/>
           </a:xfrm>
           <a:prstGeom prst="rect">
@@ -12671,7 +12976,7 @@
       </p:pic>
       <p:pic>
         <p:nvPicPr>
-          <p:cNvPr id="8" name="תמונה 7"/>
+          <p:cNvPr id="11" name="תמונה 10"/>
           <p:cNvPicPr>
             <a:picLocks noChangeAspect="1"/>
           </p:cNvPicPr>
@@ -12691,7 +12996,7 @@
         </p:blipFill>
         <p:spPr>
           <a:xfrm>
-            <a:off x="5400675" y="2895600"/>
+            <a:off x="5781672" y="2040294"/>
             <a:ext cx="390525" cy="381000"/>
           </a:xfrm>
           <a:prstGeom prst="rect">
@@ -12701,7 +13006,7 @@
       </p:pic>
       <p:pic>
         <p:nvPicPr>
-          <p:cNvPr id="9" name="תמונה 8"/>
+          <p:cNvPr id="5" name="תמונה 4"/>
           <p:cNvPicPr>
             <a:picLocks noChangeAspect="1"/>
           </p:cNvPicPr>
@@ -12721,8 +13026,8 @@
         </p:blipFill>
         <p:spPr>
           <a:xfrm>
-            <a:off x="6019800" y="3620373"/>
-            <a:ext cx="2209800" cy="2856627"/>
+            <a:off x="6400800" y="3520080"/>
+            <a:ext cx="1981199" cy="2856627"/>
           </a:xfrm>
           <a:prstGeom prst="rect">
             <a:avLst/>
@@ -12795,179 +13100,184 @@
           </a:p>
         </p:txBody>
       </p:sp>
+      <p:sp>
+        <p:nvSpPr>
+          <p:cNvPr id="96" name="TextShape 2"/>
+          <p:cNvSpPr txBox="1"/>
+          <p:nvPr/>
+        </p:nvSpPr>
+        <p:spPr>
+          <a:xfrm>
+            <a:off x="457200" y="1600200"/>
+            <a:ext cx="8229240" cy="4525560"/>
+          </a:xfrm>
+          <a:prstGeom prst="rect">
+            <a:avLst/>
+          </a:prstGeom>
+        </p:spPr>
+        <p:txBody>
+          <a:bodyPr/>
+          <a:lstStyle/>
+          <a:p>
+            <a:pPr marL="457200" indent="-457200">
+              <a:buSzPct val="45000"/>
+              <a:buFont typeface="Arial" panose="020B0604020202020204" pitchFamily="34" charset="0"/>
+              <a:buChar char="•"/>
+            </a:pPr>
+            <a:r>
+              <a:rPr lang="en-US" sz="2200" dirty="0">
+                <a:latin typeface="Calibri"/>
+              </a:rPr>
+              <a:t>Released in 2004</a:t>
+            </a:r>
+            <a:endParaRPr sz="2200" dirty="0"/>
+          </a:p>
+          <a:p>
+            <a:pPr marL="457200" indent="-457200">
+              <a:buSzPct val="45000"/>
+              <a:buFont typeface="Arial" panose="020B0604020202020204" pitchFamily="34" charset="0"/>
+              <a:buChar char="•"/>
+            </a:pPr>
+            <a:r>
+              <a:rPr lang="en-US" sz="2200" dirty="0" smtClean="0">
+                <a:latin typeface="Calibri"/>
+              </a:rPr>
+              <a:t>Most popular java build tool</a:t>
+            </a:r>
+          </a:p>
+          <a:p>
+            <a:pPr marL="457200" indent="-457200">
+              <a:buSzPct val="45000"/>
+              <a:buFont typeface="Arial" panose="020B0604020202020204" pitchFamily="34" charset="0"/>
+              <a:buChar char="•"/>
+            </a:pPr>
+            <a:r>
+              <a:rPr lang="en-US" sz="2200" dirty="0" smtClean="0">
+                <a:latin typeface="Calibri"/>
+              </a:rPr>
+              <a:t>Declarative build tool</a:t>
+            </a:r>
+          </a:p>
+          <a:p>
+            <a:pPr marL="457200" indent="-457200">
+              <a:buSzPct val="45000"/>
+              <a:buFont typeface="Arial" panose="020B0604020202020204" pitchFamily="34" charset="0"/>
+              <a:buChar char="•"/>
+            </a:pPr>
+            <a:r>
+              <a:rPr lang="en-US" sz="2200" dirty="0" smtClean="0">
+                <a:latin typeface="Calibri"/>
+              </a:rPr>
+              <a:t>Introduced </a:t>
+            </a:r>
+            <a:r>
+              <a:rPr lang="en-US" sz="2200" dirty="0">
+                <a:latin typeface="Calibri"/>
+              </a:rPr>
+              <a:t>dependency management </a:t>
+            </a:r>
+            <a:endParaRPr sz="2200" dirty="0"/>
+          </a:p>
+          <a:p>
+            <a:pPr marL="457200" indent="-457200">
+              <a:buSzPct val="45000"/>
+              <a:buFont typeface="Arial" panose="020B0604020202020204" pitchFamily="34" charset="0"/>
+              <a:buChar char="•"/>
+            </a:pPr>
+            <a:r>
+              <a:rPr lang="en-US" sz="2200" dirty="0">
+                <a:latin typeface="Calibri"/>
+              </a:rPr>
+              <a:t>Introduced </a:t>
+            </a:r>
+            <a:r>
+              <a:rPr lang="en-US" sz="2200" dirty="0" smtClean="0">
+                <a:latin typeface="Calibri"/>
+              </a:rPr>
+              <a:t>multi-module builds</a:t>
+            </a:r>
+            <a:endParaRPr sz="2200" dirty="0"/>
+          </a:p>
+          <a:p>
+            <a:pPr marL="457200" indent="-457200">
+              <a:buSzPct val="45000"/>
+              <a:buFont typeface="Arial" panose="020B0604020202020204" pitchFamily="34" charset="0"/>
+              <a:buChar char="•"/>
+            </a:pPr>
+            <a:r>
+              <a:rPr lang="en-US" sz="2200" dirty="0">
+                <a:latin typeface="Calibri"/>
+              </a:rPr>
+              <a:t>Relies on convention over configuration</a:t>
+            </a:r>
+            <a:endParaRPr sz="2200" dirty="0"/>
+          </a:p>
+          <a:p>
+            <a:pPr marL="457200" indent="-457200">
+              <a:buSzPct val="45000"/>
+              <a:buFont typeface="Arial" panose="020B0604020202020204" pitchFamily="34" charset="0"/>
+              <a:buChar char="•"/>
+            </a:pPr>
+            <a:r>
+              <a:rPr lang="en-US" sz="2200" dirty="0" smtClean="0">
+                <a:latin typeface="Calibri"/>
+              </a:rPr>
+              <a:t>Uses plugin architecture</a:t>
+            </a:r>
+            <a:endParaRPr sz="2200" dirty="0" smtClean="0"/>
+          </a:p>
+          <a:p>
+            <a:pPr marL="457200" indent="-457200">
+              <a:buSzPct val="45000"/>
+              <a:buFont typeface="Arial" panose="020B0604020202020204" pitchFamily="34" charset="0"/>
+              <a:buChar char="•"/>
+            </a:pPr>
+            <a:r>
+              <a:rPr lang="en-US" sz="2200" dirty="0" smtClean="0">
+                <a:latin typeface="Calibri"/>
+              </a:rPr>
+              <a:t>Files </a:t>
+            </a:r>
+            <a:r>
+              <a:rPr lang="en-US" sz="2200" dirty="0">
+                <a:latin typeface="Calibri"/>
+              </a:rPr>
+              <a:t>are written in XML</a:t>
+            </a:r>
+            <a:endParaRPr sz="2200" dirty="0"/>
+          </a:p>
+        </p:txBody>
+      </p:sp>
       <p:pic>
         <p:nvPicPr>
-          <p:cNvPr id="95" name="Picture 94"/>
-          <p:cNvPicPr/>
+          <p:cNvPr id="2" name="תמונה 1"/>
+          <p:cNvPicPr>
+            <a:picLocks noChangeAspect="1"/>
+          </p:cNvPicPr>
           <p:nvPr/>
         </p:nvPicPr>
         <p:blipFill>
-          <a:blip r:embed="rId3"/>
+          <a:blip r:embed="rId3">
+            <a:extLst>
+              <a:ext uri="{28A0092B-C50C-407E-A947-70E740481C1C}">
+                <a14:useLocalDpi xmlns:a14="http://schemas.microsoft.com/office/drawing/2010/main" val="0"/>
+              </a:ext>
+            </a:extLst>
+          </a:blip>
           <a:stretch>
             <a:fillRect/>
           </a:stretch>
         </p:blipFill>
         <p:spPr>
           <a:xfrm>
-            <a:off x="5486400" y="4965000"/>
-            <a:ext cx="3600000" cy="1512000"/>
-          </a:xfrm>
-          <a:prstGeom prst="rect">
-            <a:avLst/>
-          </a:prstGeom>
-          <a:ln>
-            <a:noFill/>
-          </a:ln>
+            <a:off x="5410200" y="4724400"/>
+            <a:ext cx="3600000" cy="1401360"/>
+          </a:xfrm>
+          <a:prstGeom prst="rect">
+            <a:avLst/>
+          </a:prstGeom>
         </p:spPr>
       </p:pic>
-      <p:sp>
-        <p:nvSpPr>
-          <p:cNvPr id="96" name="TextShape 2"/>
-          <p:cNvSpPr txBox="1"/>
-          <p:nvPr/>
-        </p:nvSpPr>
-        <p:spPr>
-          <a:xfrm>
-            <a:off x="457200" y="1600200"/>
-            <a:ext cx="8229240" cy="4525560"/>
-          </a:xfrm>
-          <a:prstGeom prst="rect">
-            <a:avLst/>
-          </a:prstGeom>
-        </p:spPr>
-        <p:txBody>
-          <a:bodyPr/>
-          <a:lstStyle/>
-          <a:p>
-            <a:pPr marL="457200" indent="-457200">
-              <a:buSzPct val="45000"/>
-              <a:buFont typeface="Arial" panose="020B0604020202020204" pitchFamily="34" charset="0"/>
-              <a:buChar char="•"/>
-            </a:pPr>
-            <a:r>
-              <a:rPr lang="en-US" sz="2200" dirty="0">
-                <a:latin typeface="Calibri"/>
-              </a:rPr>
-              <a:t>Released in 2004</a:t>
-            </a:r>
-            <a:endParaRPr sz="2200" dirty="0"/>
-          </a:p>
-          <a:p>
-            <a:pPr marL="457200" indent="-457200">
-              <a:buSzPct val="45000"/>
-              <a:buFont typeface="Arial" panose="020B0604020202020204" pitchFamily="34" charset="0"/>
-              <a:buChar char="•"/>
-            </a:pPr>
-            <a:r>
-              <a:rPr lang="en-US" sz="2200" dirty="0" smtClean="0">
-                <a:latin typeface="Calibri"/>
-              </a:rPr>
-              <a:t>Most popular java build tool</a:t>
-            </a:r>
-          </a:p>
-          <a:p>
-            <a:pPr marL="457200" indent="-457200">
-              <a:buSzPct val="45000"/>
-              <a:buFont typeface="Arial" panose="020B0604020202020204" pitchFamily="34" charset="0"/>
-              <a:buChar char="•"/>
-            </a:pPr>
-            <a:r>
-              <a:rPr lang="en-US" sz="2200" dirty="0" smtClean="0">
-                <a:latin typeface="Calibri"/>
-              </a:rPr>
-              <a:t>Declarative build tool</a:t>
-            </a:r>
-          </a:p>
-          <a:p>
-            <a:pPr marL="457200" indent="-457200">
-              <a:buSzPct val="45000"/>
-              <a:buFont typeface="Arial" panose="020B0604020202020204" pitchFamily="34" charset="0"/>
-              <a:buChar char="•"/>
-            </a:pPr>
-            <a:r>
-              <a:rPr lang="en-US" sz="2200" dirty="0" smtClean="0">
-                <a:latin typeface="Calibri"/>
-              </a:rPr>
-              <a:t>Introduced </a:t>
-            </a:r>
-            <a:r>
-              <a:rPr lang="en-US" sz="2200" dirty="0">
-                <a:latin typeface="Calibri"/>
-              </a:rPr>
-              <a:t>dependency management </a:t>
-            </a:r>
-            <a:endParaRPr sz="2200" dirty="0"/>
-          </a:p>
-          <a:p>
-            <a:pPr marL="457200" indent="-457200">
-              <a:buSzPct val="45000"/>
-              <a:buFont typeface="Arial" panose="020B0604020202020204" pitchFamily="34" charset="0"/>
-              <a:buChar char="•"/>
-            </a:pPr>
-            <a:r>
-              <a:rPr lang="en-US" sz="2200" dirty="0">
-                <a:latin typeface="Calibri"/>
-              </a:rPr>
-              <a:t>Introduced </a:t>
-            </a:r>
-            <a:r>
-              <a:rPr lang="en-US" sz="2200" dirty="0" smtClean="0">
-                <a:latin typeface="Calibri"/>
-              </a:rPr>
-              <a:t>multi-module builds</a:t>
-            </a:r>
-            <a:endParaRPr sz="2200" dirty="0"/>
-          </a:p>
-          <a:p>
-            <a:pPr marL="457200" indent="-457200">
-              <a:buSzPct val="45000"/>
-              <a:buFont typeface="Arial" panose="020B0604020202020204" pitchFamily="34" charset="0"/>
-              <a:buChar char="•"/>
-            </a:pPr>
-            <a:r>
-              <a:rPr lang="en-US" sz="2200" dirty="0">
-                <a:latin typeface="Calibri"/>
-              </a:rPr>
-              <a:t>Relies on convention over configuration</a:t>
-            </a:r>
-            <a:endParaRPr sz="2200" dirty="0"/>
-          </a:p>
-          <a:p>
-            <a:pPr marL="457200" indent="-457200">
-              <a:buSzPct val="45000"/>
-              <a:buFont typeface="Arial" panose="020B0604020202020204" pitchFamily="34" charset="0"/>
-              <a:buChar char="•"/>
-            </a:pPr>
-            <a:r>
-              <a:rPr lang="en-US" sz="2200" dirty="0" smtClean="0">
-                <a:latin typeface="Calibri"/>
-              </a:rPr>
-              <a:t>Uses plugin architecture</a:t>
-            </a:r>
-            <a:endParaRPr sz="2200" dirty="0" smtClean="0"/>
-          </a:p>
-          <a:p>
-            <a:pPr marL="457200" indent="-457200">
-              <a:buSzPct val="45000"/>
-              <a:buFont typeface="Arial" panose="020B0604020202020204" pitchFamily="34" charset="0"/>
-              <a:buChar char="•"/>
-            </a:pPr>
-            <a:r>
-              <a:rPr lang="en-US" sz="2200" dirty="0" smtClean="0">
-                <a:latin typeface="Calibri"/>
-              </a:rPr>
-              <a:t>Files </a:t>
-            </a:r>
-            <a:r>
-              <a:rPr lang="en-US" sz="2200" dirty="0">
-                <a:latin typeface="Calibri"/>
-              </a:rPr>
-              <a:t>are written in XML</a:t>
-            </a:r>
-            <a:endParaRPr sz="2200" dirty="0"/>
-          </a:p>
-        </p:txBody>
-      </p:sp>
     </p:spTree>
   </p:cSld>
   <p:clrMapOvr>

</xml_diff>

<commit_message>
More styling changes in presentaion
</commit_message>
<xml_diff>
--- a/presentation/Introduction to Gradle.pptx
+++ b/presentation/Introduction to Gradle.pptx
@@ -4505,11 +4505,7 @@
             </a:pPr>
             <a:r>
               <a:rPr lang="en-US" sz="2200" dirty="0" smtClean="0"/>
-              <a:t>Every module has 3 required fields defining its “address</a:t>
-            </a:r>
-            <a:r>
-              <a:rPr lang="en-US" sz="2200" dirty="0" smtClean="0"/>
-              <a:t>”:</a:t>
+              <a:t>Every module has 3 required fields defining its “address”:</a:t>
             </a:r>
           </a:p>
           <a:p>
@@ -4530,11 +4526,7 @@
             </a:r>
             <a:r>
               <a:rPr lang="en-US" sz="2200" dirty="0" smtClean="0"/>
-              <a:t> – a unique namespace (usually the company name</a:t>
-            </a:r>
-            <a:r>
-              <a:rPr lang="en-US" sz="2200" dirty="0" smtClean="0"/>
-              <a:t>)</a:t>
+              <a:t> – a unique namespace (usually the company name)</a:t>
             </a:r>
           </a:p>
           <a:p>
@@ -4555,11 +4547,7 @@
             </a:r>
             <a:r>
               <a:rPr lang="en-US" sz="2200" dirty="0" smtClean="0"/>
-              <a:t> – the artifact’s name (matches the jar name</a:t>
-            </a:r>
-            <a:r>
-              <a:rPr lang="en-US" sz="2200" dirty="0" smtClean="0"/>
-              <a:t>)</a:t>
+              <a:t> – the artifact’s name (matches the jar name)</a:t>
             </a:r>
           </a:p>
           <a:p>
@@ -6428,6 +6416,9 @@
           </a:p>
           <a:p>
             <a:pPr marL="514350" indent="-514350">
+              <a:lnSpc>
+                <a:spcPct val="150000"/>
+              </a:lnSpc>
               <a:buAutoNum type="arabicPeriod"/>
             </a:pPr>
             <a:r>
@@ -6440,16 +6431,14 @@
             </a:r>
             <a:r>
               <a:rPr lang="en-US" sz="2800" dirty="0" smtClean="0"/>
-              <a:t> party </a:t>
-            </a:r>
-            <a:r>
-              <a:rPr lang="en-US" sz="2800" dirty="0" smtClean="0"/>
-              <a:t>dependencies</a:t>
-            </a:r>
-            <a:endParaRPr lang="en-US" sz="2800" dirty="0" smtClean="0"/>
+              <a:t> party dependencies</a:t>
+            </a:r>
           </a:p>
           <a:p>
             <a:pPr marL="514350" indent="-514350">
+              <a:lnSpc>
+                <a:spcPct val="150000"/>
+              </a:lnSpc>
               <a:buAutoNum type="arabicPeriod"/>
             </a:pPr>
             <a:r>
@@ -6459,6 +6448,9 @@
           </a:p>
           <a:p>
             <a:pPr marL="514350" indent="-514350">
+              <a:lnSpc>
+                <a:spcPct val="150000"/>
+              </a:lnSpc>
               <a:buAutoNum type="arabicPeriod"/>
             </a:pPr>
             <a:r>
@@ -6468,6 +6460,9 @@
           </a:p>
           <a:p>
             <a:pPr marL="514350" indent="-514350">
+              <a:lnSpc>
+                <a:spcPct val="150000"/>
+              </a:lnSpc>
               <a:buAutoNum type="arabicPeriod"/>
             </a:pPr>
             <a:r>
@@ -6530,7 +6525,7 @@
         </p:blipFill>
         <p:spPr>
           <a:xfrm>
-            <a:off x="6238875" y="2895600"/>
+            <a:off x="6238875" y="3581400"/>
             <a:ext cx="390525" cy="381000"/>
           </a:xfrm>
           <a:prstGeom prst="rect">
@@ -6560,7 +6555,7 @@
         </p:blipFill>
         <p:spPr>
           <a:xfrm>
-            <a:off x="6238874" y="2409631"/>
+            <a:off x="6238873" y="2895600"/>
             <a:ext cx="390525" cy="381000"/>
           </a:xfrm>
           <a:prstGeom prst="rect">
@@ -6590,7 +6585,7 @@
         </p:blipFill>
         <p:spPr>
           <a:xfrm>
-            <a:off x="6238875" y="2019301"/>
+            <a:off x="6238875" y="2289983"/>
             <a:ext cx="390525" cy="381000"/>
           </a:xfrm>
           <a:prstGeom prst="rect">
@@ -6620,7 +6615,7 @@
         </p:blipFill>
         <p:spPr>
           <a:xfrm>
-            <a:off x="6772275" y="1524000"/>
+            <a:off x="6772275" y="1641143"/>
             <a:ext cx="390525" cy="381000"/>
           </a:xfrm>
           <a:prstGeom prst="rect">
@@ -6630,7 +6625,7 @@
       </p:pic>
       <p:pic>
         <p:nvPicPr>
-          <p:cNvPr id="9" name="תמונה 4"/>
+          <p:cNvPr id="10" name="תמונה 9"/>
           <p:cNvPicPr>
             <a:picLocks noChangeAspect="1"/>
           </p:cNvPicPr>
@@ -6650,8 +6645,8 @@
         </p:blipFill>
         <p:spPr>
           <a:xfrm>
-            <a:off x="6858000" y="3962400"/>
-            <a:ext cx="2057399" cy="2438400"/>
+            <a:off x="7391041" y="3962400"/>
+            <a:ext cx="1295399" cy="2438400"/>
           </a:xfrm>
           <a:prstGeom prst="rect">
             <a:avLst/>
@@ -6853,11 +6848,7 @@
             </a:pPr>
             <a:r>
               <a:rPr lang="en-US" dirty="0" smtClean="0"/>
-              <a:t>Maven build </a:t>
-            </a:r>
-            <a:r>
-              <a:rPr lang="en-US" dirty="0" smtClean="0"/>
-              <a:t>times:</a:t>
+              <a:t>Maven build times:</a:t>
             </a:r>
           </a:p>
           <a:p>
@@ -6899,11 +6890,7 @@
             </a:pPr>
             <a:r>
               <a:rPr lang="en-US" dirty="0" smtClean="0"/>
-              <a:t>Full </a:t>
-            </a:r>
-            <a:r>
-              <a:rPr lang="en-US" dirty="0" smtClean="0"/>
-              <a:t>build with unit tests – </a:t>
+              <a:t>Full build with unit tests – </a:t>
             </a:r>
             <a:r>
               <a:rPr lang="en-US" sz="2800" b="1" dirty="0" smtClean="0">
@@ -7104,30 +7091,11 @@
             </a:r>
           </a:p>
           <a:p>
-            <a:pPr>
-              <a:buSzPct val="45000"/>
-            </a:pPr>
-            <a:endParaRPr sz="1200" dirty="0"/>
-          </a:p>
-          <a:p>
             <a:pPr marL="457200" indent="-457200">
               <a:buSzPct val="45000"/>
               <a:buFont typeface="Arial" panose="020B0604020202020204" pitchFamily="34" charset="0"/>
               <a:buChar char="•"/>
             </a:pPr>
-            <a:r>
-              <a:rPr lang="en-US" sz="2400" dirty="0"/>
-              <a:t>Project automation </a:t>
-            </a:r>
-            <a:r>
-              <a:rPr lang="en-US" sz="2400" dirty="0" smtClean="0"/>
-              <a:t>tool</a:t>
-            </a:r>
-          </a:p>
-          <a:p>
-            <a:pPr>
-              <a:buSzPct val="45000"/>
-            </a:pPr>
             <a:endParaRPr lang="en-US" sz="1200" dirty="0" smtClean="0"/>
           </a:p>
           <a:p>
@@ -7153,7 +7121,7 @@
             <a:pPr>
               <a:buSzPct val="45000"/>
             </a:pPr>
-            <a:endParaRPr lang="en-US" sz="1200" dirty="0" smtClean="0"/>
+            <a:endParaRPr lang="en-US" sz="900" dirty="0" smtClean="0"/>
           </a:p>
           <a:p>
             <a:pPr marL="457200" indent="-457200">
@@ -7163,11 +7131,25 @@
             </a:pPr>
             <a:r>
               <a:rPr lang="en-US" sz="2400" dirty="0" smtClean="0"/>
-              <a:t>Declarative as well as </a:t>
-            </a:r>
+              <a:t>Full support for Maven repository</a:t>
+            </a:r>
+            <a:endParaRPr lang="en-US" sz="2400" dirty="0" smtClean="0"/>
+          </a:p>
+          <a:p>
+            <a:pPr>
+              <a:buSzPct val="45000"/>
+            </a:pPr>
+            <a:endParaRPr lang="en-US" sz="1200" dirty="0" smtClean="0"/>
+          </a:p>
+          <a:p>
+            <a:pPr marL="457200" indent="-457200">
+              <a:buSzPct val="45000"/>
+              <a:buFont typeface="Arial" panose="020B0604020202020204" pitchFamily="34" charset="0"/>
+              <a:buChar char="•"/>
+            </a:pPr>
             <a:r>
               <a:rPr lang="en-US" sz="2400" dirty="0" smtClean="0"/>
-              <a:t>imperative</a:t>
+              <a:t>Declarative as well as imperative</a:t>
             </a:r>
           </a:p>
           <a:p>
@@ -7310,19 +7292,7 @@
               <a:rPr lang="en-US" sz="3600" dirty="0" smtClean="0">
                 <a:latin typeface="+mj-lt"/>
               </a:rPr>
-              <a:t>–java </a:t>
-            </a:r>
-            <a:r>
-              <a:rPr lang="en-US" sz="3600" dirty="0" smtClean="0">
-                <a:latin typeface="+mj-lt"/>
-              </a:rPr>
-              <a:t>module </a:t>
-            </a:r>
-            <a:r>
-              <a:rPr lang="en-US" sz="3600" dirty="0" smtClean="0">
-                <a:latin typeface="+mj-lt"/>
-              </a:rPr>
-              <a:t>build file</a:t>
+              <a:t>–java module build file</a:t>
             </a:r>
             <a:endParaRPr dirty="0">
               <a:latin typeface="+mj-lt"/>
@@ -10260,13 +10230,8 @@
             </a:r>
             <a:r>
               <a:rPr lang="en-US" sz="2800" dirty="0" smtClean="0"/>
-              <a:t> party </a:t>
-            </a:r>
-            <a:r>
-              <a:rPr lang="en-US" sz="2800" dirty="0" smtClean="0"/>
-              <a:t>dependencies</a:t>
-            </a:r>
-            <a:endParaRPr lang="en-US" sz="2800" dirty="0" smtClean="0"/>
+              <a:t> party dependencies</a:t>
+            </a:r>
           </a:p>
           <a:p>
             <a:pPr marL="514350" indent="-514350">
@@ -10367,8 +10332,8 @@
         </p:blipFill>
         <p:spPr>
           <a:xfrm>
-            <a:off x="6858000" y="3962400"/>
-            <a:ext cx="2057399" cy="2438400"/>
+            <a:off x="7391041" y="3962400"/>
+            <a:ext cx="1295399" cy="2438400"/>
           </a:xfrm>
           <a:prstGeom prst="rect">
             <a:avLst/>
@@ -11468,7 +11433,7 @@
           </p:nvSpPr>
           <p:spPr>
             <a:xfrm>
-              <a:off x="3194696" y="5134097"/>
+              <a:off x="3194696" y="5134096"/>
               <a:ext cx="2707433" cy="1332713"/>
             </a:xfrm>
             <a:prstGeom prst="rect">
@@ -12560,6 +12525,9 @@
           </a:p>
           <a:p>
             <a:pPr marL="514350" indent="-514350">
+              <a:lnSpc>
+                <a:spcPct val="150000"/>
+              </a:lnSpc>
               <a:buAutoNum type="arabicPeriod"/>
             </a:pPr>
             <a:r>
@@ -12572,30 +12540,26 @@
             </a:r>
             <a:r>
               <a:rPr lang="en-US" sz="2800" dirty="0" smtClean="0"/>
-              <a:t> party </a:t>
-            </a:r>
+              <a:t> party dependencies</a:t>
+            </a:r>
+          </a:p>
+          <a:p>
+            <a:pPr marL="514350" indent="-514350">
+              <a:lnSpc>
+                <a:spcPct val="150000"/>
+              </a:lnSpc>
+              <a:buAutoNum type="arabicPeriod"/>
+            </a:pPr>
             <a:r>
               <a:rPr lang="en-US" sz="2800" dirty="0" smtClean="0"/>
-              <a:t>dependencies</a:t>
-            </a:r>
-            <a:endParaRPr lang="en-US" sz="2800" dirty="0" smtClean="0"/>
+              <a:t>Compile source code</a:t>
+            </a:r>
           </a:p>
           <a:p>
             <a:pPr marL="514350" indent="-514350">
-              <a:buAutoNum type="arabicPeriod"/>
-            </a:pPr>
-            <a:r>
-              <a:rPr lang="en-US" sz="2800" dirty="0" smtClean="0"/>
-              <a:t>Compile source </a:t>
-            </a:r>
-            <a:r>
-              <a:rPr lang="en-US" sz="2800" dirty="0" smtClean="0"/>
-              <a:t>code</a:t>
-            </a:r>
-            <a:endParaRPr lang="en-US" sz="2800" dirty="0" smtClean="0"/>
-          </a:p>
-          <a:p>
-            <a:pPr marL="514350" indent="-514350">
+              <a:lnSpc>
+                <a:spcPct val="150000"/>
+              </a:lnSpc>
               <a:buAutoNum type="arabicPeriod"/>
             </a:pPr>
             <a:r>
@@ -12605,6 +12569,9 @@
           </a:p>
           <a:p>
             <a:pPr marL="514350" indent="-514350">
+              <a:lnSpc>
+                <a:spcPct val="150000"/>
+              </a:lnSpc>
               <a:buAutoNum type="arabicPeriod"/>
             </a:pPr>
             <a:r>
@@ -12667,7 +12634,7 @@
         </p:blipFill>
         <p:spPr>
           <a:xfrm>
-            <a:off x="6618000" y="1524000"/>
+            <a:off x="6790872" y="1647311"/>
             <a:ext cx="392400" cy="387168"/>
           </a:xfrm>
           <a:prstGeom prst="rect">
@@ -12697,7 +12664,7 @@
         </p:blipFill>
         <p:spPr>
           <a:xfrm>
-            <a:off x="6172201" y="2895600"/>
+            <a:off x="6248400" y="3581400"/>
             <a:ext cx="390525" cy="381000"/>
           </a:xfrm>
           <a:prstGeom prst="rect">
@@ -12727,7 +12694,7 @@
         </p:blipFill>
         <p:spPr>
           <a:xfrm>
-            <a:off x="6172200" y="2438400"/>
+            <a:off x="6172200" y="2971800"/>
             <a:ext cx="390525" cy="381000"/>
           </a:xfrm>
           <a:prstGeom prst="rect">
@@ -12757,7 +12724,7 @@
         </p:blipFill>
         <p:spPr>
           <a:xfrm>
-            <a:off x="6172201" y="2040294"/>
+            <a:off x="6172201" y="2250651"/>
             <a:ext cx="390525" cy="381000"/>
           </a:xfrm>
           <a:prstGeom prst="rect">
@@ -12767,7 +12734,7 @@
       </p:pic>
       <p:pic>
         <p:nvPicPr>
-          <p:cNvPr id="5" name="תמונה 4"/>
+          <p:cNvPr id="9" name="תמונה 8"/>
           <p:cNvPicPr>
             <a:picLocks noChangeAspect="1"/>
           </p:cNvPicPr>
@@ -12787,8 +12754,8 @@
         </p:blipFill>
         <p:spPr>
           <a:xfrm>
-            <a:off x="6858000" y="3962400"/>
-            <a:ext cx="2057399" cy="2438400"/>
+            <a:off x="7391041" y="3962400"/>
+            <a:ext cx="1295399" cy="2438400"/>
           </a:xfrm>
           <a:prstGeom prst="rect">
             <a:avLst/>
@@ -12910,101 +12877,77 @@
             </a:pPr>
             <a:r>
               <a:rPr lang="en-US" sz="2200" dirty="0" smtClean="0"/>
-              <a:t>Most popular java build </a:t>
+              <a:t>Most popular java build tool</a:t>
+            </a:r>
+          </a:p>
+          <a:p>
+            <a:pPr>
+              <a:buSzPct val="45000"/>
+            </a:pPr>
+            <a:endParaRPr lang="en-US" sz="900" dirty="0" smtClean="0"/>
+          </a:p>
+          <a:p>
+            <a:pPr marL="457200" indent="-457200">
+              <a:buSzPct val="45000"/>
+              <a:buFont typeface="Arial" panose="020B0604020202020204" pitchFamily="34" charset="0"/>
+              <a:buChar char="•"/>
+            </a:pPr>
+            <a:r>
+              <a:rPr lang="en-US" sz="2200" dirty="0" smtClean="0"/>
+              <a:t>Introduced </a:t>
+            </a:r>
+            <a:r>
+              <a:rPr lang="en-US" sz="2200" dirty="0"/>
+              <a:t>dependency management </a:t>
+            </a:r>
+            <a:endParaRPr lang="en-US" sz="2200" dirty="0" smtClean="0"/>
+          </a:p>
+          <a:p>
+            <a:pPr>
+              <a:buSzPct val="45000"/>
+            </a:pPr>
+            <a:endParaRPr sz="900" dirty="0"/>
+          </a:p>
+          <a:p>
+            <a:pPr marL="457200" indent="-457200">
+              <a:buSzPct val="45000"/>
+              <a:buFont typeface="Arial" panose="020B0604020202020204" pitchFamily="34" charset="0"/>
+              <a:buChar char="•"/>
+            </a:pPr>
+            <a:r>
+              <a:rPr lang="en-US" sz="2200" dirty="0"/>
+              <a:t>Introduced </a:t>
+            </a:r>
+            <a:r>
+              <a:rPr lang="en-US" sz="2200" dirty="0" smtClean="0"/>
+              <a:t>multi-module </a:t>
+            </a:r>
+            <a:r>
+              <a:rPr lang="en-US" sz="2200" dirty="0" smtClean="0"/>
+              <a:t>builds</a:t>
+            </a:r>
+          </a:p>
+          <a:p>
+            <a:pPr>
+              <a:buSzPct val="45000"/>
+            </a:pPr>
+            <a:endParaRPr lang="en-US" sz="900" dirty="0" smtClean="0"/>
+          </a:p>
+          <a:p>
+            <a:pPr marL="457200" indent="-457200">
+              <a:buSzPct val="45000"/>
+              <a:buFont typeface="Arial" panose="020B0604020202020204" pitchFamily="34" charset="0"/>
+              <a:buChar char="•"/>
+            </a:pPr>
+            <a:r>
+              <a:rPr lang="en-US" sz="2200" dirty="0"/>
+              <a:t>Declarative build </a:t>
             </a:r>
             <a:r>
               <a:rPr lang="en-US" sz="2200" dirty="0" smtClean="0"/>
               <a:t>tool</a:t>
             </a:r>
-          </a:p>
-          <a:p>
-            <a:pPr>
-              <a:buSzPct val="45000"/>
-            </a:pPr>
-            <a:endParaRPr lang="en-US" sz="900" dirty="0" smtClean="0"/>
-          </a:p>
-          <a:p>
-            <a:pPr marL="457200" indent="-457200">
-              <a:buSzPct val="45000"/>
-              <a:buFont typeface="Arial" panose="020B0604020202020204" pitchFamily="34" charset="0"/>
-              <a:buChar char="•"/>
-            </a:pPr>
-            <a:r>
-              <a:rPr lang="en-US" sz="2200" dirty="0" smtClean="0"/>
-              <a:t>Declarative build </a:t>
-            </a:r>
-            <a:r>
-              <a:rPr lang="en-US" sz="2200" dirty="0" smtClean="0"/>
-              <a:t>tool</a:t>
-            </a:r>
-          </a:p>
-          <a:p>
-            <a:pPr>
-              <a:buSzPct val="45000"/>
-            </a:pPr>
-            <a:endParaRPr lang="en-US" sz="900" dirty="0" smtClean="0"/>
-          </a:p>
-          <a:p>
-            <a:pPr marL="457200" indent="-457200">
-              <a:buSzPct val="45000"/>
-              <a:buFont typeface="Arial" panose="020B0604020202020204" pitchFamily="34" charset="0"/>
-              <a:buChar char="•"/>
-            </a:pPr>
-            <a:r>
-              <a:rPr lang="en-US" sz="2200" dirty="0" smtClean="0"/>
-              <a:t>Introduced </a:t>
-            </a:r>
-            <a:r>
-              <a:rPr lang="en-US" sz="2200" dirty="0"/>
-              <a:t>dependency management </a:t>
-            </a:r>
             <a:endParaRPr lang="en-US" sz="2200" dirty="0" smtClean="0"/>
-          </a:p>
-          <a:p>
-            <a:pPr>
-              <a:buSzPct val="45000"/>
-            </a:pPr>
-            <a:endParaRPr sz="900" dirty="0"/>
-          </a:p>
-          <a:p>
-            <a:pPr marL="457200" indent="-457200">
-              <a:buSzPct val="45000"/>
-              <a:buFont typeface="Arial" panose="020B0604020202020204" pitchFamily="34" charset="0"/>
-              <a:buChar char="•"/>
-            </a:pPr>
-            <a:r>
-              <a:rPr lang="en-US" sz="2200" dirty="0"/>
-              <a:t>Introduced </a:t>
-            </a:r>
-            <a:r>
-              <a:rPr lang="en-US" sz="2200" dirty="0" smtClean="0"/>
-              <a:t>multi-module </a:t>
-            </a:r>
-            <a:r>
-              <a:rPr lang="en-US" sz="2200" dirty="0" smtClean="0"/>
-              <a:t>builds</a:t>
-            </a:r>
-          </a:p>
-          <a:p>
-            <a:pPr>
-              <a:buSzPct val="45000"/>
-            </a:pPr>
-            <a:endParaRPr sz="900" dirty="0"/>
-          </a:p>
-          <a:p>
-            <a:pPr marL="457200" indent="-457200">
-              <a:buSzPct val="45000"/>
-              <a:buFont typeface="Arial" panose="020B0604020202020204" pitchFamily="34" charset="0"/>
-              <a:buChar char="•"/>
-            </a:pPr>
-            <a:r>
-              <a:rPr lang="en-US" sz="2200" dirty="0"/>
-              <a:t>Relies on convention over </a:t>
-            </a:r>
-            <a:r>
-              <a:rPr lang="en-US" sz="2200" dirty="0" smtClean="0"/>
-              <a:t>configuration</a:t>
-            </a:r>
           </a:p>
           <a:p>
             <a:pPr>

</xml_diff>